<commit_message>
cleaning up repo, adding data
</commit_message>
<xml_diff>
--- a/experiment/images/instructions.pptx
+++ b/experiment/images/instructions.pptx
@@ -5,17 +5,18 @@
     <p:sldMasterId id="2147483648" r:id="rId1"/>
   </p:sldMasterIdLst>
   <p:sldIdLst>
-    <p:sldId id="256" r:id="rId2"/>
-    <p:sldId id="257" r:id="rId3"/>
-    <p:sldId id="258" r:id="rId4"/>
-    <p:sldId id="259" r:id="rId5"/>
-    <p:sldId id="265" r:id="rId6"/>
-    <p:sldId id="260" r:id="rId7"/>
-    <p:sldId id="263" r:id="rId8"/>
-    <p:sldId id="267" r:id="rId9"/>
-    <p:sldId id="264" r:id="rId10"/>
-    <p:sldId id="266" r:id="rId11"/>
-    <p:sldId id="262" r:id="rId12"/>
+    <p:sldId id="258" r:id="rId2"/>
+    <p:sldId id="259" r:id="rId3"/>
+    <p:sldId id="260" r:id="rId4"/>
+    <p:sldId id="261" r:id="rId5"/>
+    <p:sldId id="272" r:id="rId6"/>
+    <p:sldId id="264" r:id="rId7"/>
+    <p:sldId id="265" r:id="rId8"/>
+    <p:sldId id="266" r:id="rId9"/>
+    <p:sldId id="268" r:id="rId10"/>
+    <p:sldId id="271" r:id="rId11"/>
+    <p:sldId id="269" r:id="rId12"/>
+    <p:sldId id="270" r:id="rId13"/>
   </p:sldIdLst>
   <p:sldSz cx="12192000" cy="6858000"/>
   <p:notesSz cx="6858000" cy="9144000"/>
@@ -133,646 +134,6 @@
 </p:presentation>
 </file>
 
-<file path=ppt/revisionInfo.xml><?xml version="1.0" encoding="utf-8"?>
-<p1510:revInfo xmlns:a="http://schemas.openxmlformats.org/drawingml/2006/main" xmlns:r="http://schemas.openxmlformats.org/officeDocument/2006/relationships" xmlns:p1510="http://schemas.microsoft.com/office/powerpoint/2015/10/main">
-  <p1510:revLst>
-    <p1510:client id="{BF5FF7EF-77E8-B142-852E-A30DC2B6D16D}" v="3" dt="2024-09-17T18:33:16.037"/>
-  </p1510:revLst>
-</p1510:revInfo>
-</file>
-
-<file path=ppt/changesInfos/changesInfo1.xml><?xml version="1.0" encoding="utf-8"?>
-<pc:chgInfo xmlns:a="http://schemas.openxmlformats.org/drawingml/2006/main" xmlns:r="http://schemas.openxmlformats.org/officeDocument/2006/relationships" xmlns:ac="http://schemas.microsoft.com/office/drawing/2013/main/command" xmlns:pc="http://schemas.microsoft.com/office/powerpoint/2013/main/command">
-  <pc:docChgLst>
-    <pc:chgData name="Kate Petrova" userId="c80717b8-7058-4b58-b873-df9e70b40da1" providerId="ADAL" clId="{BF5FF7EF-77E8-B142-852E-A30DC2B6D16D}"/>
-    <pc:docChg chg="undo custSel addSld delSld modSld">
-      <pc:chgData name="Kate Petrova" userId="c80717b8-7058-4b58-b873-df9e70b40da1" providerId="ADAL" clId="{BF5FF7EF-77E8-B142-852E-A30DC2B6D16D}" dt="2024-09-17T23:15:35.709" v="431" actId="113"/>
-      <pc:docMkLst>
-        <pc:docMk/>
-      </pc:docMkLst>
-      <pc:sldChg chg="modSp mod">
-        <pc:chgData name="Kate Petrova" userId="c80717b8-7058-4b58-b873-df9e70b40da1" providerId="ADAL" clId="{BF5FF7EF-77E8-B142-852E-A30DC2B6D16D}" dt="2024-09-17T19:19:08.863" v="309" actId="20577"/>
-        <pc:sldMkLst>
-          <pc:docMk/>
-          <pc:sldMk cId="1582665338" sldId="259"/>
-        </pc:sldMkLst>
-        <pc:spChg chg="mod">
-          <ac:chgData name="Kate Petrova" userId="c80717b8-7058-4b58-b873-df9e70b40da1" providerId="ADAL" clId="{BF5FF7EF-77E8-B142-852E-A30DC2B6D16D}" dt="2024-09-17T19:19:06.797" v="306" actId="20577"/>
-          <ac:spMkLst>
-            <pc:docMk/>
-            <pc:sldMk cId="1582665338" sldId="259"/>
-            <ac:spMk id="2" creationId="{9EF06329-ACB7-D738-90A9-0932CBFF51C1}"/>
-          </ac:spMkLst>
-        </pc:spChg>
-        <pc:spChg chg="mod">
-          <ac:chgData name="Kate Petrova" userId="c80717b8-7058-4b58-b873-df9e70b40da1" providerId="ADAL" clId="{BF5FF7EF-77E8-B142-852E-A30DC2B6D16D}" dt="2024-09-17T18:22:44.374" v="12" actId="20577"/>
-          <ac:spMkLst>
-            <pc:docMk/>
-            <pc:sldMk cId="1582665338" sldId="259"/>
-            <ac:spMk id="10" creationId="{E672D5E3-A2C9-BBA7-4584-335F4BED5C3D}"/>
-          </ac:spMkLst>
-        </pc:spChg>
-        <pc:spChg chg="mod">
-          <ac:chgData name="Kate Petrova" userId="c80717b8-7058-4b58-b873-df9e70b40da1" providerId="ADAL" clId="{BF5FF7EF-77E8-B142-852E-A30DC2B6D16D}" dt="2024-09-17T19:19:08.863" v="309" actId="20577"/>
-          <ac:spMkLst>
-            <pc:docMk/>
-            <pc:sldMk cId="1582665338" sldId="259"/>
-            <ac:spMk id="14" creationId="{C1889260-267D-DBC9-53EA-FAA6DD94C2C3}"/>
-          </ac:spMkLst>
-        </pc:spChg>
-      </pc:sldChg>
-      <pc:sldChg chg="modSp mod">
-        <pc:chgData name="Kate Petrova" userId="c80717b8-7058-4b58-b873-df9e70b40da1" providerId="ADAL" clId="{BF5FF7EF-77E8-B142-852E-A30DC2B6D16D}" dt="2024-09-17T18:23:03.733" v="17" actId="20577"/>
-        <pc:sldMkLst>
-          <pc:docMk/>
-          <pc:sldMk cId="2991160902" sldId="260"/>
-        </pc:sldMkLst>
-        <pc:spChg chg="mod">
-          <ac:chgData name="Kate Petrova" userId="c80717b8-7058-4b58-b873-df9e70b40da1" providerId="ADAL" clId="{BF5FF7EF-77E8-B142-852E-A30DC2B6D16D}" dt="2024-09-17T18:23:03.733" v="17" actId="20577"/>
-          <ac:spMkLst>
-            <pc:docMk/>
-            <pc:sldMk cId="2991160902" sldId="260"/>
-            <ac:spMk id="10" creationId="{E672D5E3-A2C9-BBA7-4584-335F4BED5C3D}"/>
-          </ac:spMkLst>
-        </pc:spChg>
-      </pc:sldChg>
-      <pc:sldChg chg="modSp mod">
-        <pc:chgData name="Kate Petrova" userId="c80717b8-7058-4b58-b873-df9e70b40da1" providerId="ADAL" clId="{BF5FF7EF-77E8-B142-852E-A30DC2B6D16D}" dt="2024-09-17T18:23:14.373" v="21" actId="20577"/>
-        <pc:sldMkLst>
-          <pc:docMk/>
-          <pc:sldMk cId="115648664" sldId="263"/>
-        </pc:sldMkLst>
-        <pc:spChg chg="mod">
-          <ac:chgData name="Kate Petrova" userId="c80717b8-7058-4b58-b873-df9e70b40da1" providerId="ADAL" clId="{BF5FF7EF-77E8-B142-852E-A30DC2B6D16D}" dt="2024-09-17T18:23:14.373" v="21" actId="20577"/>
-          <ac:spMkLst>
-            <pc:docMk/>
-            <pc:sldMk cId="115648664" sldId="263"/>
-            <ac:spMk id="10" creationId="{E672D5E3-A2C9-BBA7-4584-335F4BED5C3D}"/>
-          </ac:spMkLst>
-        </pc:spChg>
-      </pc:sldChg>
-      <pc:sldChg chg="addSp delSp modSp add del mod">
-        <pc:chgData name="Kate Petrova" userId="c80717b8-7058-4b58-b873-df9e70b40da1" providerId="ADAL" clId="{BF5FF7EF-77E8-B142-852E-A30DC2B6D16D}" dt="2024-09-17T23:15:31.623" v="430" actId="113"/>
-        <pc:sldMkLst>
-          <pc:docMk/>
-          <pc:sldMk cId="3195152792" sldId="264"/>
-        </pc:sldMkLst>
-        <pc:spChg chg="mod">
-          <ac:chgData name="Kate Petrova" userId="c80717b8-7058-4b58-b873-df9e70b40da1" providerId="ADAL" clId="{BF5FF7EF-77E8-B142-852E-A30DC2B6D16D}" dt="2024-09-17T23:15:31.623" v="430" actId="113"/>
-          <ac:spMkLst>
-            <pc:docMk/>
-            <pc:sldMk cId="3195152792" sldId="264"/>
-            <ac:spMk id="10" creationId="{E672D5E3-A2C9-BBA7-4584-335F4BED5C3D}"/>
-          </ac:spMkLst>
-        </pc:spChg>
-        <pc:picChg chg="add mod">
-          <ac:chgData name="Kate Petrova" userId="c80717b8-7058-4b58-b873-df9e70b40da1" providerId="ADAL" clId="{BF5FF7EF-77E8-B142-852E-A30DC2B6D16D}" dt="2024-09-17T18:30:30.366" v="27" actId="1076"/>
-          <ac:picMkLst>
-            <pc:docMk/>
-            <pc:sldMk cId="3195152792" sldId="264"/>
-            <ac:picMk id="3" creationId="{67607619-F353-2DEB-E8E0-804B787D7FC5}"/>
-          </ac:picMkLst>
-        </pc:picChg>
-        <pc:picChg chg="del">
-          <ac:chgData name="Kate Petrova" userId="c80717b8-7058-4b58-b873-df9e70b40da1" providerId="ADAL" clId="{BF5FF7EF-77E8-B142-852E-A30DC2B6D16D}" dt="2024-09-17T18:30:24.329" v="24" actId="478"/>
-          <ac:picMkLst>
-            <pc:docMk/>
-            <pc:sldMk cId="3195152792" sldId="264"/>
-            <ac:picMk id="7" creationId="{A0B2806A-81ED-59AA-2663-A762305B8F33}"/>
-          </ac:picMkLst>
-        </pc:picChg>
-      </pc:sldChg>
-      <pc:sldChg chg="modSp add mod">
-        <pc:chgData name="Kate Petrova" userId="c80717b8-7058-4b58-b873-df9e70b40da1" providerId="ADAL" clId="{BF5FF7EF-77E8-B142-852E-A30DC2B6D16D}" dt="2024-09-17T23:15:24.376" v="429" actId="113"/>
-        <pc:sldMkLst>
-          <pc:docMk/>
-          <pc:sldMk cId="3032555438" sldId="266"/>
-        </pc:sldMkLst>
-        <pc:spChg chg="mod">
-          <ac:chgData name="Kate Petrova" userId="c80717b8-7058-4b58-b873-df9e70b40da1" providerId="ADAL" clId="{BF5FF7EF-77E8-B142-852E-A30DC2B6D16D}" dt="2024-09-17T23:15:24.376" v="429" actId="113"/>
-          <ac:spMkLst>
-            <pc:docMk/>
-            <pc:sldMk cId="3032555438" sldId="266"/>
-            <ac:spMk id="10" creationId="{E672D5E3-A2C9-BBA7-4584-335F4BED5C3D}"/>
-          </ac:spMkLst>
-        </pc:spChg>
-      </pc:sldChg>
-      <pc:sldChg chg="modSp add mod">
-        <pc:chgData name="Kate Petrova" userId="c80717b8-7058-4b58-b873-df9e70b40da1" providerId="ADAL" clId="{BF5FF7EF-77E8-B142-852E-A30DC2B6D16D}" dt="2024-09-17T23:15:35.709" v="431" actId="113"/>
-        <pc:sldMkLst>
-          <pc:docMk/>
-          <pc:sldMk cId="3635275954" sldId="267"/>
-        </pc:sldMkLst>
-        <pc:spChg chg="mod">
-          <ac:chgData name="Kate Petrova" userId="c80717b8-7058-4b58-b873-df9e70b40da1" providerId="ADAL" clId="{BF5FF7EF-77E8-B142-852E-A30DC2B6D16D}" dt="2024-09-17T23:15:35.709" v="431" actId="113"/>
-          <ac:spMkLst>
-            <pc:docMk/>
-            <pc:sldMk cId="3635275954" sldId="267"/>
-            <ac:spMk id="10" creationId="{E672D5E3-A2C9-BBA7-4584-335F4BED5C3D}"/>
-          </ac:spMkLst>
-        </pc:spChg>
-        <pc:picChg chg="mod">
-          <ac:chgData name="Kate Petrova" userId="c80717b8-7058-4b58-b873-df9e70b40da1" providerId="ADAL" clId="{BF5FF7EF-77E8-B142-852E-A30DC2B6D16D}" dt="2024-09-17T23:15:06.460" v="427" actId="1035"/>
-          <ac:picMkLst>
-            <pc:docMk/>
-            <pc:sldMk cId="3635275954" sldId="267"/>
-            <ac:picMk id="3" creationId="{67607619-F353-2DEB-E8E0-804B787D7FC5}"/>
-          </ac:picMkLst>
-        </pc:picChg>
-      </pc:sldChg>
-    </pc:docChg>
-  </pc:docChgLst>
-  <pc:docChgLst>
-    <pc:chgData name="Kate Petrova" userId="c80717b8-7058-4b58-b873-df9e70b40da1" providerId="ADAL" clId="{858BC516-A270-9846-B3B8-AB087C73F9E4}"/>
-    <pc:docChg chg="undo custSel addSld modSld">
-      <pc:chgData name="Kate Petrova" userId="c80717b8-7058-4b58-b873-df9e70b40da1" providerId="ADAL" clId="{858BC516-A270-9846-B3B8-AB087C73F9E4}" dt="2023-08-16T01:05:32.557" v="759" actId="1076"/>
-      <pc:docMkLst>
-        <pc:docMk/>
-      </pc:docMkLst>
-      <pc:sldChg chg="addSp delSp modSp mod">
-        <pc:chgData name="Kate Petrova" userId="c80717b8-7058-4b58-b873-df9e70b40da1" providerId="ADAL" clId="{858BC516-A270-9846-B3B8-AB087C73F9E4}" dt="2023-08-16T00:56:37.341" v="80" actId="403"/>
-        <pc:sldMkLst>
-          <pc:docMk/>
-          <pc:sldMk cId="2138951838" sldId="256"/>
-        </pc:sldMkLst>
-        <pc:spChg chg="mod">
-          <ac:chgData name="Kate Petrova" userId="c80717b8-7058-4b58-b873-df9e70b40da1" providerId="ADAL" clId="{858BC516-A270-9846-B3B8-AB087C73F9E4}" dt="2023-08-16T00:56:37.341" v="80" actId="403"/>
-          <ac:spMkLst>
-            <pc:docMk/>
-            <pc:sldMk cId="2138951838" sldId="256"/>
-            <ac:spMk id="10" creationId="{E672D5E3-A2C9-BBA7-4584-335F4BED5C3D}"/>
-          </ac:spMkLst>
-        </pc:spChg>
-        <pc:grpChg chg="add">
-          <ac:chgData name="Kate Petrova" userId="c80717b8-7058-4b58-b873-df9e70b40da1" providerId="ADAL" clId="{858BC516-A270-9846-B3B8-AB087C73F9E4}" dt="2023-08-16T00:55:31.233" v="12" actId="164"/>
-          <ac:grpSpMkLst>
-            <pc:docMk/>
-            <pc:sldMk cId="2138951838" sldId="256"/>
-            <ac:grpSpMk id="12" creationId="{218CF045-EDA9-1746-B040-E6CB52C2324B}"/>
-          </ac:grpSpMkLst>
-        </pc:grpChg>
-        <pc:picChg chg="add mod">
-          <ac:chgData name="Kate Petrova" userId="c80717b8-7058-4b58-b873-df9e70b40da1" providerId="ADAL" clId="{858BC516-A270-9846-B3B8-AB087C73F9E4}" dt="2023-08-16T00:55:09.788" v="8" actId="1076"/>
-          <ac:picMkLst>
-            <pc:docMk/>
-            <pc:sldMk cId="2138951838" sldId="256"/>
-            <ac:picMk id="3" creationId="{BA433486-359E-97A2-E267-5D9911C66AC7}"/>
-          </ac:picMkLst>
-        </pc:picChg>
-        <pc:picChg chg="del">
-          <ac:chgData name="Kate Petrova" userId="c80717b8-7058-4b58-b873-df9e70b40da1" providerId="ADAL" clId="{858BC516-A270-9846-B3B8-AB087C73F9E4}" dt="2023-08-16T00:54:40.148" v="0" actId="478"/>
-          <ac:picMkLst>
-            <pc:docMk/>
-            <pc:sldMk cId="2138951838" sldId="256"/>
-            <ac:picMk id="5" creationId="{181664E6-777A-1B4F-C33F-D31656C5F076}"/>
-          </ac:picMkLst>
-        </pc:picChg>
-        <pc:picChg chg="add mod">
-          <ac:chgData name="Kate Petrova" userId="c80717b8-7058-4b58-b873-df9e70b40da1" providerId="ADAL" clId="{858BC516-A270-9846-B3B8-AB087C73F9E4}" dt="2023-08-16T00:55:21.263" v="10" actId="1076"/>
-          <ac:picMkLst>
-            <pc:docMk/>
-            <pc:sldMk cId="2138951838" sldId="256"/>
-            <ac:picMk id="6" creationId="{A53AE033-B071-26F1-D473-FB6736536849}"/>
-          </ac:picMkLst>
-        </pc:picChg>
-        <pc:picChg chg="del">
-          <ac:chgData name="Kate Petrova" userId="c80717b8-7058-4b58-b873-df9e70b40da1" providerId="ADAL" clId="{858BC516-A270-9846-B3B8-AB087C73F9E4}" dt="2023-08-16T00:54:40.148" v="0" actId="478"/>
-          <ac:picMkLst>
-            <pc:docMk/>
-            <pc:sldMk cId="2138951838" sldId="256"/>
-            <ac:picMk id="7" creationId="{79C4AF74-370E-74A0-1057-C3C02BDD8249}"/>
-          </ac:picMkLst>
-        </pc:picChg>
-        <pc:picChg chg="del">
-          <ac:chgData name="Kate Petrova" userId="c80717b8-7058-4b58-b873-df9e70b40da1" providerId="ADAL" clId="{858BC516-A270-9846-B3B8-AB087C73F9E4}" dt="2023-08-16T00:54:40.148" v="0" actId="478"/>
-          <ac:picMkLst>
-            <pc:docMk/>
-            <pc:sldMk cId="2138951838" sldId="256"/>
-            <ac:picMk id="9" creationId="{2E8E8AE6-DD8D-8A9E-04E7-9C9F72D8ECB0}"/>
-          </ac:picMkLst>
-        </pc:picChg>
-        <pc:picChg chg="add mod">
-          <ac:chgData name="Kate Petrova" userId="c80717b8-7058-4b58-b873-df9e70b40da1" providerId="ADAL" clId="{858BC516-A270-9846-B3B8-AB087C73F9E4}" dt="2023-08-16T00:55:24.352" v="11" actId="1076"/>
-          <ac:picMkLst>
-            <pc:docMk/>
-            <pc:sldMk cId="2138951838" sldId="256"/>
-            <ac:picMk id="11" creationId="{41FA07A9-D958-A767-7304-968BE9E736E8}"/>
-          </ac:picMkLst>
-        </pc:picChg>
-      </pc:sldChg>
-      <pc:sldChg chg="addSp delSp modSp mod">
-        <pc:chgData name="Kate Petrova" userId="c80717b8-7058-4b58-b873-df9e70b40da1" providerId="ADAL" clId="{858BC516-A270-9846-B3B8-AB087C73F9E4}" dt="2023-08-16T00:57:28.709" v="131" actId="1076"/>
-        <pc:sldMkLst>
-          <pc:docMk/>
-          <pc:sldMk cId="4167562173" sldId="257"/>
-        </pc:sldMkLst>
-        <pc:spChg chg="mod">
-          <ac:chgData name="Kate Petrova" userId="c80717b8-7058-4b58-b873-df9e70b40da1" providerId="ADAL" clId="{858BC516-A270-9846-B3B8-AB087C73F9E4}" dt="2023-08-16T00:57:28.709" v="131" actId="1076"/>
-          <ac:spMkLst>
-            <pc:docMk/>
-            <pc:sldMk cId="4167562173" sldId="257"/>
-            <ac:spMk id="10" creationId="{E672D5E3-A2C9-BBA7-4584-335F4BED5C3D}"/>
-          </ac:spMkLst>
-        </pc:spChg>
-        <pc:grpChg chg="add mod">
-          <ac:chgData name="Kate Petrova" userId="c80717b8-7058-4b58-b873-df9e70b40da1" providerId="ADAL" clId="{858BC516-A270-9846-B3B8-AB087C73F9E4}" dt="2023-08-16T00:55:37.592" v="14"/>
-          <ac:grpSpMkLst>
-            <pc:docMk/>
-            <pc:sldMk cId="4167562173" sldId="257"/>
-            <ac:grpSpMk id="2" creationId="{50B62CC8-4BCE-E41D-DF5C-85AB01D45C51}"/>
-          </ac:grpSpMkLst>
-        </pc:grpChg>
-        <pc:picChg chg="mod">
-          <ac:chgData name="Kate Petrova" userId="c80717b8-7058-4b58-b873-df9e70b40da1" providerId="ADAL" clId="{858BC516-A270-9846-B3B8-AB087C73F9E4}" dt="2023-08-16T00:55:37.592" v="14"/>
-          <ac:picMkLst>
-            <pc:docMk/>
-            <pc:sldMk cId="4167562173" sldId="257"/>
-            <ac:picMk id="3" creationId="{34355D89-984A-BA4F-A1D5-0573EA5C3D34}"/>
-          </ac:picMkLst>
-        </pc:picChg>
-        <pc:picChg chg="mod">
-          <ac:chgData name="Kate Petrova" userId="c80717b8-7058-4b58-b873-df9e70b40da1" providerId="ADAL" clId="{858BC516-A270-9846-B3B8-AB087C73F9E4}" dt="2023-08-16T00:55:37.592" v="14"/>
-          <ac:picMkLst>
-            <pc:docMk/>
-            <pc:sldMk cId="4167562173" sldId="257"/>
-            <ac:picMk id="4" creationId="{186C8922-22BD-A061-7666-BCA8D879DE22}"/>
-          </ac:picMkLst>
-        </pc:picChg>
-        <pc:picChg chg="del">
-          <ac:chgData name="Kate Petrova" userId="c80717b8-7058-4b58-b873-df9e70b40da1" providerId="ADAL" clId="{858BC516-A270-9846-B3B8-AB087C73F9E4}" dt="2023-08-16T00:55:37.172" v="13" actId="478"/>
-          <ac:picMkLst>
-            <pc:docMk/>
-            <pc:sldMk cId="4167562173" sldId="257"/>
-            <ac:picMk id="5" creationId="{181664E6-777A-1B4F-C33F-D31656C5F076}"/>
-          </ac:picMkLst>
-        </pc:picChg>
-        <pc:picChg chg="mod">
-          <ac:chgData name="Kate Petrova" userId="c80717b8-7058-4b58-b873-df9e70b40da1" providerId="ADAL" clId="{858BC516-A270-9846-B3B8-AB087C73F9E4}" dt="2023-08-16T00:55:37.592" v="14"/>
-          <ac:picMkLst>
-            <pc:docMk/>
-            <pc:sldMk cId="4167562173" sldId="257"/>
-            <ac:picMk id="6" creationId="{94402BDE-9005-DB29-E0AA-0D675E4CA8B2}"/>
-          </ac:picMkLst>
-        </pc:picChg>
-        <pc:picChg chg="del">
-          <ac:chgData name="Kate Petrova" userId="c80717b8-7058-4b58-b873-df9e70b40da1" providerId="ADAL" clId="{858BC516-A270-9846-B3B8-AB087C73F9E4}" dt="2023-08-16T00:55:37.172" v="13" actId="478"/>
-          <ac:picMkLst>
-            <pc:docMk/>
-            <pc:sldMk cId="4167562173" sldId="257"/>
-            <ac:picMk id="7" creationId="{79C4AF74-370E-74A0-1057-C3C02BDD8249}"/>
-          </ac:picMkLst>
-        </pc:picChg>
-        <pc:picChg chg="del">
-          <ac:chgData name="Kate Petrova" userId="c80717b8-7058-4b58-b873-df9e70b40da1" providerId="ADAL" clId="{858BC516-A270-9846-B3B8-AB087C73F9E4}" dt="2023-08-16T00:55:37.172" v="13" actId="478"/>
-          <ac:picMkLst>
-            <pc:docMk/>
-            <pc:sldMk cId="4167562173" sldId="257"/>
-            <ac:picMk id="9" creationId="{2E8E8AE6-DD8D-8A9E-04E7-9C9F72D8ECB0}"/>
-          </ac:picMkLst>
-        </pc:picChg>
-      </pc:sldChg>
-      <pc:sldChg chg="addSp delSp modSp mod">
-        <pc:chgData name="Kate Petrova" userId="c80717b8-7058-4b58-b873-df9e70b40da1" providerId="ADAL" clId="{858BC516-A270-9846-B3B8-AB087C73F9E4}" dt="2023-08-16T00:57:24.468" v="130" actId="1076"/>
-        <pc:sldMkLst>
-          <pc:docMk/>
-          <pc:sldMk cId="453905949" sldId="258"/>
-        </pc:sldMkLst>
-        <pc:spChg chg="mod">
-          <ac:chgData name="Kate Petrova" userId="c80717b8-7058-4b58-b873-df9e70b40da1" providerId="ADAL" clId="{858BC516-A270-9846-B3B8-AB087C73F9E4}" dt="2023-08-16T00:57:24.468" v="130" actId="1076"/>
-          <ac:spMkLst>
-            <pc:docMk/>
-            <pc:sldMk cId="453905949" sldId="258"/>
-            <ac:spMk id="10" creationId="{E672D5E3-A2C9-BBA7-4584-335F4BED5C3D}"/>
-          </ac:spMkLst>
-        </pc:spChg>
-        <pc:grpChg chg="add mod">
-          <ac:chgData name="Kate Petrova" userId="c80717b8-7058-4b58-b873-df9e70b40da1" providerId="ADAL" clId="{858BC516-A270-9846-B3B8-AB087C73F9E4}" dt="2023-08-16T00:56:49.766" v="83"/>
-          <ac:grpSpMkLst>
-            <pc:docMk/>
-            <pc:sldMk cId="453905949" sldId="258"/>
-            <ac:grpSpMk id="3" creationId="{B655C751-E5B3-91A2-35E8-29D38BF5F2A1}"/>
-          </ac:grpSpMkLst>
-        </pc:grpChg>
-        <pc:picChg chg="mod">
-          <ac:chgData name="Kate Petrova" userId="c80717b8-7058-4b58-b873-df9e70b40da1" providerId="ADAL" clId="{858BC516-A270-9846-B3B8-AB087C73F9E4}" dt="2023-08-16T00:56:49.766" v="83"/>
-          <ac:picMkLst>
-            <pc:docMk/>
-            <pc:sldMk cId="453905949" sldId="258"/>
-            <ac:picMk id="4" creationId="{69372D1C-1335-C2CC-C3AC-31064E67E55C}"/>
-          </ac:picMkLst>
-        </pc:picChg>
-        <pc:picChg chg="del">
-          <ac:chgData name="Kate Petrova" userId="c80717b8-7058-4b58-b873-df9e70b40da1" providerId="ADAL" clId="{858BC516-A270-9846-B3B8-AB087C73F9E4}" dt="2023-08-16T00:56:49.319" v="82" actId="478"/>
-          <ac:picMkLst>
-            <pc:docMk/>
-            <pc:sldMk cId="453905949" sldId="258"/>
-            <ac:picMk id="5" creationId="{181664E6-777A-1B4F-C33F-D31656C5F076}"/>
-          </ac:picMkLst>
-        </pc:picChg>
-        <pc:picChg chg="mod">
-          <ac:chgData name="Kate Petrova" userId="c80717b8-7058-4b58-b873-df9e70b40da1" providerId="ADAL" clId="{858BC516-A270-9846-B3B8-AB087C73F9E4}" dt="2023-08-16T00:56:49.766" v="83"/>
-          <ac:picMkLst>
-            <pc:docMk/>
-            <pc:sldMk cId="453905949" sldId="258"/>
-            <ac:picMk id="6" creationId="{9592AFA3-4107-4877-08BE-D9AEF1511E3F}"/>
-          </ac:picMkLst>
-        </pc:picChg>
-        <pc:picChg chg="del">
-          <ac:chgData name="Kate Petrova" userId="c80717b8-7058-4b58-b873-df9e70b40da1" providerId="ADAL" clId="{858BC516-A270-9846-B3B8-AB087C73F9E4}" dt="2023-08-16T00:56:49.319" v="82" actId="478"/>
-          <ac:picMkLst>
-            <pc:docMk/>
-            <pc:sldMk cId="453905949" sldId="258"/>
-            <ac:picMk id="7" creationId="{79C4AF74-370E-74A0-1057-C3C02BDD8249}"/>
-          </ac:picMkLst>
-        </pc:picChg>
-        <pc:picChg chg="mod">
-          <ac:chgData name="Kate Petrova" userId="c80717b8-7058-4b58-b873-df9e70b40da1" providerId="ADAL" clId="{858BC516-A270-9846-B3B8-AB087C73F9E4}" dt="2023-08-16T00:56:49.766" v="83"/>
-          <ac:picMkLst>
-            <pc:docMk/>
-            <pc:sldMk cId="453905949" sldId="258"/>
-            <ac:picMk id="8" creationId="{46C9B3E8-E642-DD80-EAF2-8CF534274F62}"/>
-          </ac:picMkLst>
-        </pc:picChg>
-        <pc:picChg chg="del">
-          <ac:chgData name="Kate Petrova" userId="c80717b8-7058-4b58-b873-df9e70b40da1" providerId="ADAL" clId="{858BC516-A270-9846-B3B8-AB087C73F9E4}" dt="2023-08-16T00:56:49.319" v="82" actId="478"/>
-          <ac:picMkLst>
-            <pc:docMk/>
-            <pc:sldMk cId="453905949" sldId="258"/>
-            <ac:picMk id="9" creationId="{2E8E8AE6-DD8D-8A9E-04E7-9C9F72D8ECB0}"/>
-          </ac:picMkLst>
-        </pc:picChg>
-      </pc:sldChg>
-      <pc:sldChg chg="delSp modSp mod">
-        <pc:chgData name="Kate Petrova" userId="c80717b8-7058-4b58-b873-df9e70b40da1" providerId="ADAL" clId="{858BC516-A270-9846-B3B8-AB087C73F9E4}" dt="2023-08-16T00:58:12.549" v="149" actId="1076"/>
-        <pc:sldMkLst>
-          <pc:docMk/>
-          <pc:sldMk cId="1582665338" sldId="259"/>
-        </pc:sldMkLst>
-        <pc:spChg chg="mod">
-          <ac:chgData name="Kate Petrova" userId="c80717b8-7058-4b58-b873-df9e70b40da1" providerId="ADAL" clId="{858BC516-A270-9846-B3B8-AB087C73F9E4}" dt="2023-08-16T00:58:04.068" v="148" actId="1076"/>
-          <ac:spMkLst>
-            <pc:docMk/>
-            <pc:sldMk cId="1582665338" sldId="259"/>
-            <ac:spMk id="2" creationId="{9EF06329-ACB7-D738-90A9-0932CBFF51C1}"/>
-          </ac:spMkLst>
-        </pc:spChg>
-        <pc:spChg chg="mod">
-          <ac:chgData name="Kate Petrova" userId="c80717b8-7058-4b58-b873-df9e70b40da1" providerId="ADAL" clId="{858BC516-A270-9846-B3B8-AB087C73F9E4}" dt="2023-08-16T00:57:52.033" v="145" actId="403"/>
-          <ac:spMkLst>
-            <pc:docMk/>
-            <pc:sldMk cId="1582665338" sldId="259"/>
-            <ac:spMk id="10" creationId="{E672D5E3-A2C9-BBA7-4584-335F4BED5C3D}"/>
-          </ac:spMkLst>
-        </pc:spChg>
-        <pc:spChg chg="del">
-          <ac:chgData name="Kate Petrova" userId="c80717b8-7058-4b58-b873-df9e70b40da1" providerId="ADAL" clId="{858BC516-A270-9846-B3B8-AB087C73F9E4}" dt="2023-08-16T00:57:58.868" v="147" actId="478"/>
-          <ac:spMkLst>
-            <pc:docMk/>
-            <pc:sldMk cId="1582665338" sldId="259"/>
-            <ac:spMk id="13" creationId="{694B2A92-4BF0-84A7-CCA5-85D945FF57BC}"/>
-          </ac:spMkLst>
-        </pc:spChg>
-        <pc:spChg chg="mod">
-          <ac:chgData name="Kate Petrova" userId="c80717b8-7058-4b58-b873-df9e70b40da1" providerId="ADAL" clId="{858BC516-A270-9846-B3B8-AB087C73F9E4}" dt="2023-08-16T00:58:12.549" v="149" actId="1076"/>
-          <ac:spMkLst>
-            <pc:docMk/>
-            <pc:sldMk cId="1582665338" sldId="259"/>
-            <ac:spMk id="14" creationId="{C1889260-267D-DBC9-53EA-FAA6DD94C2C3}"/>
-          </ac:spMkLst>
-        </pc:spChg>
-        <pc:picChg chg="mod">
-          <ac:chgData name="Kate Petrova" userId="c80717b8-7058-4b58-b873-df9e70b40da1" providerId="ADAL" clId="{858BC516-A270-9846-B3B8-AB087C73F9E4}" dt="2023-08-16T00:58:04.068" v="148" actId="1076"/>
-          <ac:picMkLst>
-            <pc:docMk/>
-            <pc:sldMk cId="1582665338" sldId="259"/>
-            <ac:picMk id="4" creationId="{6140BEA3-1763-00C8-0FDF-624247D4697F}"/>
-          </ac:picMkLst>
-        </pc:picChg>
-        <pc:picChg chg="del">
-          <ac:chgData name="Kate Petrova" userId="c80717b8-7058-4b58-b873-df9e70b40da1" providerId="ADAL" clId="{858BC516-A270-9846-B3B8-AB087C73F9E4}" dt="2023-08-16T00:57:56.729" v="146" actId="478"/>
-          <ac:picMkLst>
-            <pc:docMk/>
-            <pc:sldMk cId="1582665338" sldId="259"/>
-            <ac:picMk id="8" creationId="{88CCAE23-9835-0F70-605E-4BF4B0A22381}"/>
-          </ac:picMkLst>
-        </pc:picChg>
-        <pc:picChg chg="mod">
-          <ac:chgData name="Kate Petrova" userId="c80717b8-7058-4b58-b873-df9e70b40da1" providerId="ADAL" clId="{858BC516-A270-9846-B3B8-AB087C73F9E4}" dt="2023-08-16T00:58:12.549" v="149" actId="1076"/>
-          <ac:picMkLst>
-            <pc:docMk/>
-            <pc:sldMk cId="1582665338" sldId="259"/>
-            <ac:picMk id="12" creationId="{5DDFCF3B-8BF3-B139-5219-81243A798D5F}"/>
-          </ac:picMkLst>
-        </pc:picChg>
-      </pc:sldChg>
-      <pc:sldChg chg="addSp delSp modSp mod">
-        <pc:chgData name="Kate Petrova" userId="c80717b8-7058-4b58-b873-df9e70b40da1" providerId="ADAL" clId="{858BC516-A270-9846-B3B8-AB087C73F9E4}" dt="2023-08-16T00:59:10.531" v="171"/>
-        <pc:sldMkLst>
-          <pc:docMk/>
-          <pc:sldMk cId="2991160902" sldId="260"/>
-        </pc:sldMkLst>
-        <pc:spChg chg="mod">
-          <ac:chgData name="Kate Petrova" userId="c80717b8-7058-4b58-b873-df9e70b40da1" providerId="ADAL" clId="{858BC516-A270-9846-B3B8-AB087C73F9E4}" dt="2023-08-16T00:59:03.580" v="169" actId="1076"/>
-          <ac:spMkLst>
-            <pc:docMk/>
-            <pc:sldMk cId="2991160902" sldId="260"/>
-            <ac:spMk id="10" creationId="{E672D5E3-A2C9-BBA7-4584-335F4BED5C3D}"/>
-          </ac:spMkLst>
-        </pc:spChg>
-        <pc:grpChg chg="add mod">
-          <ac:chgData name="Kate Petrova" userId="c80717b8-7058-4b58-b873-df9e70b40da1" providerId="ADAL" clId="{858BC516-A270-9846-B3B8-AB087C73F9E4}" dt="2023-08-16T00:59:10.531" v="171"/>
-          <ac:grpSpMkLst>
-            <pc:docMk/>
-            <pc:sldMk cId="2991160902" sldId="260"/>
-            <ac:grpSpMk id="2" creationId="{B9A100D4-67B1-7791-2E36-171429BFD138}"/>
-          </ac:grpSpMkLst>
-        </pc:grpChg>
-        <pc:picChg chg="mod">
-          <ac:chgData name="Kate Petrova" userId="c80717b8-7058-4b58-b873-df9e70b40da1" providerId="ADAL" clId="{858BC516-A270-9846-B3B8-AB087C73F9E4}" dt="2023-08-16T00:59:10.531" v="171"/>
-          <ac:picMkLst>
-            <pc:docMk/>
-            <pc:sldMk cId="2991160902" sldId="260"/>
-            <ac:picMk id="3" creationId="{C6D7871D-CC23-DE42-9813-CBE0E58527BA}"/>
-          </ac:picMkLst>
-        </pc:picChg>
-        <pc:picChg chg="mod">
-          <ac:chgData name="Kate Petrova" userId="c80717b8-7058-4b58-b873-df9e70b40da1" providerId="ADAL" clId="{858BC516-A270-9846-B3B8-AB087C73F9E4}" dt="2023-08-16T00:59:10.531" v="171"/>
-          <ac:picMkLst>
-            <pc:docMk/>
-            <pc:sldMk cId="2991160902" sldId="260"/>
-            <ac:picMk id="4" creationId="{0DC8A324-8AD9-B1EA-D3C0-FF0D3E1FDE5C}"/>
-          </ac:picMkLst>
-        </pc:picChg>
-        <pc:picChg chg="del">
-          <ac:chgData name="Kate Petrova" userId="c80717b8-7058-4b58-b873-df9e70b40da1" providerId="ADAL" clId="{858BC516-A270-9846-B3B8-AB087C73F9E4}" dt="2023-08-16T00:59:10.151" v="170" actId="478"/>
-          <ac:picMkLst>
-            <pc:docMk/>
-            <pc:sldMk cId="2991160902" sldId="260"/>
-            <ac:picMk id="5" creationId="{181664E6-777A-1B4F-C33F-D31656C5F076}"/>
-          </ac:picMkLst>
-        </pc:picChg>
-        <pc:picChg chg="mod">
-          <ac:chgData name="Kate Petrova" userId="c80717b8-7058-4b58-b873-df9e70b40da1" providerId="ADAL" clId="{858BC516-A270-9846-B3B8-AB087C73F9E4}" dt="2023-08-16T00:59:10.531" v="171"/>
-          <ac:picMkLst>
-            <pc:docMk/>
-            <pc:sldMk cId="2991160902" sldId="260"/>
-            <ac:picMk id="6" creationId="{57B8D6FC-C886-84A5-A2EC-C996C113E9E5}"/>
-          </ac:picMkLst>
-        </pc:picChg>
-        <pc:picChg chg="del">
-          <ac:chgData name="Kate Petrova" userId="c80717b8-7058-4b58-b873-df9e70b40da1" providerId="ADAL" clId="{858BC516-A270-9846-B3B8-AB087C73F9E4}" dt="2023-08-16T00:59:10.151" v="170" actId="478"/>
-          <ac:picMkLst>
-            <pc:docMk/>
-            <pc:sldMk cId="2991160902" sldId="260"/>
-            <ac:picMk id="7" creationId="{79C4AF74-370E-74A0-1057-C3C02BDD8249}"/>
-          </ac:picMkLst>
-        </pc:picChg>
-        <pc:picChg chg="del">
-          <ac:chgData name="Kate Petrova" userId="c80717b8-7058-4b58-b873-df9e70b40da1" providerId="ADAL" clId="{858BC516-A270-9846-B3B8-AB087C73F9E4}" dt="2023-08-16T00:59:10.151" v="170" actId="478"/>
-          <ac:picMkLst>
-            <pc:docMk/>
-            <pc:sldMk cId="2991160902" sldId="260"/>
-            <ac:picMk id="9" creationId="{2E8E8AE6-DD8D-8A9E-04E7-9C9F72D8ECB0}"/>
-          </ac:picMkLst>
-        </pc:picChg>
-      </pc:sldChg>
-      <pc:sldChg chg="modSp mod">
-        <pc:chgData name="Kate Petrova" userId="c80717b8-7058-4b58-b873-df9e70b40da1" providerId="ADAL" clId="{858BC516-A270-9846-B3B8-AB087C73F9E4}" dt="2023-08-16T01:05:32.557" v="759" actId="1076"/>
-        <pc:sldMkLst>
-          <pc:docMk/>
-          <pc:sldMk cId="765621577" sldId="262"/>
-        </pc:sldMkLst>
-        <pc:spChg chg="mod">
-          <ac:chgData name="Kate Petrova" userId="c80717b8-7058-4b58-b873-df9e70b40da1" providerId="ADAL" clId="{858BC516-A270-9846-B3B8-AB087C73F9E4}" dt="2023-08-16T01:05:32.557" v="759" actId="1076"/>
-          <ac:spMkLst>
-            <pc:docMk/>
-            <pc:sldMk cId="765621577" sldId="262"/>
-            <ac:spMk id="10" creationId="{E672D5E3-A2C9-BBA7-4584-335F4BED5C3D}"/>
-          </ac:spMkLst>
-        </pc:spChg>
-      </pc:sldChg>
-      <pc:sldChg chg="modSp add mod">
-        <pc:chgData name="Kate Petrova" userId="c80717b8-7058-4b58-b873-df9e70b40da1" providerId="ADAL" clId="{858BC516-A270-9846-B3B8-AB087C73F9E4}" dt="2023-08-16T01:00:03.986" v="327" actId="1076"/>
-        <pc:sldMkLst>
-          <pc:docMk/>
-          <pc:sldMk cId="115648664" sldId="263"/>
-        </pc:sldMkLst>
-        <pc:spChg chg="mod">
-          <ac:chgData name="Kate Petrova" userId="c80717b8-7058-4b58-b873-df9e70b40da1" providerId="ADAL" clId="{858BC516-A270-9846-B3B8-AB087C73F9E4}" dt="2023-08-16T01:00:03.986" v="327" actId="1076"/>
-          <ac:spMkLst>
-            <pc:docMk/>
-            <pc:sldMk cId="115648664" sldId="263"/>
-            <ac:spMk id="10" creationId="{E672D5E3-A2C9-BBA7-4584-335F4BED5C3D}"/>
-          </ac:spMkLst>
-        </pc:spChg>
-      </pc:sldChg>
-      <pc:sldChg chg="addSp delSp modSp add mod">
-        <pc:chgData name="Kate Petrova" userId="c80717b8-7058-4b58-b873-df9e70b40da1" providerId="ADAL" clId="{858BC516-A270-9846-B3B8-AB087C73F9E4}" dt="2023-08-16T01:05:13.072" v="755" actId="113"/>
-        <pc:sldMkLst>
-          <pc:docMk/>
-          <pc:sldMk cId="3195152792" sldId="264"/>
-        </pc:sldMkLst>
-        <pc:spChg chg="add del mod">
-          <ac:chgData name="Kate Petrova" userId="c80717b8-7058-4b58-b873-df9e70b40da1" providerId="ADAL" clId="{858BC516-A270-9846-B3B8-AB087C73F9E4}" dt="2023-08-16T01:05:13.072" v="755" actId="113"/>
-          <ac:spMkLst>
-            <pc:docMk/>
-            <pc:sldMk cId="3195152792" sldId="264"/>
-            <ac:spMk id="10" creationId="{E672D5E3-A2C9-BBA7-4584-335F4BED5C3D}"/>
-          </ac:spMkLst>
-        </pc:spChg>
-        <pc:grpChg chg="del">
-          <ac:chgData name="Kate Petrova" userId="c80717b8-7058-4b58-b873-df9e70b40da1" providerId="ADAL" clId="{858BC516-A270-9846-B3B8-AB087C73F9E4}" dt="2023-08-16T01:03:47.981" v="635" actId="478"/>
-          <ac:grpSpMkLst>
-            <pc:docMk/>
-            <pc:sldMk cId="3195152792" sldId="264"/>
-            <ac:grpSpMk id="2" creationId="{B9A100D4-67B1-7791-2E36-171429BFD138}"/>
-          </ac:grpSpMkLst>
-        </pc:grpChg>
-        <pc:picChg chg="add mod">
-          <ac:chgData name="Kate Petrova" userId="c80717b8-7058-4b58-b873-df9e70b40da1" providerId="ADAL" clId="{858BC516-A270-9846-B3B8-AB087C73F9E4}" dt="2023-08-16T01:04:29.074" v="642" actId="1076"/>
-          <ac:picMkLst>
-            <pc:docMk/>
-            <pc:sldMk cId="3195152792" sldId="264"/>
-            <ac:picMk id="7" creationId="{A0B2806A-81ED-59AA-2663-A762305B8F33}"/>
-          </ac:picMkLst>
-        </pc:picChg>
-      </pc:sldChg>
-      <pc:sldChg chg="addSp delSp modSp new mod">
-        <pc:chgData name="Kate Petrova" userId="c80717b8-7058-4b58-b873-df9e70b40da1" providerId="ADAL" clId="{858BC516-A270-9846-B3B8-AB087C73F9E4}" dt="2023-08-16T01:03:36.402" v="634" actId="1076"/>
-        <pc:sldMkLst>
-          <pc:docMk/>
-          <pc:sldMk cId="1269721692" sldId="265"/>
-        </pc:sldMkLst>
-        <pc:spChg chg="del">
-          <ac:chgData name="Kate Petrova" userId="c80717b8-7058-4b58-b873-df9e70b40da1" providerId="ADAL" clId="{858BC516-A270-9846-B3B8-AB087C73F9E4}" dt="2023-08-16T01:02:25.439" v="483" actId="478"/>
-          <ac:spMkLst>
-            <pc:docMk/>
-            <pc:sldMk cId="1269721692" sldId="265"/>
-            <ac:spMk id="2" creationId="{855F7A37-04B1-7CA1-D6D9-2EA76A56533F}"/>
-          </ac:spMkLst>
-        </pc:spChg>
-        <pc:spChg chg="del">
-          <ac:chgData name="Kate Petrova" userId="c80717b8-7058-4b58-b873-df9e70b40da1" providerId="ADAL" clId="{858BC516-A270-9846-B3B8-AB087C73F9E4}" dt="2023-08-16T01:02:25.439" v="483" actId="478"/>
-          <ac:spMkLst>
-            <pc:docMk/>
-            <pc:sldMk cId="1269721692" sldId="265"/>
-            <ac:spMk id="3" creationId="{003B2096-A7AB-215A-3432-786E2C3C5C76}"/>
-          </ac:spMkLst>
-        </pc:spChg>
-        <pc:spChg chg="add mod">
-          <ac:chgData name="Kate Petrova" userId="c80717b8-7058-4b58-b873-df9e70b40da1" providerId="ADAL" clId="{858BC516-A270-9846-B3B8-AB087C73F9E4}" dt="2023-08-16T01:02:43.423" v="488" actId="1076"/>
-          <ac:spMkLst>
-            <pc:docMk/>
-            <pc:sldMk cId="1269721692" sldId="265"/>
-            <ac:spMk id="5" creationId="{2616AF94-6586-B8F8-9227-A3B0C6E3D5B1}"/>
-          </ac:spMkLst>
-        </pc:spChg>
-        <pc:spChg chg="add mod">
-          <ac:chgData name="Kate Petrova" userId="c80717b8-7058-4b58-b873-df9e70b40da1" providerId="ADAL" clId="{858BC516-A270-9846-B3B8-AB087C73F9E4}" dt="2023-08-16T01:03:34.480" v="633" actId="1076"/>
-          <ac:spMkLst>
-            <pc:docMk/>
-            <pc:sldMk cId="1269721692" sldId="265"/>
-            <ac:spMk id="10" creationId="{42EA7FC6-98C9-61B2-8487-D10F102499DD}"/>
-          </ac:spMkLst>
-        </pc:spChg>
-        <pc:grpChg chg="add mod">
-          <ac:chgData name="Kate Petrova" userId="c80717b8-7058-4b58-b873-df9e70b40da1" providerId="ADAL" clId="{858BC516-A270-9846-B3B8-AB087C73F9E4}" dt="2023-08-16T01:03:36.402" v="634" actId="1076"/>
-          <ac:grpSpMkLst>
-            <pc:docMk/>
-            <pc:sldMk cId="1269721692" sldId="265"/>
-            <ac:grpSpMk id="6" creationId="{13E4C0D8-BBA0-23DA-2346-3050551CC7F3}"/>
-          </ac:grpSpMkLst>
-        </pc:grpChg>
-        <pc:picChg chg="mod">
-          <ac:chgData name="Kate Petrova" userId="c80717b8-7058-4b58-b873-df9e70b40da1" providerId="ADAL" clId="{858BC516-A270-9846-B3B8-AB087C73F9E4}" dt="2023-08-16T01:02:47.503" v="489"/>
-          <ac:picMkLst>
-            <pc:docMk/>
-            <pc:sldMk cId="1269721692" sldId="265"/>
-            <ac:picMk id="7" creationId="{2B62F2AC-3461-C509-A6CC-CDE5EA2F8EB1}"/>
-          </ac:picMkLst>
-        </pc:picChg>
-        <pc:picChg chg="mod">
-          <ac:chgData name="Kate Petrova" userId="c80717b8-7058-4b58-b873-df9e70b40da1" providerId="ADAL" clId="{858BC516-A270-9846-B3B8-AB087C73F9E4}" dt="2023-08-16T01:02:47.503" v="489"/>
-          <ac:picMkLst>
-            <pc:docMk/>
-            <pc:sldMk cId="1269721692" sldId="265"/>
-            <ac:picMk id="8" creationId="{B3729B34-265B-1DEC-9ED8-CE3CB692D879}"/>
-          </ac:picMkLst>
-        </pc:picChg>
-        <pc:picChg chg="mod">
-          <ac:chgData name="Kate Petrova" userId="c80717b8-7058-4b58-b873-df9e70b40da1" providerId="ADAL" clId="{858BC516-A270-9846-B3B8-AB087C73F9E4}" dt="2023-08-16T01:02:47.503" v="489"/>
-          <ac:picMkLst>
-            <pc:docMk/>
-            <pc:sldMk cId="1269721692" sldId="265"/>
-            <ac:picMk id="9" creationId="{5EF6BEF0-8ABC-9F69-92A1-BBC778D6BC78}"/>
-          </ac:picMkLst>
-        </pc:picChg>
-      </pc:sldChg>
-    </pc:docChg>
-  </pc:docChgLst>
-</pc:chgInfo>
-</file>
-
 <file path=ppt/slideLayouts/slideLayout1.xml><?xml version="1.0" encoding="utf-8"?>
 <p:sldLayout xmlns:a="http://schemas.openxmlformats.org/drawingml/2006/main" xmlns:r="http://schemas.openxmlformats.org/officeDocument/2006/relationships" xmlns:p="http://schemas.openxmlformats.org/presentationml/2006/main" type="title" preserve="1">
   <p:cSld name="Title Slide">
@@ -795,7 +156,7 @@
           <p:cNvPr id="2" name="Title 1">
             <a:extLst>
               <a:ext uri="{FF2B5EF4-FFF2-40B4-BE49-F238E27FC236}">
-                <a16:creationId xmlns:a16="http://schemas.microsoft.com/office/drawing/2014/main" id="{49592794-8BCD-B8E6-6064-78EC4B862DCA}"/>
+                <a16:creationId xmlns:a16="http://schemas.microsoft.com/office/drawing/2014/main" id="{AA64181B-A5EE-ACD8-B340-EA4EAB8DAA5F}"/>
               </a:ext>
             </a:extLst>
           </p:cNvPr>
@@ -832,7 +193,7 @@
           <p:cNvPr id="3" name="Subtitle 2">
             <a:extLst>
               <a:ext uri="{FF2B5EF4-FFF2-40B4-BE49-F238E27FC236}">
-                <a16:creationId xmlns:a16="http://schemas.microsoft.com/office/drawing/2014/main" id="{AD84CEEF-14CC-CB3E-24BA-5617ECE5681C}"/>
+                <a16:creationId xmlns:a16="http://schemas.microsoft.com/office/drawing/2014/main" id="{C69B28A5-FE32-C282-AEB5-D663DD586DEB}"/>
               </a:ext>
             </a:extLst>
           </p:cNvPr>
@@ -902,7 +263,7 @@
           <p:cNvPr id="4" name="Date Placeholder 3">
             <a:extLst>
               <a:ext uri="{FF2B5EF4-FFF2-40B4-BE49-F238E27FC236}">
-                <a16:creationId xmlns:a16="http://schemas.microsoft.com/office/drawing/2014/main" id="{85EA7839-0F1A-E180-EA2E-BF6AB56ED692}"/>
+                <a16:creationId xmlns:a16="http://schemas.microsoft.com/office/drawing/2014/main" id="{5AD47FD0-F750-63FE-9EEF-DCB48C1F52A7}"/>
               </a:ext>
             </a:extLst>
           </p:cNvPr>
@@ -918,9 +279,9 @@
           <a:bodyPr/>
           <a:lstStyle/>
           <a:p>
-            <a:fld id="{F7C9C2BF-5698-3D41-8DA1-AAF2C5D51DF1}" type="datetimeFigureOut">
+            <a:fld id="{46E77216-CF56-224B-9168-653FEC0E6A33}" type="datetimeFigureOut">
               <a:rPr lang="en-US" smtClean="0"/>
-              <a:t>9/17/24</a:t>
+              <a:t>11/7/25</a:t>
             </a:fld>
             <a:endParaRPr lang="en-US"/>
           </a:p>
@@ -931,7 +292,7 @@
           <p:cNvPr id="5" name="Footer Placeholder 4">
             <a:extLst>
               <a:ext uri="{FF2B5EF4-FFF2-40B4-BE49-F238E27FC236}">
-                <a16:creationId xmlns:a16="http://schemas.microsoft.com/office/drawing/2014/main" id="{E991E879-E276-56F3-0E20-0CD7B2584F7B}"/>
+                <a16:creationId xmlns:a16="http://schemas.microsoft.com/office/drawing/2014/main" id="{F0DA01F1-F3F8-C5B4-5CF6-6F999C26AB87}"/>
               </a:ext>
             </a:extLst>
           </p:cNvPr>
@@ -956,7 +317,7 @@
           <p:cNvPr id="6" name="Slide Number Placeholder 5">
             <a:extLst>
               <a:ext uri="{FF2B5EF4-FFF2-40B4-BE49-F238E27FC236}">
-                <a16:creationId xmlns:a16="http://schemas.microsoft.com/office/drawing/2014/main" id="{615733BE-9FCB-256C-5E5E-BFBC0F1DAB9D}"/>
+                <a16:creationId xmlns:a16="http://schemas.microsoft.com/office/drawing/2014/main" id="{C3AC133C-895A-6F6E-1331-2D206B944464}"/>
               </a:ext>
             </a:extLst>
           </p:cNvPr>
@@ -972,7 +333,7 @@
           <a:bodyPr/>
           <a:lstStyle/>
           <a:p>
-            <a:fld id="{06CD3B0D-AC4D-7D45-81BA-4B752510DE80}" type="slidenum">
+            <a:fld id="{9C1C8766-F064-E741-A944-31E313370E28}" type="slidenum">
               <a:rPr lang="en-US" smtClean="0"/>
               <a:t>‹#›</a:t>
             </a:fld>
@@ -983,7 +344,7 @@
     </p:spTree>
     <p:extLst>
       <p:ext uri="{BB962C8B-B14F-4D97-AF65-F5344CB8AC3E}">
-        <p14:creationId xmlns:p14="http://schemas.microsoft.com/office/powerpoint/2010/main" val="1071989838"/>
+        <p14:creationId xmlns:p14="http://schemas.microsoft.com/office/powerpoint/2010/main" val="123116346"/>
       </p:ext>
     </p:extLst>
   </p:cSld>
@@ -1015,7 +376,7 @@
           <p:cNvPr id="2" name="Title 1">
             <a:extLst>
               <a:ext uri="{FF2B5EF4-FFF2-40B4-BE49-F238E27FC236}">
-                <a16:creationId xmlns:a16="http://schemas.microsoft.com/office/drawing/2014/main" id="{457E8EF1-9299-F7EF-CF9C-64A529AA946C}"/>
+                <a16:creationId xmlns:a16="http://schemas.microsoft.com/office/drawing/2014/main" id="{E47CF854-07B9-4B29-BA7A-54AE6ED9A440}"/>
               </a:ext>
             </a:extLst>
           </p:cNvPr>
@@ -1043,7 +404,7 @@
           <p:cNvPr id="3" name="Vertical Text Placeholder 2">
             <a:extLst>
               <a:ext uri="{FF2B5EF4-FFF2-40B4-BE49-F238E27FC236}">
-                <a16:creationId xmlns:a16="http://schemas.microsoft.com/office/drawing/2014/main" id="{5916D2BB-26EF-0638-933F-1A51AD3E424C}"/>
+                <a16:creationId xmlns:a16="http://schemas.microsoft.com/office/drawing/2014/main" id="{518AC580-B295-9BA0-5389-09771D1148BB}"/>
               </a:ext>
             </a:extLst>
           </p:cNvPr>
@@ -1100,7 +461,7 @@
           <p:cNvPr id="4" name="Date Placeholder 3">
             <a:extLst>
               <a:ext uri="{FF2B5EF4-FFF2-40B4-BE49-F238E27FC236}">
-                <a16:creationId xmlns:a16="http://schemas.microsoft.com/office/drawing/2014/main" id="{2B7AA0E5-E35E-A99C-2049-EB6C5A3AC15A}"/>
+                <a16:creationId xmlns:a16="http://schemas.microsoft.com/office/drawing/2014/main" id="{7F80196F-5444-E86F-FA40-A00A0C2E295C}"/>
               </a:ext>
             </a:extLst>
           </p:cNvPr>
@@ -1116,9 +477,9 @@
           <a:bodyPr/>
           <a:lstStyle/>
           <a:p>
-            <a:fld id="{F7C9C2BF-5698-3D41-8DA1-AAF2C5D51DF1}" type="datetimeFigureOut">
+            <a:fld id="{46E77216-CF56-224B-9168-653FEC0E6A33}" type="datetimeFigureOut">
               <a:rPr lang="en-US" smtClean="0"/>
-              <a:t>9/17/24</a:t>
+              <a:t>11/7/25</a:t>
             </a:fld>
             <a:endParaRPr lang="en-US"/>
           </a:p>
@@ -1129,7 +490,7 @@
           <p:cNvPr id="5" name="Footer Placeholder 4">
             <a:extLst>
               <a:ext uri="{FF2B5EF4-FFF2-40B4-BE49-F238E27FC236}">
-                <a16:creationId xmlns:a16="http://schemas.microsoft.com/office/drawing/2014/main" id="{51736D58-C80B-449D-D53A-7B8D1E598490}"/>
+                <a16:creationId xmlns:a16="http://schemas.microsoft.com/office/drawing/2014/main" id="{E2ADD018-68B4-827E-2452-ADA867A062A5}"/>
               </a:ext>
             </a:extLst>
           </p:cNvPr>
@@ -1154,7 +515,7 @@
           <p:cNvPr id="6" name="Slide Number Placeholder 5">
             <a:extLst>
               <a:ext uri="{FF2B5EF4-FFF2-40B4-BE49-F238E27FC236}">
-                <a16:creationId xmlns:a16="http://schemas.microsoft.com/office/drawing/2014/main" id="{B74A1599-7547-2C6E-FF50-A8F01AED37DB}"/>
+                <a16:creationId xmlns:a16="http://schemas.microsoft.com/office/drawing/2014/main" id="{8DB24A11-CA75-8AFC-74B1-F24FA987AB92}"/>
               </a:ext>
             </a:extLst>
           </p:cNvPr>
@@ -1170,7 +531,7 @@
           <a:bodyPr/>
           <a:lstStyle/>
           <a:p>
-            <a:fld id="{06CD3B0D-AC4D-7D45-81BA-4B752510DE80}" type="slidenum">
+            <a:fld id="{9C1C8766-F064-E741-A944-31E313370E28}" type="slidenum">
               <a:rPr lang="en-US" smtClean="0"/>
               <a:t>‹#›</a:t>
             </a:fld>
@@ -1181,7 +542,7 @@
     </p:spTree>
     <p:extLst>
       <p:ext uri="{BB962C8B-B14F-4D97-AF65-F5344CB8AC3E}">
-        <p14:creationId xmlns:p14="http://schemas.microsoft.com/office/powerpoint/2010/main" val="1306507914"/>
+        <p14:creationId xmlns:p14="http://schemas.microsoft.com/office/powerpoint/2010/main" val="827932196"/>
       </p:ext>
     </p:extLst>
   </p:cSld>
@@ -1213,7 +574,7 @@
           <p:cNvPr id="2" name="Vertical Title 1">
             <a:extLst>
               <a:ext uri="{FF2B5EF4-FFF2-40B4-BE49-F238E27FC236}">
-                <a16:creationId xmlns:a16="http://schemas.microsoft.com/office/drawing/2014/main" id="{FAD9F2BE-FEF7-3015-8159-8A3F24FEB64E}"/>
+                <a16:creationId xmlns:a16="http://schemas.microsoft.com/office/drawing/2014/main" id="{20C586D9-B49A-F2AE-DB38-FD32501ECB95}"/>
               </a:ext>
             </a:extLst>
           </p:cNvPr>
@@ -1246,7 +607,7 @@
           <p:cNvPr id="3" name="Vertical Text Placeholder 2">
             <a:extLst>
               <a:ext uri="{FF2B5EF4-FFF2-40B4-BE49-F238E27FC236}">
-                <a16:creationId xmlns:a16="http://schemas.microsoft.com/office/drawing/2014/main" id="{43C4CA7A-7533-0F13-A3AF-4D974978C3C0}"/>
+                <a16:creationId xmlns:a16="http://schemas.microsoft.com/office/drawing/2014/main" id="{49A78782-5042-3AB1-67AC-F765905BEE82}"/>
               </a:ext>
             </a:extLst>
           </p:cNvPr>
@@ -1308,7 +669,7 @@
           <p:cNvPr id="4" name="Date Placeholder 3">
             <a:extLst>
               <a:ext uri="{FF2B5EF4-FFF2-40B4-BE49-F238E27FC236}">
-                <a16:creationId xmlns:a16="http://schemas.microsoft.com/office/drawing/2014/main" id="{F77D8B54-BBF0-8042-2337-D0B8301C6BA8}"/>
+                <a16:creationId xmlns:a16="http://schemas.microsoft.com/office/drawing/2014/main" id="{43BB17A2-A2F9-603D-F143-08F71A0F8DAE}"/>
               </a:ext>
             </a:extLst>
           </p:cNvPr>
@@ -1324,9 +685,9 @@
           <a:bodyPr/>
           <a:lstStyle/>
           <a:p>
-            <a:fld id="{F7C9C2BF-5698-3D41-8DA1-AAF2C5D51DF1}" type="datetimeFigureOut">
+            <a:fld id="{46E77216-CF56-224B-9168-653FEC0E6A33}" type="datetimeFigureOut">
               <a:rPr lang="en-US" smtClean="0"/>
-              <a:t>9/17/24</a:t>
+              <a:t>11/7/25</a:t>
             </a:fld>
             <a:endParaRPr lang="en-US"/>
           </a:p>
@@ -1337,7 +698,7 @@
           <p:cNvPr id="5" name="Footer Placeholder 4">
             <a:extLst>
               <a:ext uri="{FF2B5EF4-FFF2-40B4-BE49-F238E27FC236}">
-                <a16:creationId xmlns:a16="http://schemas.microsoft.com/office/drawing/2014/main" id="{9D733E1A-663F-FBBB-A4A9-B9F18E82EE1F}"/>
+                <a16:creationId xmlns:a16="http://schemas.microsoft.com/office/drawing/2014/main" id="{DBA96153-AA04-EDBD-4276-A85BB9CEE698}"/>
               </a:ext>
             </a:extLst>
           </p:cNvPr>
@@ -1362,7 +723,7 @@
           <p:cNvPr id="6" name="Slide Number Placeholder 5">
             <a:extLst>
               <a:ext uri="{FF2B5EF4-FFF2-40B4-BE49-F238E27FC236}">
-                <a16:creationId xmlns:a16="http://schemas.microsoft.com/office/drawing/2014/main" id="{42F09132-A734-B3D7-B49F-CDBF50C81656}"/>
+                <a16:creationId xmlns:a16="http://schemas.microsoft.com/office/drawing/2014/main" id="{B6533D21-1D02-EFD4-F52C-D119CF89E99E}"/>
               </a:ext>
             </a:extLst>
           </p:cNvPr>
@@ -1378,7 +739,7 @@
           <a:bodyPr/>
           <a:lstStyle/>
           <a:p>
-            <a:fld id="{06CD3B0D-AC4D-7D45-81BA-4B752510DE80}" type="slidenum">
+            <a:fld id="{9C1C8766-F064-E741-A944-31E313370E28}" type="slidenum">
               <a:rPr lang="en-US" smtClean="0"/>
               <a:t>‹#›</a:t>
             </a:fld>
@@ -1389,7 +750,7 @@
     </p:spTree>
     <p:extLst>
       <p:ext uri="{BB962C8B-B14F-4D97-AF65-F5344CB8AC3E}">
-        <p14:creationId xmlns:p14="http://schemas.microsoft.com/office/powerpoint/2010/main" val="3670509664"/>
+        <p14:creationId xmlns:p14="http://schemas.microsoft.com/office/powerpoint/2010/main" val="1524456031"/>
       </p:ext>
     </p:extLst>
   </p:cSld>
@@ -1421,7 +782,7 @@
           <p:cNvPr id="2" name="Title 1">
             <a:extLst>
               <a:ext uri="{FF2B5EF4-FFF2-40B4-BE49-F238E27FC236}">
-                <a16:creationId xmlns:a16="http://schemas.microsoft.com/office/drawing/2014/main" id="{F98D58A1-9E70-0C54-3BA8-DCB57CED564B}"/>
+                <a16:creationId xmlns:a16="http://schemas.microsoft.com/office/drawing/2014/main" id="{0D526260-4FB9-FC87-AEDC-FCAD32D6ABDE}"/>
               </a:ext>
             </a:extLst>
           </p:cNvPr>
@@ -1449,7 +810,7 @@
           <p:cNvPr id="3" name="Content Placeholder 2">
             <a:extLst>
               <a:ext uri="{FF2B5EF4-FFF2-40B4-BE49-F238E27FC236}">
-                <a16:creationId xmlns:a16="http://schemas.microsoft.com/office/drawing/2014/main" id="{C0EE2545-08F4-60CD-9EBC-7BEB74DE9009}"/>
+                <a16:creationId xmlns:a16="http://schemas.microsoft.com/office/drawing/2014/main" id="{5C39000D-86A0-2910-9307-51DCBB88F83D}"/>
               </a:ext>
             </a:extLst>
           </p:cNvPr>
@@ -1506,7 +867,7 @@
           <p:cNvPr id="4" name="Date Placeholder 3">
             <a:extLst>
               <a:ext uri="{FF2B5EF4-FFF2-40B4-BE49-F238E27FC236}">
-                <a16:creationId xmlns:a16="http://schemas.microsoft.com/office/drawing/2014/main" id="{35068D29-2CAF-773B-FA3C-0ED57F13C872}"/>
+                <a16:creationId xmlns:a16="http://schemas.microsoft.com/office/drawing/2014/main" id="{B0F4FE73-BE13-B6F4-B2DE-BB3B6825A78B}"/>
               </a:ext>
             </a:extLst>
           </p:cNvPr>
@@ -1522,9 +883,9 @@
           <a:bodyPr/>
           <a:lstStyle/>
           <a:p>
-            <a:fld id="{F7C9C2BF-5698-3D41-8DA1-AAF2C5D51DF1}" type="datetimeFigureOut">
+            <a:fld id="{46E77216-CF56-224B-9168-653FEC0E6A33}" type="datetimeFigureOut">
               <a:rPr lang="en-US" smtClean="0"/>
-              <a:t>9/17/24</a:t>
+              <a:t>11/7/25</a:t>
             </a:fld>
             <a:endParaRPr lang="en-US"/>
           </a:p>
@@ -1535,7 +896,7 @@
           <p:cNvPr id="5" name="Footer Placeholder 4">
             <a:extLst>
               <a:ext uri="{FF2B5EF4-FFF2-40B4-BE49-F238E27FC236}">
-                <a16:creationId xmlns:a16="http://schemas.microsoft.com/office/drawing/2014/main" id="{D7CF0D73-1C62-76CD-89BD-75C6FEF7E8BC}"/>
+                <a16:creationId xmlns:a16="http://schemas.microsoft.com/office/drawing/2014/main" id="{580E9BB9-33F8-DF06-8D25-65BF954123F9}"/>
               </a:ext>
             </a:extLst>
           </p:cNvPr>
@@ -1560,7 +921,7 @@
           <p:cNvPr id="6" name="Slide Number Placeholder 5">
             <a:extLst>
               <a:ext uri="{FF2B5EF4-FFF2-40B4-BE49-F238E27FC236}">
-                <a16:creationId xmlns:a16="http://schemas.microsoft.com/office/drawing/2014/main" id="{05BD9C41-E2C2-3186-6B26-EB3E5979F775}"/>
+                <a16:creationId xmlns:a16="http://schemas.microsoft.com/office/drawing/2014/main" id="{CE5C8A9C-42E2-5CFE-89D8-AF66C880BA86}"/>
               </a:ext>
             </a:extLst>
           </p:cNvPr>
@@ -1576,7 +937,7 @@
           <a:bodyPr/>
           <a:lstStyle/>
           <a:p>
-            <a:fld id="{06CD3B0D-AC4D-7D45-81BA-4B752510DE80}" type="slidenum">
+            <a:fld id="{9C1C8766-F064-E741-A944-31E313370E28}" type="slidenum">
               <a:rPr lang="en-US" smtClean="0"/>
               <a:t>‹#›</a:t>
             </a:fld>
@@ -1587,7 +948,7 @@
     </p:spTree>
     <p:extLst>
       <p:ext uri="{BB962C8B-B14F-4D97-AF65-F5344CB8AC3E}">
-        <p14:creationId xmlns:p14="http://schemas.microsoft.com/office/powerpoint/2010/main" val="3195127824"/>
+        <p14:creationId xmlns:p14="http://schemas.microsoft.com/office/powerpoint/2010/main" val="521542098"/>
       </p:ext>
     </p:extLst>
   </p:cSld>
@@ -1619,7 +980,7 @@
           <p:cNvPr id="2" name="Title 1">
             <a:extLst>
               <a:ext uri="{FF2B5EF4-FFF2-40B4-BE49-F238E27FC236}">
-                <a16:creationId xmlns:a16="http://schemas.microsoft.com/office/drawing/2014/main" id="{33085B6D-4A53-FFED-2860-17DCE0E53999}"/>
+                <a16:creationId xmlns:a16="http://schemas.microsoft.com/office/drawing/2014/main" id="{A0FCD384-3108-FD9E-12C6-6B7A351B93A2}"/>
               </a:ext>
             </a:extLst>
           </p:cNvPr>
@@ -1656,7 +1017,7 @@
           <p:cNvPr id="3" name="Text Placeholder 2">
             <a:extLst>
               <a:ext uri="{FF2B5EF4-FFF2-40B4-BE49-F238E27FC236}">
-                <a16:creationId xmlns:a16="http://schemas.microsoft.com/office/drawing/2014/main" id="{535A2AAB-4302-608E-B357-F94FC7FE2765}"/>
+                <a16:creationId xmlns:a16="http://schemas.microsoft.com/office/drawing/2014/main" id="{D86FC9E5-068F-8C5E-8242-F9D298E0B793}"/>
               </a:ext>
             </a:extLst>
           </p:cNvPr>
@@ -1681,7 +1042,7 @@
               <a:defRPr sz="2400">
                 <a:solidFill>
                   <a:schemeClr val="tx1">
-                    <a:tint val="75000"/>
+                    <a:tint val="82000"/>
                   </a:schemeClr>
                 </a:solidFill>
               </a:defRPr>
@@ -1691,7 +1052,7 @@
               <a:defRPr sz="2000">
                 <a:solidFill>
                   <a:schemeClr val="tx1">
-                    <a:tint val="75000"/>
+                    <a:tint val="82000"/>
                   </a:schemeClr>
                 </a:solidFill>
               </a:defRPr>
@@ -1701,7 +1062,7 @@
               <a:defRPr sz="1800">
                 <a:solidFill>
                   <a:schemeClr val="tx1">
-                    <a:tint val="75000"/>
+                    <a:tint val="82000"/>
                   </a:schemeClr>
                 </a:solidFill>
               </a:defRPr>
@@ -1711,7 +1072,7 @@
               <a:defRPr sz="1600">
                 <a:solidFill>
                   <a:schemeClr val="tx1">
-                    <a:tint val="75000"/>
+                    <a:tint val="82000"/>
                   </a:schemeClr>
                 </a:solidFill>
               </a:defRPr>
@@ -1721,7 +1082,7 @@
               <a:defRPr sz="1600">
                 <a:solidFill>
                   <a:schemeClr val="tx1">
-                    <a:tint val="75000"/>
+                    <a:tint val="82000"/>
                   </a:schemeClr>
                 </a:solidFill>
               </a:defRPr>
@@ -1731,7 +1092,7 @@
               <a:defRPr sz="1600">
                 <a:solidFill>
                   <a:schemeClr val="tx1">
-                    <a:tint val="75000"/>
+                    <a:tint val="82000"/>
                   </a:schemeClr>
                 </a:solidFill>
               </a:defRPr>
@@ -1741,7 +1102,7 @@
               <a:defRPr sz="1600">
                 <a:solidFill>
                   <a:schemeClr val="tx1">
-                    <a:tint val="75000"/>
+                    <a:tint val="82000"/>
                   </a:schemeClr>
                 </a:solidFill>
               </a:defRPr>
@@ -1751,7 +1112,7 @@
               <a:defRPr sz="1600">
                 <a:solidFill>
                   <a:schemeClr val="tx1">
-                    <a:tint val="75000"/>
+                    <a:tint val="82000"/>
                   </a:schemeClr>
                 </a:solidFill>
               </a:defRPr>
@@ -1761,7 +1122,7 @@
               <a:defRPr sz="1600">
                 <a:solidFill>
                   <a:schemeClr val="tx1">
-                    <a:tint val="75000"/>
+                    <a:tint val="82000"/>
                   </a:schemeClr>
                 </a:solidFill>
               </a:defRPr>
@@ -1781,7 +1142,7 @@
           <p:cNvPr id="4" name="Date Placeholder 3">
             <a:extLst>
               <a:ext uri="{FF2B5EF4-FFF2-40B4-BE49-F238E27FC236}">
-                <a16:creationId xmlns:a16="http://schemas.microsoft.com/office/drawing/2014/main" id="{A3B5E579-1AFB-FDBB-B9A6-826DC05B8E84}"/>
+                <a16:creationId xmlns:a16="http://schemas.microsoft.com/office/drawing/2014/main" id="{752E7E52-1523-6E44-BACD-8752BE9E614D}"/>
               </a:ext>
             </a:extLst>
           </p:cNvPr>
@@ -1797,9 +1158,9 @@
           <a:bodyPr/>
           <a:lstStyle/>
           <a:p>
-            <a:fld id="{F7C9C2BF-5698-3D41-8DA1-AAF2C5D51DF1}" type="datetimeFigureOut">
+            <a:fld id="{46E77216-CF56-224B-9168-653FEC0E6A33}" type="datetimeFigureOut">
               <a:rPr lang="en-US" smtClean="0"/>
-              <a:t>9/17/24</a:t>
+              <a:t>11/7/25</a:t>
             </a:fld>
             <a:endParaRPr lang="en-US"/>
           </a:p>
@@ -1810,7 +1171,7 @@
           <p:cNvPr id="5" name="Footer Placeholder 4">
             <a:extLst>
               <a:ext uri="{FF2B5EF4-FFF2-40B4-BE49-F238E27FC236}">
-                <a16:creationId xmlns:a16="http://schemas.microsoft.com/office/drawing/2014/main" id="{24D5F363-B139-FA7D-73DA-2B722997E69C}"/>
+                <a16:creationId xmlns:a16="http://schemas.microsoft.com/office/drawing/2014/main" id="{A1A7BB62-16A9-F3B1-D696-B8C83B2849B1}"/>
               </a:ext>
             </a:extLst>
           </p:cNvPr>
@@ -1835,7 +1196,7 @@
           <p:cNvPr id="6" name="Slide Number Placeholder 5">
             <a:extLst>
               <a:ext uri="{FF2B5EF4-FFF2-40B4-BE49-F238E27FC236}">
-                <a16:creationId xmlns:a16="http://schemas.microsoft.com/office/drawing/2014/main" id="{E1BBAEAC-0AF8-61FA-DE05-58F3F30F2C3D}"/>
+                <a16:creationId xmlns:a16="http://schemas.microsoft.com/office/drawing/2014/main" id="{69416E47-8E8D-3F96-BE1F-16E58F6B4B11}"/>
               </a:ext>
             </a:extLst>
           </p:cNvPr>
@@ -1851,7 +1212,7 @@
           <a:bodyPr/>
           <a:lstStyle/>
           <a:p>
-            <a:fld id="{06CD3B0D-AC4D-7D45-81BA-4B752510DE80}" type="slidenum">
+            <a:fld id="{9C1C8766-F064-E741-A944-31E313370E28}" type="slidenum">
               <a:rPr lang="en-US" smtClean="0"/>
               <a:t>‹#›</a:t>
             </a:fld>
@@ -1862,7 +1223,7 @@
     </p:spTree>
     <p:extLst>
       <p:ext uri="{BB962C8B-B14F-4D97-AF65-F5344CB8AC3E}">
-        <p14:creationId xmlns:p14="http://schemas.microsoft.com/office/powerpoint/2010/main" val="3472859742"/>
+        <p14:creationId xmlns:p14="http://schemas.microsoft.com/office/powerpoint/2010/main" val="92423940"/>
       </p:ext>
     </p:extLst>
   </p:cSld>
@@ -1894,7 +1255,7 @@
           <p:cNvPr id="2" name="Title 1">
             <a:extLst>
               <a:ext uri="{FF2B5EF4-FFF2-40B4-BE49-F238E27FC236}">
-                <a16:creationId xmlns:a16="http://schemas.microsoft.com/office/drawing/2014/main" id="{6350BACC-2730-2623-8036-C78AD03AECE2}"/>
+                <a16:creationId xmlns:a16="http://schemas.microsoft.com/office/drawing/2014/main" id="{4DB08A91-1D51-167C-AFB4-6BF8253F58E2}"/>
               </a:ext>
             </a:extLst>
           </p:cNvPr>
@@ -1922,7 +1283,7 @@
           <p:cNvPr id="3" name="Content Placeholder 2">
             <a:extLst>
               <a:ext uri="{FF2B5EF4-FFF2-40B4-BE49-F238E27FC236}">
-                <a16:creationId xmlns:a16="http://schemas.microsoft.com/office/drawing/2014/main" id="{F1054A11-E539-6963-824E-94310622EBF6}"/>
+                <a16:creationId xmlns:a16="http://schemas.microsoft.com/office/drawing/2014/main" id="{AFBD2AE7-63F4-E0BF-A848-BC884FB5F311}"/>
               </a:ext>
             </a:extLst>
           </p:cNvPr>
@@ -1984,7 +1345,7 @@
           <p:cNvPr id="4" name="Content Placeholder 3">
             <a:extLst>
               <a:ext uri="{FF2B5EF4-FFF2-40B4-BE49-F238E27FC236}">
-                <a16:creationId xmlns:a16="http://schemas.microsoft.com/office/drawing/2014/main" id="{09A93C4C-2784-2F30-17E8-A7DA023FB7C2}"/>
+                <a16:creationId xmlns:a16="http://schemas.microsoft.com/office/drawing/2014/main" id="{E727AAEA-844E-8AA6-DE53-7D8CDF1D9A5F}"/>
               </a:ext>
             </a:extLst>
           </p:cNvPr>
@@ -2046,7 +1407,7 @@
           <p:cNvPr id="5" name="Date Placeholder 4">
             <a:extLst>
               <a:ext uri="{FF2B5EF4-FFF2-40B4-BE49-F238E27FC236}">
-                <a16:creationId xmlns:a16="http://schemas.microsoft.com/office/drawing/2014/main" id="{FC4B17CB-BAB7-5A4C-D89C-D3F6CB24A933}"/>
+                <a16:creationId xmlns:a16="http://schemas.microsoft.com/office/drawing/2014/main" id="{D7B1BFD4-0539-BBB3-5A51-C8DC29283640}"/>
               </a:ext>
             </a:extLst>
           </p:cNvPr>
@@ -2062,9 +1423,9 @@
           <a:bodyPr/>
           <a:lstStyle/>
           <a:p>
-            <a:fld id="{F7C9C2BF-5698-3D41-8DA1-AAF2C5D51DF1}" type="datetimeFigureOut">
+            <a:fld id="{46E77216-CF56-224B-9168-653FEC0E6A33}" type="datetimeFigureOut">
               <a:rPr lang="en-US" smtClean="0"/>
-              <a:t>9/17/24</a:t>
+              <a:t>11/7/25</a:t>
             </a:fld>
             <a:endParaRPr lang="en-US"/>
           </a:p>
@@ -2075,7 +1436,7 @@
           <p:cNvPr id="6" name="Footer Placeholder 5">
             <a:extLst>
               <a:ext uri="{FF2B5EF4-FFF2-40B4-BE49-F238E27FC236}">
-                <a16:creationId xmlns:a16="http://schemas.microsoft.com/office/drawing/2014/main" id="{755981C5-C6E1-C744-6B6F-E095AA96DBB3}"/>
+                <a16:creationId xmlns:a16="http://schemas.microsoft.com/office/drawing/2014/main" id="{4D0E72D4-33DA-4F0D-A270-7891353AD74A}"/>
               </a:ext>
             </a:extLst>
           </p:cNvPr>
@@ -2100,7 +1461,7 @@
           <p:cNvPr id="7" name="Slide Number Placeholder 6">
             <a:extLst>
               <a:ext uri="{FF2B5EF4-FFF2-40B4-BE49-F238E27FC236}">
-                <a16:creationId xmlns:a16="http://schemas.microsoft.com/office/drawing/2014/main" id="{2EA4E163-0662-ECE8-006B-08217506AF78}"/>
+                <a16:creationId xmlns:a16="http://schemas.microsoft.com/office/drawing/2014/main" id="{851D634B-4F3C-4FA9-891C-22D271B5506E}"/>
               </a:ext>
             </a:extLst>
           </p:cNvPr>
@@ -2116,7 +1477,7 @@
           <a:bodyPr/>
           <a:lstStyle/>
           <a:p>
-            <a:fld id="{06CD3B0D-AC4D-7D45-81BA-4B752510DE80}" type="slidenum">
+            <a:fld id="{9C1C8766-F064-E741-A944-31E313370E28}" type="slidenum">
               <a:rPr lang="en-US" smtClean="0"/>
               <a:t>‹#›</a:t>
             </a:fld>
@@ -2127,7 +1488,7 @@
     </p:spTree>
     <p:extLst>
       <p:ext uri="{BB962C8B-B14F-4D97-AF65-F5344CB8AC3E}">
-        <p14:creationId xmlns:p14="http://schemas.microsoft.com/office/powerpoint/2010/main" val="1927266330"/>
+        <p14:creationId xmlns:p14="http://schemas.microsoft.com/office/powerpoint/2010/main" val="2501063907"/>
       </p:ext>
     </p:extLst>
   </p:cSld>
@@ -2159,7 +1520,7 @@
           <p:cNvPr id="2" name="Title 1">
             <a:extLst>
               <a:ext uri="{FF2B5EF4-FFF2-40B4-BE49-F238E27FC236}">
-                <a16:creationId xmlns:a16="http://schemas.microsoft.com/office/drawing/2014/main" id="{F0C9C2D9-31C9-3E04-B237-C5A1EFD5E20D}"/>
+                <a16:creationId xmlns:a16="http://schemas.microsoft.com/office/drawing/2014/main" id="{26FBD71C-51CF-445A-4F70-18F8172BE5D7}"/>
               </a:ext>
             </a:extLst>
           </p:cNvPr>
@@ -2192,7 +1553,7 @@
           <p:cNvPr id="3" name="Text Placeholder 2">
             <a:extLst>
               <a:ext uri="{FF2B5EF4-FFF2-40B4-BE49-F238E27FC236}">
-                <a16:creationId xmlns:a16="http://schemas.microsoft.com/office/drawing/2014/main" id="{2D208834-2DDD-4302-3317-39A0AA8F97E4}"/>
+                <a16:creationId xmlns:a16="http://schemas.microsoft.com/office/drawing/2014/main" id="{12184F8B-1A6C-BCFD-7201-AFF034C875C2}"/>
               </a:ext>
             </a:extLst>
           </p:cNvPr>
@@ -2263,7 +1624,7 @@
           <p:cNvPr id="4" name="Content Placeholder 3">
             <a:extLst>
               <a:ext uri="{FF2B5EF4-FFF2-40B4-BE49-F238E27FC236}">
-                <a16:creationId xmlns:a16="http://schemas.microsoft.com/office/drawing/2014/main" id="{C364C9D9-369F-653E-C16A-C5A3558661B2}"/>
+                <a16:creationId xmlns:a16="http://schemas.microsoft.com/office/drawing/2014/main" id="{F572628F-AE88-93C3-26E9-BAEEF28754C2}"/>
               </a:ext>
             </a:extLst>
           </p:cNvPr>
@@ -2325,7 +1686,7 @@
           <p:cNvPr id="5" name="Text Placeholder 4">
             <a:extLst>
               <a:ext uri="{FF2B5EF4-FFF2-40B4-BE49-F238E27FC236}">
-                <a16:creationId xmlns:a16="http://schemas.microsoft.com/office/drawing/2014/main" id="{B08164D0-F1A8-F678-F823-286744345A12}"/>
+                <a16:creationId xmlns:a16="http://schemas.microsoft.com/office/drawing/2014/main" id="{4AEB41D2-9128-8CF8-FA73-CD5337A07EAA}"/>
               </a:ext>
             </a:extLst>
           </p:cNvPr>
@@ -2396,7 +1757,7 @@
           <p:cNvPr id="6" name="Content Placeholder 5">
             <a:extLst>
               <a:ext uri="{FF2B5EF4-FFF2-40B4-BE49-F238E27FC236}">
-                <a16:creationId xmlns:a16="http://schemas.microsoft.com/office/drawing/2014/main" id="{3FF7C8A4-BFBD-FEAE-A5AC-E30046A39193}"/>
+                <a16:creationId xmlns:a16="http://schemas.microsoft.com/office/drawing/2014/main" id="{C20A46BA-33EA-A634-7DD7-E9958C16B006}"/>
               </a:ext>
             </a:extLst>
           </p:cNvPr>
@@ -2458,7 +1819,7 @@
           <p:cNvPr id="7" name="Date Placeholder 6">
             <a:extLst>
               <a:ext uri="{FF2B5EF4-FFF2-40B4-BE49-F238E27FC236}">
-                <a16:creationId xmlns:a16="http://schemas.microsoft.com/office/drawing/2014/main" id="{8E9F5850-2FF0-A2DD-F129-48E5D3E10F3F}"/>
+                <a16:creationId xmlns:a16="http://schemas.microsoft.com/office/drawing/2014/main" id="{1DEA4FD1-E49E-C7D4-DDB0-0A0C350B722B}"/>
               </a:ext>
             </a:extLst>
           </p:cNvPr>
@@ -2474,9 +1835,9 @@
           <a:bodyPr/>
           <a:lstStyle/>
           <a:p>
-            <a:fld id="{F7C9C2BF-5698-3D41-8DA1-AAF2C5D51DF1}" type="datetimeFigureOut">
+            <a:fld id="{46E77216-CF56-224B-9168-653FEC0E6A33}" type="datetimeFigureOut">
               <a:rPr lang="en-US" smtClean="0"/>
-              <a:t>9/17/24</a:t>
+              <a:t>11/7/25</a:t>
             </a:fld>
             <a:endParaRPr lang="en-US"/>
           </a:p>
@@ -2487,7 +1848,7 @@
           <p:cNvPr id="8" name="Footer Placeholder 7">
             <a:extLst>
               <a:ext uri="{FF2B5EF4-FFF2-40B4-BE49-F238E27FC236}">
-                <a16:creationId xmlns:a16="http://schemas.microsoft.com/office/drawing/2014/main" id="{D6A0744D-9D79-E5A8-FA90-1CEE615CC3F3}"/>
+                <a16:creationId xmlns:a16="http://schemas.microsoft.com/office/drawing/2014/main" id="{2E3DC124-B515-69F5-FF63-D99D69E1AB7B}"/>
               </a:ext>
             </a:extLst>
           </p:cNvPr>
@@ -2512,7 +1873,7 @@
           <p:cNvPr id="9" name="Slide Number Placeholder 8">
             <a:extLst>
               <a:ext uri="{FF2B5EF4-FFF2-40B4-BE49-F238E27FC236}">
-                <a16:creationId xmlns:a16="http://schemas.microsoft.com/office/drawing/2014/main" id="{8437D98C-DC9D-3CD8-A1D2-E86614EEE029}"/>
+                <a16:creationId xmlns:a16="http://schemas.microsoft.com/office/drawing/2014/main" id="{28BC77DC-6B60-152F-1F40-644DD7A5C75A}"/>
               </a:ext>
             </a:extLst>
           </p:cNvPr>
@@ -2528,7 +1889,7 @@
           <a:bodyPr/>
           <a:lstStyle/>
           <a:p>
-            <a:fld id="{06CD3B0D-AC4D-7D45-81BA-4B752510DE80}" type="slidenum">
+            <a:fld id="{9C1C8766-F064-E741-A944-31E313370E28}" type="slidenum">
               <a:rPr lang="en-US" smtClean="0"/>
               <a:t>‹#›</a:t>
             </a:fld>
@@ -2539,7 +1900,7 @@
     </p:spTree>
     <p:extLst>
       <p:ext uri="{BB962C8B-B14F-4D97-AF65-F5344CB8AC3E}">
-        <p14:creationId xmlns:p14="http://schemas.microsoft.com/office/powerpoint/2010/main" val="653964850"/>
+        <p14:creationId xmlns:p14="http://schemas.microsoft.com/office/powerpoint/2010/main" val="1107916703"/>
       </p:ext>
     </p:extLst>
   </p:cSld>
@@ -2571,7 +1932,7 @@
           <p:cNvPr id="2" name="Title 1">
             <a:extLst>
               <a:ext uri="{FF2B5EF4-FFF2-40B4-BE49-F238E27FC236}">
-                <a16:creationId xmlns:a16="http://schemas.microsoft.com/office/drawing/2014/main" id="{1A2A6FAA-0FE2-1BE0-0BA3-9DFE86C52676}"/>
+                <a16:creationId xmlns:a16="http://schemas.microsoft.com/office/drawing/2014/main" id="{E3933008-23A9-7D3D-553B-A686E1512BC5}"/>
               </a:ext>
             </a:extLst>
           </p:cNvPr>
@@ -2599,7 +1960,7 @@
           <p:cNvPr id="3" name="Date Placeholder 2">
             <a:extLst>
               <a:ext uri="{FF2B5EF4-FFF2-40B4-BE49-F238E27FC236}">
-                <a16:creationId xmlns:a16="http://schemas.microsoft.com/office/drawing/2014/main" id="{E6DC3BC2-15EE-1BBC-47F5-BE6ACE779B96}"/>
+                <a16:creationId xmlns:a16="http://schemas.microsoft.com/office/drawing/2014/main" id="{348AD5B4-FDCB-B4BA-3033-D5A589D7DC42}"/>
               </a:ext>
             </a:extLst>
           </p:cNvPr>
@@ -2615,9 +1976,9 @@
           <a:bodyPr/>
           <a:lstStyle/>
           <a:p>
-            <a:fld id="{F7C9C2BF-5698-3D41-8DA1-AAF2C5D51DF1}" type="datetimeFigureOut">
+            <a:fld id="{46E77216-CF56-224B-9168-653FEC0E6A33}" type="datetimeFigureOut">
               <a:rPr lang="en-US" smtClean="0"/>
-              <a:t>9/17/24</a:t>
+              <a:t>11/7/25</a:t>
             </a:fld>
             <a:endParaRPr lang="en-US"/>
           </a:p>
@@ -2628,7 +1989,7 @@
           <p:cNvPr id="4" name="Footer Placeholder 3">
             <a:extLst>
               <a:ext uri="{FF2B5EF4-FFF2-40B4-BE49-F238E27FC236}">
-                <a16:creationId xmlns:a16="http://schemas.microsoft.com/office/drawing/2014/main" id="{687CC1DA-73C8-C7A9-6F9F-13A4EC5A982C}"/>
+                <a16:creationId xmlns:a16="http://schemas.microsoft.com/office/drawing/2014/main" id="{A4A49C8A-C1EA-F620-CC64-A4C202BE2342}"/>
               </a:ext>
             </a:extLst>
           </p:cNvPr>
@@ -2653,7 +2014,7 @@
           <p:cNvPr id="5" name="Slide Number Placeholder 4">
             <a:extLst>
               <a:ext uri="{FF2B5EF4-FFF2-40B4-BE49-F238E27FC236}">
-                <a16:creationId xmlns:a16="http://schemas.microsoft.com/office/drawing/2014/main" id="{A6853C3E-C020-3EC0-D975-A794480FBD3F}"/>
+                <a16:creationId xmlns:a16="http://schemas.microsoft.com/office/drawing/2014/main" id="{6889B5DE-7B63-6E56-932D-7117179C7A98}"/>
               </a:ext>
             </a:extLst>
           </p:cNvPr>
@@ -2669,7 +2030,7 @@
           <a:bodyPr/>
           <a:lstStyle/>
           <a:p>
-            <a:fld id="{06CD3B0D-AC4D-7D45-81BA-4B752510DE80}" type="slidenum">
+            <a:fld id="{9C1C8766-F064-E741-A944-31E313370E28}" type="slidenum">
               <a:rPr lang="en-US" smtClean="0"/>
               <a:t>‹#›</a:t>
             </a:fld>
@@ -2680,7 +2041,7 @@
     </p:spTree>
     <p:extLst>
       <p:ext uri="{BB962C8B-B14F-4D97-AF65-F5344CB8AC3E}">
-        <p14:creationId xmlns:p14="http://schemas.microsoft.com/office/powerpoint/2010/main" val="2130702160"/>
+        <p14:creationId xmlns:p14="http://schemas.microsoft.com/office/powerpoint/2010/main" val="1351521719"/>
       </p:ext>
     </p:extLst>
   </p:cSld>
@@ -2712,7 +2073,7 @@
           <p:cNvPr id="2" name="Date Placeholder 1">
             <a:extLst>
               <a:ext uri="{FF2B5EF4-FFF2-40B4-BE49-F238E27FC236}">
-                <a16:creationId xmlns:a16="http://schemas.microsoft.com/office/drawing/2014/main" id="{BC9CFACF-BDA6-0E3B-A421-5B1AF046A627}"/>
+                <a16:creationId xmlns:a16="http://schemas.microsoft.com/office/drawing/2014/main" id="{60BD0651-3619-5E7C-8325-01A146743CC2}"/>
               </a:ext>
             </a:extLst>
           </p:cNvPr>
@@ -2728,9 +2089,9 @@
           <a:bodyPr/>
           <a:lstStyle/>
           <a:p>
-            <a:fld id="{F7C9C2BF-5698-3D41-8DA1-AAF2C5D51DF1}" type="datetimeFigureOut">
+            <a:fld id="{46E77216-CF56-224B-9168-653FEC0E6A33}" type="datetimeFigureOut">
               <a:rPr lang="en-US" smtClean="0"/>
-              <a:t>9/17/24</a:t>
+              <a:t>11/7/25</a:t>
             </a:fld>
             <a:endParaRPr lang="en-US"/>
           </a:p>
@@ -2741,7 +2102,7 @@
           <p:cNvPr id="3" name="Footer Placeholder 2">
             <a:extLst>
               <a:ext uri="{FF2B5EF4-FFF2-40B4-BE49-F238E27FC236}">
-                <a16:creationId xmlns:a16="http://schemas.microsoft.com/office/drawing/2014/main" id="{93378913-C634-675B-573E-ACDE8642CFF3}"/>
+                <a16:creationId xmlns:a16="http://schemas.microsoft.com/office/drawing/2014/main" id="{15BDC4B9-E341-8F70-2FED-735DA5CE70FD}"/>
               </a:ext>
             </a:extLst>
           </p:cNvPr>
@@ -2766,7 +2127,7 @@
           <p:cNvPr id="4" name="Slide Number Placeholder 3">
             <a:extLst>
               <a:ext uri="{FF2B5EF4-FFF2-40B4-BE49-F238E27FC236}">
-                <a16:creationId xmlns:a16="http://schemas.microsoft.com/office/drawing/2014/main" id="{4F427D27-4D48-AF63-E14C-84AC1307B4A1}"/>
+                <a16:creationId xmlns:a16="http://schemas.microsoft.com/office/drawing/2014/main" id="{DAA16568-C7BB-0880-7875-446A0DDED873}"/>
               </a:ext>
             </a:extLst>
           </p:cNvPr>
@@ -2782,7 +2143,7 @@
           <a:bodyPr/>
           <a:lstStyle/>
           <a:p>
-            <a:fld id="{06CD3B0D-AC4D-7D45-81BA-4B752510DE80}" type="slidenum">
+            <a:fld id="{9C1C8766-F064-E741-A944-31E313370E28}" type="slidenum">
               <a:rPr lang="en-US" smtClean="0"/>
               <a:t>‹#›</a:t>
             </a:fld>
@@ -2793,7 +2154,7 @@
     </p:spTree>
     <p:extLst>
       <p:ext uri="{BB962C8B-B14F-4D97-AF65-F5344CB8AC3E}">
-        <p14:creationId xmlns:p14="http://schemas.microsoft.com/office/powerpoint/2010/main" val="388053011"/>
+        <p14:creationId xmlns:p14="http://schemas.microsoft.com/office/powerpoint/2010/main" val="3664891096"/>
       </p:ext>
     </p:extLst>
   </p:cSld>
@@ -2825,7 +2186,7 @@
           <p:cNvPr id="2" name="Title 1">
             <a:extLst>
               <a:ext uri="{FF2B5EF4-FFF2-40B4-BE49-F238E27FC236}">
-                <a16:creationId xmlns:a16="http://schemas.microsoft.com/office/drawing/2014/main" id="{ED725B83-8FC1-5318-92E2-B9A622BBFB3B}"/>
+                <a16:creationId xmlns:a16="http://schemas.microsoft.com/office/drawing/2014/main" id="{BD485BCF-AA9C-C878-4A0D-53BA3A1F58EE}"/>
               </a:ext>
             </a:extLst>
           </p:cNvPr>
@@ -2862,7 +2223,7 @@
           <p:cNvPr id="3" name="Content Placeholder 2">
             <a:extLst>
               <a:ext uri="{FF2B5EF4-FFF2-40B4-BE49-F238E27FC236}">
-                <a16:creationId xmlns:a16="http://schemas.microsoft.com/office/drawing/2014/main" id="{311B2441-8273-EDE5-915F-E28366B4801E}"/>
+                <a16:creationId xmlns:a16="http://schemas.microsoft.com/office/drawing/2014/main" id="{640E38B5-A1FA-B6D4-2F2D-179066423EC6}"/>
               </a:ext>
             </a:extLst>
           </p:cNvPr>
@@ -2952,7 +2313,7 @@
           <p:cNvPr id="4" name="Text Placeholder 3">
             <a:extLst>
               <a:ext uri="{FF2B5EF4-FFF2-40B4-BE49-F238E27FC236}">
-                <a16:creationId xmlns:a16="http://schemas.microsoft.com/office/drawing/2014/main" id="{AD166043-A17C-14E5-FAF7-361EC5C7DC88}"/>
+                <a16:creationId xmlns:a16="http://schemas.microsoft.com/office/drawing/2014/main" id="{6896A345-DFF1-DB71-E254-A3CE2E1628D3}"/>
               </a:ext>
             </a:extLst>
           </p:cNvPr>
@@ -3023,7 +2384,7 @@
           <p:cNvPr id="5" name="Date Placeholder 4">
             <a:extLst>
               <a:ext uri="{FF2B5EF4-FFF2-40B4-BE49-F238E27FC236}">
-                <a16:creationId xmlns:a16="http://schemas.microsoft.com/office/drawing/2014/main" id="{7FB6E27C-ABEE-D7A0-B52B-ADD3056F4E37}"/>
+                <a16:creationId xmlns:a16="http://schemas.microsoft.com/office/drawing/2014/main" id="{D448E498-5B4D-4FD5-D334-6FE146EFC19C}"/>
               </a:ext>
             </a:extLst>
           </p:cNvPr>
@@ -3039,9 +2400,9 @@
           <a:bodyPr/>
           <a:lstStyle/>
           <a:p>
-            <a:fld id="{F7C9C2BF-5698-3D41-8DA1-AAF2C5D51DF1}" type="datetimeFigureOut">
+            <a:fld id="{46E77216-CF56-224B-9168-653FEC0E6A33}" type="datetimeFigureOut">
               <a:rPr lang="en-US" smtClean="0"/>
-              <a:t>9/17/24</a:t>
+              <a:t>11/7/25</a:t>
             </a:fld>
             <a:endParaRPr lang="en-US"/>
           </a:p>
@@ -3052,7 +2413,7 @@
           <p:cNvPr id="6" name="Footer Placeholder 5">
             <a:extLst>
               <a:ext uri="{FF2B5EF4-FFF2-40B4-BE49-F238E27FC236}">
-                <a16:creationId xmlns:a16="http://schemas.microsoft.com/office/drawing/2014/main" id="{0947A8D2-F6DB-D845-E9F5-221FCAF660AB}"/>
+                <a16:creationId xmlns:a16="http://schemas.microsoft.com/office/drawing/2014/main" id="{033E504E-169C-3E2D-22CE-BC4762B129A6}"/>
               </a:ext>
             </a:extLst>
           </p:cNvPr>
@@ -3077,7 +2438,7 @@
           <p:cNvPr id="7" name="Slide Number Placeholder 6">
             <a:extLst>
               <a:ext uri="{FF2B5EF4-FFF2-40B4-BE49-F238E27FC236}">
-                <a16:creationId xmlns:a16="http://schemas.microsoft.com/office/drawing/2014/main" id="{86A74F63-3AD1-8D32-26CC-F1D18F21A9D2}"/>
+                <a16:creationId xmlns:a16="http://schemas.microsoft.com/office/drawing/2014/main" id="{13D37727-6290-EDBA-9233-ABB880DEB917}"/>
               </a:ext>
             </a:extLst>
           </p:cNvPr>
@@ -3093,7 +2454,7 @@
           <a:bodyPr/>
           <a:lstStyle/>
           <a:p>
-            <a:fld id="{06CD3B0D-AC4D-7D45-81BA-4B752510DE80}" type="slidenum">
+            <a:fld id="{9C1C8766-F064-E741-A944-31E313370E28}" type="slidenum">
               <a:rPr lang="en-US" smtClean="0"/>
               <a:t>‹#›</a:t>
             </a:fld>
@@ -3104,7 +2465,7 @@
     </p:spTree>
     <p:extLst>
       <p:ext uri="{BB962C8B-B14F-4D97-AF65-F5344CB8AC3E}">
-        <p14:creationId xmlns:p14="http://schemas.microsoft.com/office/powerpoint/2010/main" val="2546534911"/>
+        <p14:creationId xmlns:p14="http://schemas.microsoft.com/office/powerpoint/2010/main" val="545197216"/>
       </p:ext>
     </p:extLst>
   </p:cSld>
@@ -3136,7 +2497,7 @@
           <p:cNvPr id="2" name="Title 1">
             <a:extLst>
               <a:ext uri="{FF2B5EF4-FFF2-40B4-BE49-F238E27FC236}">
-                <a16:creationId xmlns:a16="http://schemas.microsoft.com/office/drawing/2014/main" id="{0CCC57AA-B095-8167-448D-B3F8930AE512}"/>
+                <a16:creationId xmlns:a16="http://schemas.microsoft.com/office/drawing/2014/main" id="{4A9B057A-C7B1-D1E2-73B1-8979E182910D}"/>
               </a:ext>
             </a:extLst>
           </p:cNvPr>
@@ -3173,7 +2534,7 @@
           <p:cNvPr id="3" name="Picture Placeholder 2">
             <a:extLst>
               <a:ext uri="{FF2B5EF4-FFF2-40B4-BE49-F238E27FC236}">
-                <a16:creationId xmlns:a16="http://schemas.microsoft.com/office/drawing/2014/main" id="{78AF2C09-2A40-DB07-E803-1C7E65E7CF8A}"/>
+                <a16:creationId xmlns:a16="http://schemas.microsoft.com/office/drawing/2014/main" id="{5F0A1E9A-7C3A-E4ED-C876-ED2F2E4F798D}"/>
               </a:ext>
             </a:extLst>
           </p:cNvPr>
@@ -3240,7 +2601,7 @@
           <p:cNvPr id="4" name="Text Placeholder 3">
             <a:extLst>
               <a:ext uri="{FF2B5EF4-FFF2-40B4-BE49-F238E27FC236}">
-                <a16:creationId xmlns:a16="http://schemas.microsoft.com/office/drawing/2014/main" id="{ACE0DC83-A2EF-730B-C03C-FCBDF5E50A70}"/>
+                <a16:creationId xmlns:a16="http://schemas.microsoft.com/office/drawing/2014/main" id="{11F3E338-580C-1A40-3287-5EAF0B6A2C53}"/>
               </a:ext>
             </a:extLst>
           </p:cNvPr>
@@ -3311,7 +2672,7 @@
           <p:cNvPr id="5" name="Date Placeholder 4">
             <a:extLst>
               <a:ext uri="{FF2B5EF4-FFF2-40B4-BE49-F238E27FC236}">
-                <a16:creationId xmlns:a16="http://schemas.microsoft.com/office/drawing/2014/main" id="{832A6D37-E3BF-9C3E-E543-A2FC81DE3D49}"/>
+                <a16:creationId xmlns:a16="http://schemas.microsoft.com/office/drawing/2014/main" id="{A120DD18-EA34-91D5-0AD0-0FDF5DC4F9DB}"/>
               </a:ext>
             </a:extLst>
           </p:cNvPr>
@@ -3327,9 +2688,9 @@
           <a:bodyPr/>
           <a:lstStyle/>
           <a:p>
-            <a:fld id="{F7C9C2BF-5698-3D41-8DA1-AAF2C5D51DF1}" type="datetimeFigureOut">
+            <a:fld id="{46E77216-CF56-224B-9168-653FEC0E6A33}" type="datetimeFigureOut">
               <a:rPr lang="en-US" smtClean="0"/>
-              <a:t>9/17/24</a:t>
+              <a:t>11/7/25</a:t>
             </a:fld>
             <a:endParaRPr lang="en-US"/>
           </a:p>
@@ -3340,7 +2701,7 @@
           <p:cNvPr id="6" name="Footer Placeholder 5">
             <a:extLst>
               <a:ext uri="{FF2B5EF4-FFF2-40B4-BE49-F238E27FC236}">
-                <a16:creationId xmlns:a16="http://schemas.microsoft.com/office/drawing/2014/main" id="{9CDD55AE-4D47-E29F-EBED-6E0FFEF46333}"/>
+                <a16:creationId xmlns:a16="http://schemas.microsoft.com/office/drawing/2014/main" id="{92F7EAD8-7ECA-0C25-140A-FBDFC60E32FA}"/>
               </a:ext>
             </a:extLst>
           </p:cNvPr>
@@ -3365,7 +2726,7 @@
           <p:cNvPr id="7" name="Slide Number Placeholder 6">
             <a:extLst>
               <a:ext uri="{FF2B5EF4-FFF2-40B4-BE49-F238E27FC236}">
-                <a16:creationId xmlns:a16="http://schemas.microsoft.com/office/drawing/2014/main" id="{454AF522-E0D0-B45F-071C-58D00F461DD6}"/>
+                <a16:creationId xmlns:a16="http://schemas.microsoft.com/office/drawing/2014/main" id="{14EF97C8-EBFF-3DC9-302A-4E95BBF7FF75}"/>
               </a:ext>
             </a:extLst>
           </p:cNvPr>
@@ -3381,7 +2742,7 @@
           <a:bodyPr/>
           <a:lstStyle/>
           <a:p>
-            <a:fld id="{06CD3B0D-AC4D-7D45-81BA-4B752510DE80}" type="slidenum">
+            <a:fld id="{9C1C8766-F064-E741-A944-31E313370E28}" type="slidenum">
               <a:rPr lang="en-US" smtClean="0"/>
               <a:t>‹#›</a:t>
             </a:fld>
@@ -3392,7 +2753,7 @@
     </p:spTree>
     <p:extLst>
       <p:ext uri="{BB962C8B-B14F-4D97-AF65-F5344CB8AC3E}">
-        <p14:creationId xmlns:p14="http://schemas.microsoft.com/office/powerpoint/2010/main" val="4155973649"/>
+        <p14:creationId xmlns:p14="http://schemas.microsoft.com/office/powerpoint/2010/main" val="246308916"/>
       </p:ext>
     </p:extLst>
   </p:cSld>
@@ -3429,7 +2790,7 @@
           <p:cNvPr id="2" name="Title Placeholder 1">
             <a:extLst>
               <a:ext uri="{FF2B5EF4-FFF2-40B4-BE49-F238E27FC236}">
-                <a16:creationId xmlns:a16="http://schemas.microsoft.com/office/drawing/2014/main" id="{51BA6E49-ED6F-6AE4-EABD-210FE8D67DC5}"/>
+                <a16:creationId xmlns:a16="http://schemas.microsoft.com/office/drawing/2014/main" id="{0BCA05FB-4B73-7947-C087-3DAF683F94CC}"/>
               </a:ext>
             </a:extLst>
           </p:cNvPr>
@@ -3467,7 +2828,7 @@
           <p:cNvPr id="3" name="Text Placeholder 2">
             <a:extLst>
               <a:ext uri="{FF2B5EF4-FFF2-40B4-BE49-F238E27FC236}">
-                <a16:creationId xmlns:a16="http://schemas.microsoft.com/office/drawing/2014/main" id="{5A513A3D-BF84-B76D-288B-31D14DE0F275}"/>
+                <a16:creationId xmlns:a16="http://schemas.microsoft.com/office/drawing/2014/main" id="{DCD8872D-BF0E-770C-D256-A7E00BC7649F}"/>
               </a:ext>
             </a:extLst>
           </p:cNvPr>
@@ -3534,7 +2895,7 @@
           <p:cNvPr id="4" name="Date Placeholder 3">
             <a:extLst>
               <a:ext uri="{FF2B5EF4-FFF2-40B4-BE49-F238E27FC236}">
-                <a16:creationId xmlns:a16="http://schemas.microsoft.com/office/drawing/2014/main" id="{CAA48CFF-CD97-29AC-AFB3-6F2ECE0784D8}"/>
+                <a16:creationId xmlns:a16="http://schemas.microsoft.com/office/drawing/2014/main" id="{34671A5B-49F6-218C-FF43-3C96D3BFDF72}"/>
               </a:ext>
             </a:extLst>
           </p:cNvPr>
@@ -3561,16 +2922,16 @@
               <a:defRPr sz="1200">
                 <a:solidFill>
                   <a:schemeClr val="tx1">
-                    <a:tint val="75000"/>
+                    <a:tint val="82000"/>
                   </a:schemeClr>
                 </a:solidFill>
               </a:defRPr>
             </a:lvl1pPr>
           </a:lstStyle>
           <a:p>
-            <a:fld id="{F7C9C2BF-5698-3D41-8DA1-AAF2C5D51DF1}" type="datetimeFigureOut">
+            <a:fld id="{46E77216-CF56-224B-9168-653FEC0E6A33}" type="datetimeFigureOut">
               <a:rPr lang="en-US" smtClean="0"/>
-              <a:t>9/17/24</a:t>
+              <a:t>11/7/25</a:t>
             </a:fld>
             <a:endParaRPr lang="en-US"/>
           </a:p>
@@ -3581,7 +2942,7 @@
           <p:cNvPr id="5" name="Footer Placeholder 4">
             <a:extLst>
               <a:ext uri="{FF2B5EF4-FFF2-40B4-BE49-F238E27FC236}">
-                <a16:creationId xmlns:a16="http://schemas.microsoft.com/office/drawing/2014/main" id="{F3011566-479B-C336-5410-2BEB01FC5F7A}"/>
+                <a16:creationId xmlns:a16="http://schemas.microsoft.com/office/drawing/2014/main" id="{1C3B0DEE-77EE-696D-122F-56CD9CAD14DE}"/>
               </a:ext>
             </a:extLst>
           </p:cNvPr>
@@ -3608,7 +2969,7 @@
               <a:defRPr sz="1200">
                 <a:solidFill>
                   <a:schemeClr val="tx1">
-                    <a:tint val="75000"/>
+                    <a:tint val="82000"/>
                   </a:schemeClr>
                 </a:solidFill>
               </a:defRPr>
@@ -3624,7 +2985,7 @@
           <p:cNvPr id="6" name="Slide Number Placeholder 5">
             <a:extLst>
               <a:ext uri="{FF2B5EF4-FFF2-40B4-BE49-F238E27FC236}">
-                <a16:creationId xmlns:a16="http://schemas.microsoft.com/office/drawing/2014/main" id="{A5038420-CD60-B419-C1D5-CAC39D63BE29}"/>
+                <a16:creationId xmlns:a16="http://schemas.microsoft.com/office/drawing/2014/main" id="{E88AB1F2-7BB9-0911-EE86-C41F0D05EFA0}"/>
               </a:ext>
             </a:extLst>
           </p:cNvPr>
@@ -3651,14 +3012,14 @@
               <a:defRPr sz="1200">
                 <a:solidFill>
                   <a:schemeClr val="tx1">
-                    <a:tint val="75000"/>
+                    <a:tint val="82000"/>
                   </a:schemeClr>
                 </a:solidFill>
               </a:defRPr>
             </a:lvl1pPr>
           </a:lstStyle>
           <a:p>
-            <a:fld id="{06CD3B0D-AC4D-7D45-81BA-4B752510DE80}" type="slidenum">
+            <a:fld id="{9C1C8766-F064-E741-A944-31E313370E28}" type="slidenum">
               <a:rPr lang="en-US" smtClean="0"/>
               <a:t>‹#›</a:t>
             </a:fld>
@@ -3669,7 +3030,7 @@
     </p:spTree>
     <p:extLst>
       <p:ext uri="{BB962C8B-B14F-4D97-AF65-F5344CB8AC3E}">
-        <p14:creationId xmlns:p14="http://schemas.microsoft.com/office/powerpoint/2010/main" val="519958853"/>
+        <p14:creationId xmlns:p14="http://schemas.microsoft.com/office/powerpoint/2010/main" val="3085205418"/>
       </p:ext>
     </p:extLst>
   </p:cSld>
@@ -4001,8 +3362,8 @@
         </p:nvSpPr>
         <p:spPr>
           <a:xfrm>
-            <a:off x="1481796" y="4107766"/>
-            <a:ext cx="9228406" cy="1569660"/>
+            <a:off x="1481797" y="5146629"/>
+            <a:ext cx="9228406" cy="461665"/>
           </a:xfrm>
           <a:prstGeom prst="rect">
             <a:avLst/>
@@ -4021,24 +3382,6 @@
               <a:t>Welcome to the fruit-picking game!</a:t>
             </a:r>
           </a:p>
-          <a:p>
-            <a:pPr algn="ctr"/>
-            <a:endParaRPr lang="en-US" sz="2400" dirty="0"/>
-          </a:p>
-          <a:p>
-            <a:pPr algn="ctr"/>
-            <a:r>
-              <a:rPr lang="en-US" sz="2400" dirty="0"/>
-              <a:t>We will now give you some instructions on how to play the game. Use</a:t>
-            </a:r>
-          </a:p>
-          <a:p>
-            <a:pPr algn="ctr"/>
-            <a:r>
-              <a:rPr lang="en-US" sz="2400" dirty="0"/>
-              <a:t>the buttons below (or the arrow keys) to navigate the instructions.</a:t>
-            </a:r>
-          </a:p>
         </p:txBody>
       </p:sp>
       <p:grpSp>
@@ -4055,7 +3398,7 @@
         </p:nvGrpSpPr>
         <p:grpSpPr>
           <a:xfrm>
-            <a:off x="802526" y="139008"/>
+            <a:off x="802526" y="984703"/>
             <a:ext cx="10586948" cy="3353895"/>
             <a:chOff x="802526" y="139008"/>
             <a:chExt cx="10586948" cy="3353895"/>
@@ -4170,6 +3513,159 @@
   <p:cSld>
     <p:spTree>
       <p:nvGrpSpPr>
+        <p:cNvPr id="1" name="">
+          <a:extLst>
+            <a:ext uri="{FF2B5EF4-FFF2-40B4-BE49-F238E27FC236}">
+              <a16:creationId xmlns:a16="http://schemas.microsoft.com/office/drawing/2014/main" id="{09EF6050-31E6-1456-2EB7-7D50521A2D21}"/>
+            </a:ext>
+          </a:extLst>
+        </p:cNvPr>
+        <p:cNvGrpSpPr/>
+        <p:nvPr/>
+      </p:nvGrpSpPr>
+      <p:grpSpPr>
+        <a:xfrm>
+          <a:off x="0" y="0"/>
+          <a:ext cx="0" cy="0"/>
+          <a:chOff x="0" y="0"/>
+          <a:chExt cx="0" cy="0"/>
+        </a:xfrm>
+      </p:grpSpPr>
+      <p:pic>
+        <p:nvPicPr>
+          <p:cNvPr id="5" name="Content Placeholder 4">
+            <a:extLst>
+              <a:ext uri="{FF2B5EF4-FFF2-40B4-BE49-F238E27FC236}">
+                <a16:creationId xmlns:a16="http://schemas.microsoft.com/office/drawing/2014/main" id="{36431ABE-A4C3-AD75-48F6-4AAD8F1CBF02}"/>
+              </a:ext>
+            </a:extLst>
+          </p:cNvPr>
+          <p:cNvPicPr>
+            <a:picLocks noGrp="1" noChangeAspect="1"/>
+          </p:cNvPicPr>
+          <p:nvPr>
+            <p:ph idx="1"/>
+          </p:nvPr>
+        </p:nvPicPr>
+        <p:blipFill>
+          <a:blip r:embed="rId2"/>
+          <a:stretch>
+            <a:fillRect/>
+          </a:stretch>
+        </p:blipFill>
+        <p:spPr>
+          <a:xfrm>
+            <a:off x="2605837" y="334372"/>
+            <a:ext cx="6374389" cy="4780790"/>
+          </a:xfrm>
+        </p:spPr>
+      </p:pic>
+      <p:sp>
+        <p:nvSpPr>
+          <p:cNvPr id="6" name="Oval 5">
+            <a:extLst>
+              <a:ext uri="{FF2B5EF4-FFF2-40B4-BE49-F238E27FC236}">
+                <a16:creationId xmlns:a16="http://schemas.microsoft.com/office/drawing/2014/main" id="{924602E8-DEA5-046A-DA9F-F6FB846ECD6D}"/>
+              </a:ext>
+            </a:extLst>
+          </p:cNvPr>
+          <p:cNvSpPr/>
+          <p:nvPr/>
+        </p:nvSpPr>
+        <p:spPr>
+          <a:xfrm>
+            <a:off x="3142789" y="895967"/>
+            <a:ext cx="2038662" cy="1472784"/>
+          </a:xfrm>
+          <a:prstGeom prst="ellipse">
+            <a:avLst/>
+          </a:prstGeom>
+          <a:noFill/>
+          <a:ln w="76200">
+            <a:solidFill>
+              <a:srgbClr val="FF0000"/>
+            </a:solidFill>
+          </a:ln>
+        </p:spPr>
+        <p:style>
+          <a:lnRef idx="2">
+            <a:schemeClr val="accent1">
+              <a:shade val="15000"/>
+            </a:schemeClr>
+          </a:lnRef>
+          <a:fillRef idx="1">
+            <a:schemeClr val="accent1"/>
+          </a:fillRef>
+          <a:effectRef idx="0">
+            <a:schemeClr val="accent1"/>
+          </a:effectRef>
+          <a:fontRef idx="minor">
+            <a:schemeClr val="lt1"/>
+          </a:fontRef>
+        </p:style>
+        <p:txBody>
+          <a:bodyPr rtlCol="0" anchor="ctr"/>
+          <a:lstStyle/>
+          <a:p>
+            <a:pPr algn="ctr"/>
+            <a:endParaRPr lang="en-US"/>
+          </a:p>
+        </p:txBody>
+      </p:sp>
+      <p:sp>
+        <p:nvSpPr>
+          <p:cNvPr id="7" name="TextBox 6">
+            <a:extLst>
+              <a:ext uri="{FF2B5EF4-FFF2-40B4-BE49-F238E27FC236}">
+                <a16:creationId xmlns:a16="http://schemas.microsoft.com/office/drawing/2014/main" id="{9B3A856B-E918-981F-0174-8E35FE641972}"/>
+              </a:ext>
+            </a:extLst>
+          </p:cNvPr>
+          <p:cNvSpPr txBox="1"/>
+          <p:nvPr/>
+        </p:nvSpPr>
+        <p:spPr>
+          <a:xfrm>
+            <a:off x="1360774" y="5323299"/>
+            <a:ext cx="9228406" cy="1200329"/>
+          </a:xfrm>
+          <a:prstGeom prst="rect">
+            <a:avLst/>
+          </a:prstGeom>
+          <a:noFill/>
+        </p:spPr>
+        <p:txBody>
+          <a:bodyPr wrap="square" rtlCol="0">
+            <a:spAutoFit/>
+          </a:bodyPr>
+          <a:lstStyle/>
+          <a:p>
+            <a:pPr algn="ctr"/>
+            <a:r>
+              <a:rPr lang="en-US" sz="2400" dirty="0"/>
+              <a:t>Please keep the fourth, middle, and index fingers of your left hand on numbers 1, 2, and 3 as shown above throughout the experiment. You will use these keys to rate your feelings of regret.</a:t>
+            </a:r>
+          </a:p>
+        </p:txBody>
+      </p:sp>
+    </p:spTree>
+    <p:extLst>
+      <p:ext uri="{BB962C8B-B14F-4D97-AF65-F5344CB8AC3E}">
+        <p14:creationId xmlns:p14="http://schemas.microsoft.com/office/powerpoint/2010/main" val="131228118"/>
+      </p:ext>
+    </p:extLst>
+  </p:cSld>
+  <p:clrMapOvr>
+    <a:masterClrMapping/>
+  </p:clrMapOvr>
+</p:sld>
+</file>
+
+<file path=ppt/slides/slide11.xml><?xml version="1.0" encoding="utf-8"?>
+<p:sld xmlns:a="http://schemas.openxmlformats.org/drawingml/2006/main" xmlns:r="http://schemas.openxmlformats.org/officeDocument/2006/relationships" xmlns:p="http://schemas.openxmlformats.org/presentationml/2006/main">
+  <p:cSld>
+    <p:spTree>
+      <p:nvGrpSpPr>
         <p:cNvPr id="1" name=""/>
         <p:cNvGrpSpPr/>
         <p:nvPr/>
@@ -4184,10 +3680,10 @@
       </p:grpSpPr>
       <p:sp>
         <p:nvSpPr>
-          <p:cNvPr id="10" name="TextBox 9">
-            <a:extLst>
-              <a:ext uri="{FF2B5EF4-FFF2-40B4-BE49-F238E27FC236}">
-                <a16:creationId xmlns:a16="http://schemas.microsoft.com/office/drawing/2014/main" id="{E672D5E3-A2C9-BBA7-4584-335F4BED5C3D}"/>
+          <p:cNvPr id="4" name="TextBox 3">
+            <a:extLst>
+              <a:ext uri="{FF2B5EF4-FFF2-40B4-BE49-F238E27FC236}">
+                <a16:creationId xmlns:a16="http://schemas.microsoft.com/office/drawing/2014/main" id="{FD9BE02F-C3E5-8D68-003A-4CA6742B2A39}"/>
               </a:ext>
             </a:extLst>
           </p:cNvPr>
@@ -4196,8 +3692,8 @@
         </p:nvSpPr>
         <p:spPr>
           <a:xfrm>
-            <a:off x="1293238" y="4369145"/>
-            <a:ext cx="9605524" cy="2677656"/>
+            <a:off x="5530781" y="2321004"/>
+            <a:ext cx="1130438" cy="2215991"/>
           </a:xfrm>
           <a:prstGeom prst="rect">
             <a:avLst/>
@@ -4205,6 +3701,41 @@
           <a:noFill/>
         </p:spPr>
         <p:txBody>
+          <a:bodyPr wrap="none" rtlCol="0">
+            <a:spAutoFit/>
+          </a:bodyPr>
+          <a:lstStyle/>
+          <a:p>
+            <a:r>
+              <a:rPr lang="en-US" sz="13800" dirty="0"/>
+              <a:t>+</a:t>
+            </a:r>
+          </a:p>
+        </p:txBody>
+      </p:sp>
+      <p:sp>
+        <p:nvSpPr>
+          <p:cNvPr id="5" name="TextBox 4">
+            <a:extLst>
+              <a:ext uri="{FF2B5EF4-FFF2-40B4-BE49-F238E27FC236}">
+                <a16:creationId xmlns:a16="http://schemas.microsoft.com/office/drawing/2014/main" id="{F6D2DD3A-C29D-265A-C096-E1F43D25F342}"/>
+              </a:ext>
+            </a:extLst>
+          </p:cNvPr>
+          <p:cNvSpPr txBox="1"/>
+          <p:nvPr/>
+        </p:nvSpPr>
+        <p:spPr>
+          <a:xfrm>
+            <a:off x="1360774" y="5323299"/>
+            <a:ext cx="9228406" cy="1200329"/>
+          </a:xfrm>
+          <a:prstGeom prst="rect">
+            <a:avLst/>
+          </a:prstGeom>
+          <a:noFill/>
+        </p:spPr>
+        <p:txBody>
           <a:bodyPr wrap="square" rtlCol="0">
             <a:spAutoFit/>
           </a:bodyPr>
@@ -4213,76 +3744,15 @@
             <a:pPr algn="ctr"/>
             <a:r>
               <a:rPr lang="en-US" sz="2400" dirty="0"/>
-              <a:t>Finally, in the second half of the task, every time you get a rotten fruit, we will ask you to rate how much you regret your tree choice. Use your mouse to record your answer</a:t>
-            </a:r>
-            <a:r>
-              <a:rPr lang="en-US" sz="2400" b="1" dirty="0"/>
-              <a:t> </a:t>
-            </a:r>
-            <a:r>
-              <a:rPr lang="en-US" sz="2400" dirty="0"/>
-              <a:t>and press “Continue” to proceed to the next trial.</a:t>
-            </a:r>
-          </a:p>
-          <a:p>
-            <a:pPr algn="ctr"/>
-            <a:endParaRPr lang="en-US" sz="2400" dirty="0"/>
-          </a:p>
-          <a:p>
-            <a:pPr algn="ctr"/>
-            <a:r>
-              <a:rPr lang="en-US" sz="2400" b="1" dirty="0"/>
-              <a:t>Please report your feelings openly and honestly</a:t>
-            </a:r>
-            <a:r>
-              <a:rPr lang="en-US" sz="2400" dirty="0"/>
-              <a:t> regardless of how strong or weak they are!</a:t>
-            </a:r>
-            <a:endParaRPr lang="en-US" sz="2400" b="1" dirty="0"/>
-          </a:p>
-          <a:p>
-            <a:pPr algn="ctr"/>
-            <a:r>
-              <a:rPr lang="en-US" sz="2400" b="1" dirty="0"/>
-              <a:t> </a:t>
-            </a:r>
-          </a:p>
-        </p:txBody>
-      </p:sp>
-      <p:pic>
-        <p:nvPicPr>
-          <p:cNvPr id="3" name="Picture 2">
-            <a:extLst>
-              <a:ext uri="{FF2B5EF4-FFF2-40B4-BE49-F238E27FC236}">
-                <a16:creationId xmlns:a16="http://schemas.microsoft.com/office/drawing/2014/main" id="{67607619-F353-2DEB-E8E0-804B787D7FC5}"/>
-              </a:ext>
-            </a:extLst>
-          </p:cNvPr>
-          <p:cNvPicPr>
-            <a:picLocks noChangeAspect="1"/>
-          </p:cNvPicPr>
-          <p:nvPr/>
-        </p:nvPicPr>
-        <p:blipFill>
-          <a:blip r:embed="rId2"/>
-          <a:stretch>
-            <a:fillRect/>
-          </a:stretch>
-        </p:blipFill>
-        <p:spPr>
-          <a:xfrm>
-            <a:off x="4640670" y="113936"/>
-            <a:ext cx="2910659" cy="4409046"/>
-          </a:xfrm>
-          <a:prstGeom prst="rect">
-            <a:avLst/>
-          </a:prstGeom>
-        </p:spPr>
-      </p:pic>
+              <a:t>Between the trials, you will see a cross in the middle of the screen. Please look at the cross as soon as you see it and until the next trial begins. </a:t>
+            </a:r>
+          </a:p>
+        </p:txBody>
+      </p:sp>
     </p:spTree>
     <p:extLst>
       <p:ext uri="{BB962C8B-B14F-4D97-AF65-F5344CB8AC3E}">
-        <p14:creationId xmlns:p14="http://schemas.microsoft.com/office/powerpoint/2010/main" val="3032555438"/>
+        <p14:creationId xmlns:p14="http://schemas.microsoft.com/office/powerpoint/2010/main" val="1925208595"/>
       </p:ext>
     </p:extLst>
   </p:cSld>
@@ -4292,7 +3762,7 @@
 </p:sld>
 </file>
 
-<file path=ppt/slides/slide11.xml><?xml version="1.0" encoding="utf-8"?>
+<file path=ppt/slides/slide12.xml><?xml version="1.0" encoding="utf-8"?>
 <p:sld xmlns:a="http://schemas.openxmlformats.org/drawingml/2006/main" xmlns:r="http://schemas.openxmlformats.org/officeDocument/2006/relationships" xmlns:p="http://schemas.openxmlformats.org/presentationml/2006/main">
   <p:cSld>
     <p:spTree>
@@ -4431,7 +3901,7 @@
         <p:spPr>
           <a:xfrm>
             <a:off x="1481797" y="4166488"/>
-            <a:ext cx="9228406" cy="1938992"/>
+            <a:ext cx="9228406" cy="2308324"/>
           </a:xfrm>
           <a:prstGeom prst="rect">
             <a:avLst/>
@@ -4447,7 +3917,7 @@
             <a:pPr algn="ctr"/>
             <a:r>
               <a:rPr lang="en-US" sz="2400" dirty="0"/>
-              <a:t>In the fruit-picking game, there are three trees you can pick fruit from.</a:t>
+              <a:t>In this game, you will go through 60 trials of picking fruit from the trees shown above. </a:t>
             </a:r>
           </a:p>
           <a:p>
@@ -4458,7 +3928,7 @@
             <a:pPr algn="ctr"/>
             <a:r>
               <a:rPr lang="en-US" sz="2400" dirty="0"/>
-              <a:t>Each tree has a slightly different shape and color. The shapes and colors are there just to help you tell the trees apart - they don't have any special meaning other than that.</a:t>
+              <a:t>Each tree has a slightly different shape and color. The shapes and colors are there just to help you tell the trees apart—they don't have any special meaning other than that.</a:t>
             </a:r>
           </a:p>
         </p:txBody>
@@ -4619,7 +4089,7 @@
         <p:spPr>
           <a:xfrm>
             <a:off x="1481797" y="4452231"/>
-            <a:ext cx="9228406" cy="1938992"/>
+            <a:ext cx="9228406" cy="1200329"/>
           </a:xfrm>
           <a:prstGeom prst="rect">
             <a:avLst/>
@@ -4635,25 +4105,7 @@
             <a:pPr algn="ctr"/>
             <a:r>
               <a:rPr lang="en-US" sz="2400" dirty="0"/>
-              <a:t>On each turn you will be shown three trees, and you will</a:t>
-            </a:r>
-          </a:p>
-          <a:p>
-            <a:pPr algn="ctr"/>
-            <a:r>
-              <a:rPr lang="en-US" sz="2400" dirty="0"/>
-              <a:t>choose which one you want to pick fruit from.</a:t>
-            </a:r>
-          </a:p>
-          <a:p>
-            <a:pPr algn="ctr"/>
-            <a:endParaRPr lang="en-US" sz="2400" dirty="0"/>
-          </a:p>
-          <a:p>
-            <a:pPr algn="ctr"/>
-            <a:r>
-              <a:rPr lang="en-US" sz="2400" dirty="0"/>
-              <a:t>You can make your choice using the left, up,</a:t>
+              <a:t>On each trial you will choose which one you want to pick fruit from. You can make your choice using the left, up,</a:t>
             </a:r>
           </a:p>
           <a:p>
@@ -4857,7 +4309,7 @@
         <p:spPr>
           <a:xfrm>
             <a:off x="1538068" y="4566749"/>
-            <a:ext cx="9228406" cy="1938992"/>
+            <a:ext cx="9228406" cy="1200329"/>
           </a:xfrm>
           <a:prstGeom prst="rect">
             <a:avLst/>
@@ -4873,98 +4325,16 @@
             <a:pPr algn="ctr"/>
             <a:r>
               <a:rPr lang="en-US" sz="2400" dirty="0"/>
-              <a:t>When you pick fruit, it can turn out to be either ripe or rotten. You will receive points for </a:t>
-            </a:r>
-            <a:r>
-              <a:rPr lang="en-US" sz="2400" dirty="0">
-                <a:solidFill>
-                  <a:srgbClr val="00B050"/>
-                </a:solidFill>
-              </a:rPr>
-              <a:t>ripe fruit</a:t>
-            </a:r>
-            <a:r>
-              <a:rPr lang="en-US" sz="2400" dirty="0"/>
-              <a:t>. You will not get points for </a:t>
-            </a:r>
-            <a:r>
-              <a:rPr lang="en-US" sz="2400" dirty="0">
-                <a:solidFill>
-                  <a:srgbClr val="FF0000"/>
-                </a:solidFill>
-              </a:rPr>
-              <a:t>rotten fruit</a:t>
-            </a:r>
-            <a:r>
-              <a:rPr lang="en-US" sz="2400" dirty="0"/>
-              <a:t>. </a:t>
+              <a:t>When you pick fruit, it can turn out to be either ripe or rotten. </a:t>
+            </a:r>
+            <a:r>
+              <a:rPr lang="en-US" sz="2400" b="1" dirty="0"/>
+              <a:t>Your goal is to pick as much ripe fruit as you can!</a:t>
             </a:r>
           </a:p>
           <a:p>
             <a:pPr algn="ctr"/>
             <a:endParaRPr lang="en-US" sz="2400" dirty="0"/>
-          </a:p>
-          <a:p>
-            <a:pPr algn="ctr"/>
-            <a:r>
-              <a:rPr lang="en-US" sz="2400" b="1" dirty="0"/>
-              <a:t>Your goal is to earn as many points as you can!</a:t>
-            </a:r>
-          </a:p>
-          <a:p>
-            <a:pPr algn="ctr"/>
-            <a:endParaRPr lang="en-US" sz="2400" dirty="0"/>
-          </a:p>
-        </p:txBody>
-      </p:sp>
-      <p:sp>
-        <p:nvSpPr>
-          <p:cNvPr id="2" name="TextBox 1">
-            <a:extLst>
-              <a:ext uri="{FF2B5EF4-FFF2-40B4-BE49-F238E27FC236}">
-                <a16:creationId xmlns:a16="http://schemas.microsoft.com/office/drawing/2014/main" id="{9EF06329-ACB7-D738-90A9-0932CBFF51C1}"/>
-              </a:ext>
-            </a:extLst>
-          </p:cNvPr>
-          <p:cNvSpPr txBox="1"/>
-          <p:nvPr/>
-        </p:nvSpPr>
-        <p:spPr>
-          <a:xfrm>
-            <a:off x="2360739" y="3128951"/>
-            <a:ext cx="2443089" cy="830997"/>
-          </a:xfrm>
-          <a:prstGeom prst="rect">
-            <a:avLst/>
-          </a:prstGeom>
-          <a:noFill/>
-        </p:spPr>
-        <p:txBody>
-          <a:bodyPr wrap="square" rtlCol="0">
-            <a:spAutoFit/>
-          </a:bodyPr>
-          <a:lstStyle/>
-          <a:p>
-            <a:pPr algn="ctr"/>
-            <a:r>
-              <a:rPr lang="en-US" sz="2400" b="1" dirty="0">
-                <a:solidFill>
-                  <a:srgbClr val="00B050"/>
-                </a:solidFill>
-              </a:rPr>
-              <a:t>Ripe</a:t>
-            </a:r>
-          </a:p>
-          <a:p>
-            <a:pPr algn="ctr"/>
-            <a:r>
-              <a:rPr lang="en-US" sz="2400" b="1" dirty="0">
-                <a:solidFill>
-                  <a:srgbClr val="00B050"/>
-                </a:solidFill>
-              </a:rPr>
-              <a:t>+1</a:t>
-            </a:r>
           </a:p>
         </p:txBody>
       </p:sp>
@@ -4990,7 +4360,7 @@
         </p:blipFill>
         <p:spPr>
           <a:xfrm>
-            <a:off x="2561525" y="823245"/>
+            <a:off x="2670707" y="1614383"/>
             <a:ext cx="2041519" cy="2041519"/>
           </a:xfrm>
           <a:prstGeom prst="rect">
@@ -5020,7 +4390,7 @@
         </p:blipFill>
         <p:spPr>
           <a:xfrm>
-            <a:off x="7856029" y="908581"/>
+            <a:off x="7479776" y="1819427"/>
             <a:ext cx="1836475" cy="1836475"/>
           </a:xfrm>
           <a:prstGeom prst="rect">
@@ -5028,62 +4398,6 @@
           </a:prstGeom>
         </p:spPr>
       </p:pic>
-      <p:sp>
-        <p:nvSpPr>
-          <p:cNvPr id="14" name="TextBox 13">
-            <a:extLst>
-              <a:ext uri="{FF2B5EF4-FFF2-40B4-BE49-F238E27FC236}">
-                <a16:creationId xmlns:a16="http://schemas.microsoft.com/office/drawing/2014/main" id="{C1889260-267D-DBC9-53EA-FAA6DD94C2C3}"/>
-              </a:ext>
-            </a:extLst>
-          </p:cNvPr>
-          <p:cNvSpPr txBox="1"/>
-          <p:nvPr/>
-        </p:nvSpPr>
-        <p:spPr>
-          <a:xfrm>
-            <a:off x="7588958" y="3114170"/>
-            <a:ext cx="2443089" cy="830997"/>
-          </a:xfrm>
-          <a:prstGeom prst="rect">
-            <a:avLst/>
-          </a:prstGeom>
-          <a:noFill/>
-        </p:spPr>
-        <p:txBody>
-          <a:bodyPr wrap="square" rtlCol="0">
-            <a:spAutoFit/>
-          </a:bodyPr>
-          <a:lstStyle/>
-          <a:p>
-            <a:pPr algn="ctr"/>
-            <a:r>
-              <a:rPr lang="en-US" sz="2400" b="1" dirty="0">
-                <a:solidFill>
-                  <a:srgbClr val="FF0000"/>
-                </a:solidFill>
-              </a:rPr>
-              <a:t>Rotten</a:t>
-            </a:r>
-          </a:p>
-          <a:p>
-            <a:pPr algn="ctr"/>
-            <a:r>
-              <a:rPr lang="en-US" sz="2400" b="1">
-                <a:solidFill>
-                  <a:srgbClr val="FF0000"/>
-                </a:solidFill>
-              </a:rPr>
-              <a:t>0</a:t>
-            </a:r>
-            <a:endParaRPr lang="en-US" sz="2400" b="1" dirty="0">
-              <a:solidFill>
-                <a:srgbClr val="FF0000"/>
-              </a:solidFill>
-            </a:endParaRPr>
-          </a:p>
-        </p:txBody>
-      </p:sp>
     </p:spTree>
     <p:extLst>
       <p:ext uri="{BB962C8B-B14F-4D97-AF65-F5344CB8AC3E}">
@@ -5102,7 +4416,13 @@
   <p:cSld>
     <p:spTree>
       <p:nvGrpSpPr>
-        <p:cNvPr id="1" name=""/>
+        <p:cNvPr id="1" name="">
+          <a:extLst>
+            <a:ext uri="{FF2B5EF4-FFF2-40B4-BE49-F238E27FC236}">
+              <a16:creationId xmlns:a16="http://schemas.microsoft.com/office/drawing/2014/main" id="{D92EAF85-21B2-46FA-F04C-625F310F3310}"/>
+            </a:ext>
+          </a:extLst>
+        </p:cNvPr>
         <p:cNvGrpSpPr/>
         <p:nvPr/>
       </p:nvGrpSpPr>
@@ -5116,10 +4436,10 @@
       </p:grpSpPr>
       <p:sp>
         <p:nvSpPr>
-          <p:cNvPr id="5" name="TextBox 4">
-            <a:extLst>
-              <a:ext uri="{FF2B5EF4-FFF2-40B4-BE49-F238E27FC236}">
-                <a16:creationId xmlns:a16="http://schemas.microsoft.com/office/drawing/2014/main" id="{2616AF94-6586-B8F8-9227-A3B0C6E3D5B1}"/>
+          <p:cNvPr id="10" name="TextBox 9">
+            <a:extLst>
+              <a:ext uri="{FF2B5EF4-FFF2-40B4-BE49-F238E27FC236}">
+                <a16:creationId xmlns:a16="http://schemas.microsoft.com/office/drawing/2014/main" id="{CF7C4AA9-4C0C-C566-D93A-0DA1670CEE88}"/>
               </a:ext>
             </a:extLst>
           </p:cNvPr>
@@ -5128,8 +4448,8 @@
         </p:nvSpPr>
         <p:spPr>
           <a:xfrm>
-            <a:off x="9741717" y="125727"/>
-            <a:ext cx="6094602" cy="461665"/>
+            <a:off x="1481797" y="4575921"/>
+            <a:ext cx="9228406" cy="830997"/>
           </a:xfrm>
           <a:prstGeom prst="rect">
             <a:avLst/>
@@ -5137,159 +4457,6 @@
           <a:noFill/>
         </p:spPr>
         <p:txBody>
-          <a:bodyPr wrap="square">
-            <a:spAutoFit/>
-          </a:bodyPr>
-          <a:lstStyle/>
-          <a:p>
-            <a:r>
-              <a:rPr lang="en-US" sz="2400" b="1" i="0" u="none" strike="noStrike" dirty="0">
-                <a:solidFill>
-                  <a:srgbClr val="000000"/>
-                </a:solidFill>
-                <a:effectLst/>
-                <a:latin typeface="Open Sans" panose="020B0606030504020204" pitchFamily="34" charset="0"/>
-              </a:rPr>
-              <a:t>Total points: 4</a:t>
-            </a:r>
-            <a:endParaRPr lang="en-US" sz="2400" dirty="0"/>
-          </a:p>
-        </p:txBody>
-      </p:sp>
-      <p:grpSp>
-        <p:nvGrpSpPr>
-          <p:cNvPr id="6" name="Group 5">
-            <a:extLst>
-              <a:ext uri="{FF2B5EF4-FFF2-40B4-BE49-F238E27FC236}">
-                <a16:creationId xmlns:a16="http://schemas.microsoft.com/office/drawing/2014/main" id="{13E4C0D8-BBA0-23DA-2346-3050551CC7F3}"/>
-              </a:ext>
-            </a:extLst>
-          </p:cNvPr>
-          <p:cNvGrpSpPr/>
-          <p:nvPr/>
-        </p:nvGrpSpPr>
-        <p:grpSpPr>
-          <a:xfrm>
-            <a:off x="802526" y="1105653"/>
-            <a:ext cx="10586948" cy="3353895"/>
-            <a:chOff x="802526" y="139008"/>
-            <a:chExt cx="10586948" cy="3353895"/>
-          </a:xfrm>
-        </p:grpSpPr>
-        <p:pic>
-          <p:nvPicPr>
-            <p:cNvPr id="7" name="Picture 6">
-              <a:extLst>
-                <a:ext uri="{FF2B5EF4-FFF2-40B4-BE49-F238E27FC236}">
-                  <a16:creationId xmlns:a16="http://schemas.microsoft.com/office/drawing/2014/main" id="{2B62F2AC-3461-C509-A6CC-CDE5EA2F8EB1}"/>
-                </a:ext>
-              </a:extLst>
-            </p:cNvPr>
-            <p:cNvPicPr>
-              <a:picLocks noChangeAspect="1"/>
-            </p:cNvPicPr>
-            <p:nvPr/>
-          </p:nvPicPr>
-          <p:blipFill>
-            <a:blip r:embed="rId2"/>
-            <a:stretch>
-              <a:fillRect/>
-            </a:stretch>
-          </p:blipFill>
-          <p:spPr>
-            <a:xfrm>
-              <a:off x="802526" y="139008"/>
-              <a:ext cx="3289992" cy="3289992"/>
-            </a:xfrm>
-            <a:prstGeom prst="rect">
-              <a:avLst/>
-            </a:prstGeom>
-          </p:spPr>
-        </p:pic>
-        <p:pic>
-          <p:nvPicPr>
-            <p:cNvPr id="8" name="Picture 7">
-              <a:extLst>
-                <a:ext uri="{FF2B5EF4-FFF2-40B4-BE49-F238E27FC236}">
-                  <a16:creationId xmlns:a16="http://schemas.microsoft.com/office/drawing/2014/main" id="{B3729B34-265B-1DEC-9ED8-CE3CB692D879}"/>
-                </a:ext>
-              </a:extLst>
-            </p:cNvPr>
-            <p:cNvPicPr>
-              <a:picLocks noChangeAspect="1"/>
-            </p:cNvPicPr>
-            <p:nvPr/>
-          </p:nvPicPr>
-          <p:blipFill>
-            <a:blip r:embed="rId3"/>
-            <a:stretch>
-              <a:fillRect/>
-            </a:stretch>
-          </p:blipFill>
-          <p:spPr>
-            <a:xfrm>
-              <a:off x="4503841" y="404011"/>
-              <a:ext cx="3088892" cy="3088892"/>
-            </a:xfrm>
-            <a:prstGeom prst="rect">
-              <a:avLst/>
-            </a:prstGeom>
-          </p:spPr>
-        </p:pic>
-        <p:pic>
-          <p:nvPicPr>
-            <p:cNvPr id="9" name="Picture 8">
-              <a:extLst>
-                <a:ext uri="{FF2B5EF4-FFF2-40B4-BE49-F238E27FC236}">
-                  <a16:creationId xmlns:a16="http://schemas.microsoft.com/office/drawing/2014/main" id="{5EF6BEF0-8ABC-9F69-92A1-BBC778D6BC78}"/>
-                </a:ext>
-              </a:extLst>
-            </p:cNvPr>
-            <p:cNvPicPr>
-              <a:picLocks noChangeAspect="1"/>
-            </p:cNvPicPr>
-            <p:nvPr/>
-          </p:nvPicPr>
-          <p:blipFill>
-            <a:blip r:embed="rId4"/>
-            <a:stretch>
-              <a:fillRect/>
-            </a:stretch>
-          </p:blipFill>
-          <p:spPr>
-            <a:xfrm>
-              <a:off x="8099482" y="139008"/>
-              <a:ext cx="3289992" cy="3289992"/>
-            </a:xfrm>
-            <a:prstGeom prst="rect">
-              <a:avLst/>
-            </a:prstGeom>
-          </p:spPr>
-        </p:pic>
-      </p:grpSp>
-      <p:sp>
-        <p:nvSpPr>
-          <p:cNvPr id="10" name="TextBox 9">
-            <a:extLst>
-              <a:ext uri="{FF2B5EF4-FFF2-40B4-BE49-F238E27FC236}">
-                <a16:creationId xmlns:a16="http://schemas.microsoft.com/office/drawing/2014/main" id="{42EA7FC6-98C9-61B2-8487-D10F102499DD}"/>
-              </a:ext>
-            </a:extLst>
-          </p:cNvPr>
-          <p:cNvSpPr txBox="1"/>
-          <p:nvPr/>
-        </p:nvSpPr>
-        <p:spPr>
-          <a:xfrm>
-            <a:off x="1481797" y="4977810"/>
-            <a:ext cx="9228406" cy="1200329"/>
-          </a:xfrm>
-          <a:prstGeom prst="rect">
-            <a:avLst/>
-          </a:prstGeom>
-          <a:noFill/>
-        </p:spPr>
-        <p:txBody>
           <a:bodyPr wrap="square" rtlCol="0">
             <a:spAutoFit/>
           </a:bodyPr>
@@ -5297,90 +4464,12 @@
           <a:p>
             <a:pPr algn="ctr"/>
             <a:r>
+              <a:rPr lang="en-US" sz="2400" b="1" dirty="0"/>
+              <a:t>Some trees are better than others</a:t>
+            </a:r>
+            <a:r>
               <a:rPr lang="en-US" sz="2400" dirty="0"/>
-              <a:t>You will be able to see the total number of points you’ve earned so far in the game in the upper right corner of your screen.</a:t>
-            </a:r>
-            <a:endParaRPr lang="en-US" sz="2400" b="1" dirty="0"/>
-          </a:p>
-          <a:p>
-            <a:pPr algn="ctr"/>
-            <a:endParaRPr lang="en-US" sz="2400" dirty="0"/>
-          </a:p>
-        </p:txBody>
-      </p:sp>
-    </p:spTree>
-    <p:extLst>
-      <p:ext uri="{BB962C8B-B14F-4D97-AF65-F5344CB8AC3E}">
-        <p14:creationId xmlns:p14="http://schemas.microsoft.com/office/powerpoint/2010/main" val="1269721692"/>
-      </p:ext>
-    </p:extLst>
-  </p:cSld>
-  <p:clrMapOvr>
-    <a:masterClrMapping/>
-  </p:clrMapOvr>
-</p:sld>
-</file>
-
-<file path=ppt/slides/slide6.xml><?xml version="1.0" encoding="utf-8"?>
-<p:sld xmlns:a="http://schemas.openxmlformats.org/drawingml/2006/main" xmlns:r="http://schemas.openxmlformats.org/officeDocument/2006/relationships" xmlns:p="http://schemas.openxmlformats.org/presentationml/2006/main">
-  <p:cSld>
-    <p:spTree>
-      <p:nvGrpSpPr>
-        <p:cNvPr id="1" name=""/>
-        <p:cNvGrpSpPr/>
-        <p:nvPr/>
-      </p:nvGrpSpPr>
-      <p:grpSpPr>
-        <a:xfrm>
-          <a:off x="0" y="0"/>
-          <a:ext cx="0" cy="0"/>
-          <a:chOff x="0" y="0"/>
-          <a:chExt cx="0" cy="0"/>
-        </a:xfrm>
-      </p:grpSpPr>
-      <p:sp>
-        <p:nvSpPr>
-          <p:cNvPr id="10" name="TextBox 9">
-            <a:extLst>
-              <a:ext uri="{FF2B5EF4-FFF2-40B4-BE49-F238E27FC236}">
-                <a16:creationId xmlns:a16="http://schemas.microsoft.com/office/drawing/2014/main" id="{E672D5E3-A2C9-BBA7-4584-335F4BED5C3D}"/>
-              </a:ext>
-            </a:extLst>
-          </p:cNvPr>
-          <p:cNvSpPr txBox="1"/>
-          <p:nvPr/>
-        </p:nvSpPr>
-        <p:spPr>
-          <a:xfrm>
-            <a:off x="1481796" y="4267673"/>
-            <a:ext cx="9228406" cy="1938992"/>
-          </a:xfrm>
-          <a:prstGeom prst="rect">
-            <a:avLst/>
-          </a:prstGeom>
-          <a:noFill/>
-        </p:spPr>
-        <p:txBody>
-          <a:bodyPr wrap="square" rtlCol="0">
-            <a:spAutoFit/>
-          </a:bodyPr>
-          <a:lstStyle/>
-          <a:p>
-            <a:pPr algn="ctr"/>
-            <a:r>
-              <a:rPr lang="en-US" sz="2400" b="1" dirty="0"/>
-              <a:t>Some trees are better than others.</a:t>
-            </a:r>
-          </a:p>
-          <a:p>
-            <a:pPr algn="ctr"/>
-            <a:endParaRPr lang="en-US" sz="2400" dirty="0"/>
-          </a:p>
-          <a:p>
-            <a:pPr algn="ctr"/>
-            <a:r>
-              <a:rPr lang="en-US" sz="2400" dirty="0"/>
-              <a:t>You are more likely to pick ripe fruit from some trees (though you will still sometimes pick rotten fruit); and you are more likely to pick rotten fruit from other trees (though you will still sometimes pick ripe fruit).</a:t>
+              <a:t>, but you don’t know which ones! Your goal is to try to consistently get ripe fruit and no rotten fruit. </a:t>
             </a:r>
           </a:p>
         </p:txBody>
@@ -5390,7 +4479,7 @@
           <p:cNvPr id="2" name="Group 1">
             <a:extLst>
               <a:ext uri="{FF2B5EF4-FFF2-40B4-BE49-F238E27FC236}">
-                <a16:creationId xmlns:a16="http://schemas.microsoft.com/office/drawing/2014/main" id="{B9A100D4-67B1-7791-2E36-171429BFD138}"/>
+                <a16:creationId xmlns:a16="http://schemas.microsoft.com/office/drawing/2014/main" id="{E7DA39B8-9238-8D4B-5EF9-AFFD00F69642}"/>
               </a:ext>
             </a:extLst>
           </p:cNvPr>
@@ -5410,7 +4499,7 @@
             <p:cNvPr id="3" name="Picture 2">
               <a:extLst>
                 <a:ext uri="{FF2B5EF4-FFF2-40B4-BE49-F238E27FC236}">
-                  <a16:creationId xmlns:a16="http://schemas.microsoft.com/office/drawing/2014/main" id="{C6D7871D-CC23-DE42-9813-CBE0E58527BA}"/>
+                  <a16:creationId xmlns:a16="http://schemas.microsoft.com/office/drawing/2014/main" id="{7D7E968B-94A7-8804-3781-E42405794FBF}"/>
                 </a:ext>
               </a:extLst>
             </p:cNvPr>
@@ -5440,7 +4529,7 @@
             <p:cNvPr id="4" name="Picture 3">
               <a:extLst>
                 <a:ext uri="{FF2B5EF4-FFF2-40B4-BE49-F238E27FC236}">
-                  <a16:creationId xmlns:a16="http://schemas.microsoft.com/office/drawing/2014/main" id="{0DC8A324-8AD9-B1EA-D3C0-FF0D3E1FDE5C}"/>
+                  <a16:creationId xmlns:a16="http://schemas.microsoft.com/office/drawing/2014/main" id="{AEDD5B9B-6EFE-91FB-4254-0D4A856DF927}"/>
                 </a:ext>
               </a:extLst>
             </p:cNvPr>
@@ -5470,7 +4559,7 @@
             <p:cNvPr id="6" name="Picture 5">
               <a:extLst>
                 <a:ext uri="{FF2B5EF4-FFF2-40B4-BE49-F238E27FC236}">
-                  <a16:creationId xmlns:a16="http://schemas.microsoft.com/office/drawing/2014/main" id="{57B8D6FC-C886-84A5-A2EC-C996C113E9E5}"/>
+                  <a16:creationId xmlns:a16="http://schemas.microsoft.com/office/drawing/2014/main" id="{CDC23C78-C3E6-7233-C28B-E25C6C14C342}"/>
                 </a:ext>
               </a:extLst>
             </p:cNvPr>
@@ -5499,7 +4588,154 @@
     </p:spTree>
     <p:extLst>
       <p:ext uri="{BB962C8B-B14F-4D97-AF65-F5344CB8AC3E}">
-        <p14:creationId xmlns:p14="http://schemas.microsoft.com/office/powerpoint/2010/main" val="2991160902"/>
+        <p14:creationId xmlns:p14="http://schemas.microsoft.com/office/powerpoint/2010/main" val="2869353730"/>
+      </p:ext>
+    </p:extLst>
+  </p:cSld>
+  <p:clrMapOvr>
+    <a:masterClrMapping/>
+  </p:clrMapOvr>
+</p:sld>
+</file>
+
+<file path=ppt/slides/slide6.xml><?xml version="1.0" encoding="utf-8"?>
+<p:sld xmlns:a="http://schemas.openxmlformats.org/drawingml/2006/main" xmlns:r="http://schemas.openxmlformats.org/officeDocument/2006/relationships" xmlns:p="http://schemas.openxmlformats.org/presentationml/2006/main">
+  <p:cSld>
+    <p:spTree>
+      <p:nvGrpSpPr>
+        <p:cNvPr id="1" name=""/>
+        <p:cNvGrpSpPr/>
+        <p:nvPr/>
+      </p:nvGrpSpPr>
+      <p:grpSpPr>
+        <a:xfrm>
+          <a:off x="0" y="0"/>
+          <a:ext cx="0" cy="0"/>
+          <a:chOff x="0" y="0"/>
+          <a:chExt cx="0" cy="0"/>
+        </a:xfrm>
+      </p:grpSpPr>
+      <p:pic>
+        <p:nvPicPr>
+          <p:cNvPr id="5" name="Content Placeholder 4">
+            <a:extLst>
+              <a:ext uri="{FF2B5EF4-FFF2-40B4-BE49-F238E27FC236}">
+                <a16:creationId xmlns:a16="http://schemas.microsoft.com/office/drawing/2014/main" id="{FAC90D79-5D46-BC75-35BC-1A0DDC0214AB}"/>
+              </a:ext>
+            </a:extLst>
+          </p:cNvPr>
+          <p:cNvPicPr>
+            <a:picLocks noGrp="1" noChangeAspect="1"/>
+          </p:cNvPicPr>
+          <p:nvPr>
+            <p:ph idx="1"/>
+          </p:nvPr>
+        </p:nvPicPr>
+        <p:blipFill>
+          <a:blip r:embed="rId2"/>
+          <a:stretch>
+            <a:fillRect/>
+          </a:stretch>
+        </p:blipFill>
+        <p:spPr>
+          <a:xfrm>
+            <a:off x="2605837" y="334372"/>
+            <a:ext cx="6374389" cy="4780790"/>
+          </a:xfrm>
+        </p:spPr>
+      </p:pic>
+      <p:sp>
+        <p:nvSpPr>
+          <p:cNvPr id="6" name="Oval 5">
+            <a:extLst>
+              <a:ext uri="{FF2B5EF4-FFF2-40B4-BE49-F238E27FC236}">
+                <a16:creationId xmlns:a16="http://schemas.microsoft.com/office/drawing/2014/main" id="{5DD6F6AC-E521-9340-FE66-8722024F78B8}"/>
+              </a:ext>
+            </a:extLst>
+          </p:cNvPr>
+          <p:cNvSpPr/>
+          <p:nvPr/>
+        </p:nvSpPr>
+        <p:spPr>
+          <a:xfrm>
+            <a:off x="6609320" y="2724767"/>
+            <a:ext cx="2038662" cy="1472784"/>
+          </a:xfrm>
+          <a:prstGeom prst="ellipse">
+            <a:avLst/>
+          </a:prstGeom>
+          <a:noFill/>
+          <a:ln w="76200">
+            <a:solidFill>
+              <a:srgbClr val="FF0000"/>
+            </a:solidFill>
+          </a:ln>
+        </p:spPr>
+        <p:style>
+          <a:lnRef idx="2">
+            <a:schemeClr val="accent1">
+              <a:shade val="15000"/>
+            </a:schemeClr>
+          </a:lnRef>
+          <a:fillRef idx="1">
+            <a:schemeClr val="accent1"/>
+          </a:fillRef>
+          <a:effectRef idx="0">
+            <a:schemeClr val="accent1"/>
+          </a:effectRef>
+          <a:fontRef idx="minor">
+            <a:schemeClr val="lt1"/>
+          </a:fontRef>
+        </p:style>
+        <p:txBody>
+          <a:bodyPr rtlCol="0" anchor="ctr"/>
+          <a:lstStyle/>
+          <a:p>
+            <a:pPr algn="ctr"/>
+            <a:endParaRPr lang="en-US"/>
+          </a:p>
+        </p:txBody>
+      </p:sp>
+      <p:sp>
+        <p:nvSpPr>
+          <p:cNvPr id="7" name="TextBox 6">
+            <a:extLst>
+              <a:ext uri="{FF2B5EF4-FFF2-40B4-BE49-F238E27FC236}">
+                <a16:creationId xmlns:a16="http://schemas.microsoft.com/office/drawing/2014/main" id="{6F358A66-DFC0-8B16-FA88-D4F7F6D8B656}"/>
+              </a:ext>
+            </a:extLst>
+          </p:cNvPr>
+          <p:cNvSpPr txBox="1"/>
+          <p:nvPr/>
+        </p:nvSpPr>
+        <p:spPr>
+          <a:xfrm>
+            <a:off x="996287" y="5323299"/>
+            <a:ext cx="9592893" cy="1200329"/>
+          </a:xfrm>
+          <a:prstGeom prst="rect">
+            <a:avLst/>
+          </a:prstGeom>
+          <a:noFill/>
+        </p:spPr>
+        <p:txBody>
+          <a:bodyPr wrap="square" rtlCol="0">
+            <a:spAutoFit/>
+          </a:bodyPr>
+          <a:lstStyle/>
+          <a:p>
+            <a:pPr algn="ctr"/>
+            <a:r>
+              <a:rPr lang="en-US" sz="2400" dirty="0"/>
+              <a:t>Please keep the index, middle, and fourth fingers of your right hand on the left, up, and right arrow keys as shown above throughout the entire experiment. You will use these keys to select trees on each trial.</a:t>
+            </a:r>
+          </a:p>
+        </p:txBody>
+      </p:sp>
+    </p:spTree>
+    <p:extLst>
+      <p:ext uri="{BB962C8B-B14F-4D97-AF65-F5344CB8AC3E}">
+        <p14:creationId xmlns:p14="http://schemas.microsoft.com/office/powerpoint/2010/main" val="1997132521"/>
       </p:ext>
     </p:extLst>
   </p:cSld>
@@ -5526,48 +4762,12 @@
           <a:chExt cx="0" cy="0"/>
         </a:xfrm>
       </p:grpSpPr>
-      <p:sp>
-        <p:nvSpPr>
-          <p:cNvPr id="10" name="TextBox 9">
-            <a:extLst>
-              <a:ext uri="{FF2B5EF4-FFF2-40B4-BE49-F238E27FC236}">
-                <a16:creationId xmlns:a16="http://schemas.microsoft.com/office/drawing/2014/main" id="{E672D5E3-A2C9-BBA7-4584-335F4BED5C3D}"/>
-              </a:ext>
-            </a:extLst>
-          </p:cNvPr>
-          <p:cNvSpPr txBox="1"/>
-          <p:nvPr/>
-        </p:nvSpPr>
-        <p:spPr>
-          <a:xfrm>
-            <a:off x="1988061" y="4519343"/>
-            <a:ext cx="8215877" cy="830997"/>
-          </a:xfrm>
-          <a:prstGeom prst="rect">
-            <a:avLst/>
-          </a:prstGeom>
-          <a:noFill/>
-        </p:spPr>
-        <p:txBody>
-          <a:bodyPr wrap="square" rtlCol="0">
-            <a:spAutoFit/>
-          </a:bodyPr>
-          <a:lstStyle/>
-          <a:p>
-            <a:pPr algn="ctr"/>
-            <a:r>
-              <a:rPr lang="en-US" sz="2400" b="1" dirty="0"/>
-              <a:t>Your goal is to figure out which tree(s) are most likely to give you ripe fruit, so that you can earn as many points as you can.</a:t>
-            </a:r>
-          </a:p>
-        </p:txBody>
-      </p:sp>
       <p:grpSp>
         <p:nvGrpSpPr>
-          <p:cNvPr id="2" name="Group 1">
-            <a:extLst>
-              <a:ext uri="{FF2B5EF4-FFF2-40B4-BE49-F238E27FC236}">
-                <a16:creationId xmlns:a16="http://schemas.microsoft.com/office/drawing/2014/main" id="{B9A100D4-67B1-7791-2E36-171429BFD138}"/>
+          <p:cNvPr id="4" name="Group 3">
+            <a:extLst>
+              <a:ext uri="{FF2B5EF4-FFF2-40B4-BE49-F238E27FC236}">
+                <a16:creationId xmlns:a16="http://schemas.microsoft.com/office/drawing/2014/main" id="{BD56A180-7565-B39B-15CA-914B9FBBF0AF}"/>
               </a:ext>
             </a:extLst>
           </p:cNvPr>
@@ -5576,7 +4776,7 @@
         </p:nvGrpSpPr>
         <p:grpSpPr>
           <a:xfrm>
-            <a:off x="802526" y="139008"/>
+            <a:off x="838200" y="1690688"/>
             <a:ext cx="10586948" cy="3353895"/>
             <a:chOff x="802526" y="139008"/>
             <a:chExt cx="10586948" cy="3353895"/>
@@ -5584,10 +4784,10 @@
         </p:grpSpPr>
         <p:pic>
           <p:nvPicPr>
-            <p:cNvPr id="3" name="Picture 2">
+            <p:cNvPr id="5" name="Picture 4">
               <a:extLst>
                 <a:ext uri="{FF2B5EF4-FFF2-40B4-BE49-F238E27FC236}">
-                  <a16:creationId xmlns:a16="http://schemas.microsoft.com/office/drawing/2014/main" id="{C6D7871D-CC23-DE42-9813-CBE0E58527BA}"/>
+                  <a16:creationId xmlns:a16="http://schemas.microsoft.com/office/drawing/2014/main" id="{5BD3FF08-8F05-579F-0F55-18EB3BD93A73}"/>
                 </a:ext>
               </a:extLst>
             </p:cNvPr>
@@ -5614,10 +4814,10 @@
         </p:pic>
         <p:pic>
           <p:nvPicPr>
-            <p:cNvPr id="4" name="Picture 3">
+            <p:cNvPr id="6" name="Picture 5">
               <a:extLst>
                 <a:ext uri="{FF2B5EF4-FFF2-40B4-BE49-F238E27FC236}">
-                  <a16:creationId xmlns:a16="http://schemas.microsoft.com/office/drawing/2014/main" id="{0DC8A324-8AD9-B1EA-D3C0-FF0D3E1FDE5C}"/>
+                  <a16:creationId xmlns:a16="http://schemas.microsoft.com/office/drawing/2014/main" id="{58ED18FE-C866-71BE-5552-35FF8B61C221}"/>
                 </a:ext>
               </a:extLst>
             </p:cNvPr>
@@ -5644,10 +4844,10 @@
         </p:pic>
         <p:pic>
           <p:nvPicPr>
-            <p:cNvPr id="6" name="Picture 5">
+            <p:cNvPr id="7" name="Picture 6">
               <a:extLst>
                 <a:ext uri="{FF2B5EF4-FFF2-40B4-BE49-F238E27FC236}">
-                  <a16:creationId xmlns:a16="http://schemas.microsoft.com/office/drawing/2014/main" id="{57B8D6FC-C886-84A5-A2EC-C996C113E9E5}"/>
+                  <a16:creationId xmlns:a16="http://schemas.microsoft.com/office/drawing/2014/main" id="{A248C133-C0E2-D9D7-282C-31A3DB6C62C7}"/>
                 </a:ext>
               </a:extLst>
             </p:cNvPr>
@@ -5673,10 +4873,76 @@
           </p:spPr>
         </p:pic>
       </p:grpSp>
+      <p:pic>
+        <p:nvPicPr>
+          <p:cNvPr id="8" name="Picture 7">
+            <a:extLst>
+              <a:ext uri="{FF2B5EF4-FFF2-40B4-BE49-F238E27FC236}">
+                <a16:creationId xmlns:a16="http://schemas.microsoft.com/office/drawing/2014/main" id="{E48C9022-9DE9-DE58-5F6C-FEA9171AEA56}"/>
+              </a:ext>
+            </a:extLst>
+          </p:cNvPr>
+          <p:cNvPicPr>
+            <a:picLocks noChangeAspect="1"/>
+          </p:cNvPicPr>
+          <p:nvPr/>
+        </p:nvPicPr>
+        <p:blipFill>
+          <a:blip r:embed="rId5"/>
+          <a:stretch>
+            <a:fillRect/>
+          </a:stretch>
+        </p:blipFill>
+        <p:spPr>
+          <a:xfrm>
+            <a:off x="5311290" y="121269"/>
+            <a:ext cx="1569419" cy="1569419"/>
+          </a:xfrm>
+          <a:prstGeom prst="rect">
+            <a:avLst/>
+          </a:prstGeom>
+        </p:spPr>
+      </p:pic>
+      <p:sp>
+        <p:nvSpPr>
+          <p:cNvPr id="9" name="TextBox 8">
+            <a:extLst>
+              <a:ext uri="{FF2B5EF4-FFF2-40B4-BE49-F238E27FC236}">
+                <a16:creationId xmlns:a16="http://schemas.microsoft.com/office/drawing/2014/main" id="{45AAE22F-9D79-7844-D2B9-03068DA2FFDA}"/>
+              </a:ext>
+            </a:extLst>
+          </p:cNvPr>
+          <p:cNvSpPr txBox="1"/>
+          <p:nvPr/>
+        </p:nvSpPr>
+        <p:spPr>
+          <a:xfrm>
+            <a:off x="1469758" y="5309586"/>
+            <a:ext cx="9228406" cy="1200329"/>
+          </a:xfrm>
+          <a:prstGeom prst="rect">
+            <a:avLst/>
+          </a:prstGeom>
+          <a:noFill/>
+        </p:spPr>
+        <p:txBody>
+          <a:bodyPr wrap="square" rtlCol="0">
+            <a:spAutoFit/>
+          </a:bodyPr>
+          <a:lstStyle/>
+          <a:p>
+            <a:pPr algn="ctr"/>
+            <a:r>
+              <a:rPr lang="en-US" sz="2400" dirty="0"/>
+              <a:t>Following your choice, you will see the fruit you got displayed above the tree you chose. For example, you will see a screen like this after selecting the middle tree and getting a ripe fruit…</a:t>
+            </a:r>
+          </a:p>
+        </p:txBody>
+      </p:sp>
     </p:spTree>
     <p:extLst>
       <p:ext uri="{BB962C8B-B14F-4D97-AF65-F5344CB8AC3E}">
-        <p14:creationId xmlns:p14="http://schemas.microsoft.com/office/powerpoint/2010/main" val="115648664"/>
+        <p14:creationId xmlns:p14="http://schemas.microsoft.com/office/powerpoint/2010/main" val="1824264116"/>
       </p:ext>
     </p:extLst>
   </p:cSld>
@@ -5691,7 +4957,13 @@
   <p:cSld>
     <p:spTree>
       <p:nvGrpSpPr>
-        <p:cNvPr id="1" name=""/>
+        <p:cNvPr id="1" name="">
+          <a:extLst>
+            <a:ext uri="{FF2B5EF4-FFF2-40B4-BE49-F238E27FC236}">
+              <a16:creationId xmlns:a16="http://schemas.microsoft.com/office/drawing/2014/main" id="{471FDC1E-2ED5-989D-6C89-623C43EC0A7C}"/>
+            </a:ext>
+          </a:extLst>
+        </p:cNvPr>
         <p:cNvGrpSpPr/>
         <p:nvPr/>
       </p:nvGrpSpPr>
@@ -5703,12 +4975,123 @@
           <a:chExt cx="0" cy="0"/>
         </a:xfrm>
       </p:grpSpPr>
-      <p:sp>
-        <p:nvSpPr>
-          <p:cNvPr id="10" name="TextBox 9">
-            <a:extLst>
-              <a:ext uri="{FF2B5EF4-FFF2-40B4-BE49-F238E27FC236}">
-                <a16:creationId xmlns:a16="http://schemas.microsoft.com/office/drawing/2014/main" id="{E672D5E3-A2C9-BBA7-4584-335F4BED5C3D}"/>
+      <p:grpSp>
+        <p:nvGrpSpPr>
+          <p:cNvPr id="4" name="Group 3">
+            <a:extLst>
+              <a:ext uri="{FF2B5EF4-FFF2-40B4-BE49-F238E27FC236}">
+                <a16:creationId xmlns:a16="http://schemas.microsoft.com/office/drawing/2014/main" id="{3E340E5A-BA9E-A099-EAA1-58CC83A0DD44}"/>
+              </a:ext>
+            </a:extLst>
+          </p:cNvPr>
+          <p:cNvGrpSpPr/>
+          <p:nvPr/>
+        </p:nvGrpSpPr>
+        <p:grpSpPr>
+          <a:xfrm>
+            <a:off x="838200" y="1690688"/>
+            <a:ext cx="10586948" cy="3353895"/>
+            <a:chOff x="802526" y="139008"/>
+            <a:chExt cx="10586948" cy="3353895"/>
+          </a:xfrm>
+        </p:grpSpPr>
+        <p:pic>
+          <p:nvPicPr>
+            <p:cNvPr id="5" name="Picture 4">
+              <a:extLst>
+                <a:ext uri="{FF2B5EF4-FFF2-40B4-BE49-F238E27FC236}">
+                  <a16:creationId xmlns:a16="http://schemas.microsoft.com/office/drawing/2014/main" id="{2D4E8D70-B540-0DC8-6C5B-3138FA32B4FE}"/>
+                </a:ext>
+              </a:extLst>
+            </p:cNvPr>
+            <p:cNvPicPr>
+              <a:picLocks noChangeAspect="1"/>
+            </p:cNvPicPr>
+            <p:nvPr/>
+          </p:nvPicPr>
+          <p:blipFill>
+            <a:blip r:embed="rId2"/>
+            <a:stretch>
+              <a:fillRect/>
+            </a:stretch>
+          </p:blipFill>
+          <p:spPr>
+            <a:xfrm>
+              <a:off x="802526" y="139008"/>
+              <a:ext cx="3289992" cy="3289992"/>
+            </a:xfrm>
+            <a:prstGeom prst="rect">
+              <a:avLst/>
+            </a:prstGeom>
+          </p:spPr>
+        </p:pic>
+        <p:pic>
+          <p:nvPicPr>
+            <p:cNvPr id="6" name="Picture 5">
+              <a:extLst>
+                <a:ext uri="{FF2B5EF4-FFF2-40B4-BE49-F238E27FC236}">
+                  <a16:creationId xmlns:a16="http://schemas.microsoft.com/office/drawing/2014/main" id="{8CF13642-28F8-2987-2845-A20C1C1BA18E}"/>
+                </a:ext>
+              </a:extLst>
+            </p:cNvPr>
+            <p:cNvPicPr>
+              <a:picLocks noChangeAspect="1"/>
+            </p:cNvPicPr>
+            <p:nvPr/>
+          </p:nvPicPr>
+          <p:blipFill>
+            <a:blip r:embed="rId3"/>
+            <a:stretch>
+              <a:fillRect/>
+            </a:stretch>
+          </p:blipFill>
+          <p:spPr>
+            <a:xfrm>
+              <a:off x="4503841" y="404011"/>
+              <a:ext cx="3088892" cy="3088892"/>
+            </a:xfrm>
+            <a:prstGeom prst="rect">
+              <a:avLst/>
+            </a:prstGeom>
+          </p:spPr>
+        </p:pic>
+        <p:pic>
+          <p:nvPicPr>
+            <p:cNvPr id="7" name="Picture 6">
+              <a:extLst>
+                <a:ext uri="{FF2B5EF4-FFF2-40B4-BE49-F238E27FC236}">
+                  <a16:creationId xmlns:a16="http://schemas.microsoft.com/office/drawing/2014/main" id="{01E8EA33-38EA-497C-5C3E-9AEAE355B806}"/>
+                </a:ext>
+              </a:extLst>
+            </p:cNvPr>
+            <p:cNvPicPr>
+              <a:picLocks noChangeAspect="1"/>
+            </p:cNvPicPr>
+            <p:nvPr/>
+          </p:nvPicPr>
+          <p:blipFill>
+            <a:blip r:embed="rId4"/>
+            <a:stretch>
+              <a:fillRect/>
+            </a:stretch>
+          </p:blipFill>
+          <p:spPr>
+            <a:xfrm>
+              <a:off x="8099482" y="139008"/>
+              <a:ext cx="3289992" cy="3289992"/>
+            </a:xfrm>
+            <a:prstGeom prst="rect">
+              <a:avLst/>
+            </a:prstGeom>
+          </p:spPr>
+        </p:pic>
+      </p:grpSp>
+      <p:sp>
+        <p:nvSpPr>
+          <p:cNvPr id="9" name="TextBox 8">
+            <a:extLst>
+              <a:ext uri="{FF2B5EF4-FFF2-40B4-BE49-F238E27FC236}">
+                <a16:creationId xmlns:a16="http://schemas.microsoft.com/office/drawing/2014/main" id="{52F6B0CD-1EEE-7CD1-A555-63563A714003}"/>
               </a:ext>
             </a:extLst>
           </p:cNvPr>
@@ -5717,8 +5100,8 @@
         </p:nvSpPr>
         <p:spPr>
           <a:xfrm>
-            <a:off x="1293237" y="4510790"/>
-            <a:ext cx="9605524" cy="2677656"/>
+            <a:off x="1481797" y="5474477"/>
+            <a:ext cx="9228406" cy="830997"/>
           </a:xfrm>
           <a:prstGeom prst="rect">
             <a:avLst/>
@@ -5734,48 +5117,17 @@
             <a:pPr algn="ctr"/>
             <a:r>
               <a:rPr lang="en-US" sz="2400" dirty="0"/>
-              <a:t>Finally, every time you get a rotten fruit, we will ask you to rate how much you regret your tree choice. Use your mouse to record your answer</a:t>
-            </a:r>
-            <a:r>
-              <a:rPr lang="en-US" sz="2400" b="1" dirty="0"/>
-              <a:t> </a:t>
-            </a:r>
-            <a:r>
-              <a:rPr lang="en-US" sz="2400" dirty="0"/>
-              <a:t>and press “Continue” to proceed to the next trial.</a:t>
-            </a:r>
-          </a:p>
-          <a:p>
-            <a:pPr algn="ctr"/>
-            <a:endParaRPr lang="en-US" sz="2400" dirty="0"/>
-          </a:p>
-          <a:p>
-            <a:pPr algn="ctr"/>
-            <a:r>
-              <a:rPr lang="en-US" sz="2400" b="1" dirty="0"/>
-              <a:t>Please report your feelings openly and honestly</a:t>
-            </a:r>
-            <a:r>
-              <a:rPr lang="en-US" sz="2400" dirty="0"/>
-              <a:t> regardless of how strong or weak they are!</a:t>
-            </a:r>
-            <a:endParaRPr lang="en-US" sz="2400" b="1" dirty="0"/>
-          </a:p>
-          <a:p>
-            <a:pPr algn="ctr"/>
-            <a:r>
-              <a:rPr lang="en-US" sz="2400" b="1" dirty="0"/>
-              <a:t> </a:t>
+              <a:t>… or a screen like this after selecting the left tree and getting a rotten fruit</a:t>
             </a:r>
           </a:p>
         </p:txBody>
       </p:sp>
       <p:pic>
         <p:nvPicPr>
-          <p:cNvPr id="3" name="Picture 2">
-            <a:extLst>
-              <a:ext uri="{FF2B5EF4-FFF2-40B4-BE49-F238E27FC236}">
-                <a16:creationId xmlns:a16="http://schemas.microsoft.com/office/drawing/2014/main" id="{67607619-F353-2DEB-E8E0-804B787D7FC5}"/>
+          <p:cNvPr id="2" name="Picture 1">
+            <a:extLst>
+              <a:ext uri="{FF2B5EF4-FFF2-40B4-BE49-F238E27FC236}">
+                <a16:creationId xmlns:a16="http://schemas.microsoft.com/office/drawing/2014/main" id="{8FCE6177-3C9C-4DBE-487E-A661777FAB25}"/>
               </a:ext>
             </a:extLst>
           </p:cNvPr>
@@ -5785,15 +5137,15 @@
           <p:nvPr/>
         </p:nvPicPr>
         <p:blipFill>
-          <a:blip r:embed="rId2"/>
+          <a:blip r:embed="rId5"/>
           <a:stretch>
             <a:fillRect/>
           </a:stretch>
         </p:blipFill>
         <p:spPr>
           <a:xfrm>
-            <a:off x="4640670" y="113936"/>
-            <a:ext cx="2910659" cy="4409046"/>
+            <a:off x="1781476" y="154747"/>
+            <a:ext cx="1403439" cy="1403439"/>
           </a:xfrm>
           <a:prstGeom prst="rect">
             <a:avLst/>
@@ -5803,7 +5155,7 @@
     </p:spTree>
     <p:extLst>
       <p:ext uri="{BB962C8B-B14F-4D97-AF65-F5344CB8AC3E}">
-        <p14:creationId xmlns:p14="http://schemas.microsoft.com/office/powerpoint/2010/main" val="3635275954"/>
+        <p14:creationId xmlns:p14="http://schemas.microsoft.com/office/powerpoint/2010/main" val="321179797"/>
       </p:ext>
     </p:extLst>
   </p:cSld>
@@ -5818,7 +5170,13 @@
   <p:cSld>
     <p:spTree>
       <p:nvGrpSpPr>
-        <p:cNvPr id="1" name=""/>
+        <p:cNvPr id="1" name="">
+          <a:extLst>
+            <a:ext uri="{FF2B5EF4-FFF2-40B4-BE49-F238E27FC236}">
+              <a16:creationId xmlns:a16="http://schemas.microsoft.com/office/drawing/2014/main" id="{EAFB5142-9EBB-DEF1-E10F-133B46F22AFE}"/>
+            </a:ext>
+          </a:extLst>
+        </p:cNvPr>
         <p:cNvGrpSpPr/>
         <p:nvPr/>
       </p:nvGrpSpPr>
@@ -5830,12 +5188,215 @@
           <a:chExt cx="0" cy="0"/>
         </a:xfrm>
       </p:grpSpPr>
-      <p:sp>
-        <p:nvSpPr>
-          <p:cNvPr id="10" name="TextBox 9">
-            <a:extLst>
-              <a:ext uri="{FF2B5EF4-FFF2-40B4-BE49-F238E27FC236}">
-                <a16:creationId xmlns:a16="http://schemas.microsoft.com/office/drawing/2014/main" id="{E672D5E3-A2C9-BBA7-4584-335F4BED5C3D}"/>
+      <p:cxnSp>
+        <p:nvCxnSpPr>
+          <p:cNvPr id="5" name="Straight Connector 4">
+            <a:extLst>
+              <a:ext uri="{FF2B5EF4-FFF2-40B4-BE49-F238E27FC236}">
+                <a16:creationId xmlns:a16="http://schemas.microsoft.com/office/drawing/2014/main" id="{C4224ECB-4879-70C7-1F9F-B2E8FC4BA6C4}"/>
+              </a:ext>
+            </a:extLst>
+          </p:cNvPr>
+          <p:cNvCxnSpPr/>
+          <p:nvPr/>
+        </p:nvCxnSpPr>
+        <p:spPr>
+          <a:xfrm>
+            <a:off x="3112958" y="3503953"/>
+            <a:ext cx="5966085" cy="0"/>
+          </a:xfrm>
+          <a:prstGeom prst="line">
+            <a:avLst/>
+          </a:prstGeom>
+          <a:ln w="76200">
+            <a:solidFill>
+              <a:schemeClr val="tx1"/>
+            </a:solidFill>
+          </a:ln>
+        </p:spPr>
+        <p:style>
+          <a:lnRef idx="2">
+            <a:schemeClr val="accent1"/>
+          </a:lnRef>
+          <a:fillRef idx="0">
+            <a:schemeClr val="accent1"/>
+          </a:fillRef>
+          <a:effectRef idx="1">
+            <a:schemeClr val="accent1"/>
+          </a:effectRef>
+          <a:fontRef idx="minor">
+            <a:schemeClr val="tx1"/>
+          </a:fontRef>
+        </p:style>
+      </p:cxnSp>
+      <p:sp>
+        <p:nvSpPr>
+          <p:cNvPr id="8" name="Oval 7">
+            <a:extLst>
+              <a:ext uri="{FF2B5EF4-FFF2-40B4-BE49-F238E27FC236}">
+                <a16:creationId xmlns:a16="http://schemas.microsoft.com/office/drawing/2014/main" id="{682DC062-4B76-80AF-2AAD-5E43B8514DB1}"/>
+              </a:ext>
+            </a:extLst>
+          </p:cNvPr>
+          <p:cNvSpPr/>
+          <p:nvPr/>
+        </p:nvSpPr>
+        <p:spPr>
+          <a:xfrm>
+            <a:off x="2875214" y="3265693"/>
+            <a:ext cx="475488" cy="476519"/>
+          </a:xfrm>
+          <a:prstGeom prst="ellipse">
+            <a:avLst/>
+          </a:prstGeom>
+          <a:solidFill>
+            <a:schemeClr val="tx1"/>
+          </a:solidFill>
+          <a:ln w="38100">
+            <a:solidFill>
+              <a:schemeClr val="accent4"/>
+            </a:solidFill>
+          </a:ln>
+        </p:spPr>
+        <p:style>
+          <a:lnRef idx="2">
+            <a:schemeClr val="accent1">
+              <a:shade val="15000"/>
+            </a:schemeClr>
+          </a:lnRef>
+          <a:fillRef idx="1">
+            <a:schemeClr val="accent1"/>
+          </a:fillRef>
+          <a:effectRef idx="0">
+            <a:schemeClr val="accent1"/>
+          </a:effectRef>
+          <a:fontRef idx="minor">
+            <a:schemeClr val="lt1"/>
+          </a:fontRef>
+        </p:style>
+        <p:txBody>
+          <a:bodyPr rtlCol="0" anchor="ctr"/>
+          <a:lstStyle/>
+          <a:p>
+            <a:pPr algn="ctr"/>
+            <a:endParaRPr lang="en-US"/>
+          </a:p>
+        </p:txBody>
+      </p:sp>
+      <p:sp>
+        <p:nvSpPr>
+          <p:cNvPr id="9" name="Oval 8">
+            <a:extLst>
+              <a:ext uri="{FF2B5EF4-FFF2-40B4-BE49-F238E27FC236}">
+                <a16:creationId xmlns:a16="http://schemas.microsoft.com/office/drawing/2014/main" id="{A7F024FA-AAF6-A184-8772-9E8E26FE205A}"/>
+              </a:ext>
+            </a:extLst>
+          </p:cNvPr>
+          <p:cNvSpPr/>
+          <p:nvPr/>
+        </p:nvSpPr>
+        <p:spPr>
+          <a:xfrm>
+            <a:off x="5858256" y="3265693"/>
+            <a:ext cx="475488" cy="476519"/>
+          </a:xfrm>
+          <a:prstGeom prst="ellipse">
+            <a:avLst/>
+          </a:prstGeom>
+          <a:solidFill>
+            <a:schemeClr val="tx1"/>
+          </a:solidFill>
+          <a:ln w="38100">
+            <a:solidFill>
+              <a:schemeClr val="accent4"/>
+            </a:solidFill>
+          </a:ln>
+        </p:spPr>
+        <p:style>
+          <a:lnRef idx="2">
+            <a:schemeClr val="accent1">
+              <a:shade val="15000"/>
+            </a:schemeClr>
+          </a:lnRef>
+          <a:fillRef idx="1">
+            <a:schemeClr val="accent1"/>
+          </a:fillRef>
+          <a:effectRef idx="0">
+            <a:schemeClr val="accent1"/>
+          </a:effectRef>
+          <a:fontRef idx="minor">
+            <a:schemeClr val="lt1"/>
+          </a:fontRef>
+        </p:style>
+        <p:txBody>
+          <a:bodyPr rtlCol="0" anchor="ctr"/>
+          <a:lstStyle/>
+          <a:p>
+            <a:pPr algn="ctr"/>
+            <a:endParaRPr lang="en-US"/>
+          </a:p>
+        </p:txBody>
+      </p:sp>
+      <p:sp>
+        <p:nvSpPr>
+          <p:cNvPr id="10" name="Oval 9">
+            <a:extLst>
+              <a:ext uri="{FF2B5EF4-FFF2-40B4-BE49-F238E27FC236}">
+                <a16:creationId xmlns:a16="http://schemas.microsoft.com/office/drawing/2014/main" id="{AA293AE4-664D-D9C0-83BE-8849F2EDEF7E}"/>
+              </a:ext>
+            </a:extLst>
+          </p:cNvPr>
+          <p:cNvSpPr/>
+          <p:nvPr/>
+        </p:nvSpPr>
+        <p:spPr>
+          <a:xfrm>
+            <a:off x="8841298" y="3265693"/>
+            <a:ext cx="475488" cy="476519"/>
+          </a:xfrm>
+          <a:prstGeom prst="ellipse">
+            <a:avLst/>
+          </a:prstGeom>
+          <a:solidFill>
+            <a:schemeClr val="tx1"/>
+          </a:solidFill>
+          <a:ln w="38100">
+            <a:solidFill>
+              <a:schemeClr val="accent4"/>
+            </a:solidFill>
+          </a:ln>
+        </p:spPr>
+        <p:style>
+          <a:lnRef idx="2">
+            <a:schemeClr val="accent1">
+              <a:shade val="15000"/>
+            </a:schemeClr>
+          </a:lnRef>
+          <a:fillRef idx="1">
+            <a:schemeClr val="accent1"/>
+          </a:fillRef>
+          <a:effectRef idx="0">
+            <a:schemeClr val="accent1"/>
+          </a:effectRef>
+          <a:fontRef idx="minor">
+            <a:schemeClr val="lt1"/>
+          </a:fontRef>
+        </p:style>
+        <p:txBody>
+          <a:bodyPr rtlCol="0" anchor="ctr"/>
+          <a:lstStyle/>
+          <a:p>
+            <a:pPr algn="ctr"/>
+            <a:endParaRPr lang="en-US"/>
+          </a:p>
+        </p:txBody>
+      </p:sp>
+      <p:sp>
+        <p:nvSpPr>
+          <p:cNvPr id="11" name="TextBox 10">
+            <a:extLst>
+              <a:ext uri="{FF2B5EF4-FFF2-40B4-BE49-F238E27FC236}">
+                <a16:creationId xmlns:a16="http://schemas.microsoft.com/office/drawing/2014/main" id="{BDE9A18C-0E7A-29AE-3008-8A4CB03ED8F4}"/>
               </a:ext>
             </a:extLst>
           </p:cNvPr>
@@ -5844,8 +5405,8 @@
         </p:nvSpPr>
         <p:spPr>
           <a:xfrm>
-            <a:off x="1293238" y="4522982"/>
-            <a:ext cx="9605524" cy="2677656"/>
+            <a:off x="2389202" y="3980472"/>
+            <a:ext cx="1447512" cy="830997"/>
           </a:xfrm>
           <a:prstGeom prst="rect">
             <a:avLst/>
@@ -5853,6 +5414,135 @@
           <a:noFill/>
         </p:spPr>
         <p:txBody>
+          <a:bodyPr wrap="none" rtlCol="0">
+            <a:spAutoFit/>
+          </a:bodyPr>
+          <a:lstStyle/>
+          <a:p>
+            <a:pPr algn="ctr"/>
+            <a:r>
+              <a:rPr lang="en-US" sz="2400" b="1" dirty="0"/>
+              <a:t>1</a:t>
+            </a:r>
+          </a:p>
+          <a:p>
+            <a:pPr algn="ctr"/>
+            <a:r>
+              <a:rPr lang="en-US" sz="2400" b="1" dirty="0"/>
+              <a:t>Not at all</a:t>
+            </a:r>
+          </a:p>
+        </p:txBody>
+      </p:sp>
+      <p:sp>
+        <p:nvSpPr>
+          <p:cNvPr id="12" name="TextBox 11">
+            <a:extLst>
+              <a:ext uri="{FF2B5EF4-FFF2-40B4-BE49-F238E27FC236}">
+                <a16:creationId xmlns:a16="http://schemas.microsoft.com/office/drawing/2014/main" id="{EA57CE75-1374-BDDC-1E72-91FCCDCB74F9}"/>
+              </a:ext>
+            </a:extLst>
+          </p:cNvPr>
+          <p:cNvSpPr txBox="1"/>
+          <p:nvPr/>
+        </p:nvSpPr>
+        <p:spPr>
+          <a:xfrm>
+            <a:off x="5214865" y="3980472"/>
+            <a:ext cx="1762278" cy="830997"/>
+          </a:xfrm>
+          <a:prstGeom prst="rect">
+            <a:avLst/>
+          </a:prstGeom>
+          <a:noFill/>
+        </p:spPr>
+        <p:txBody>
+          <a:bodyPr wrap="none" rtlCol="0">
+            <a:spAutoFit/>
+          </a:bodyPr>
+          <a:lstStyle/>
+          <a:p>
+            <a:pPr algn="ctr"/>
+            <a:r>
+              <a:rPr lang="en-US" sz="2400" b="1" dirty="0"/>
+              <a:t>2</a:t>
+            </a:r>
+          </a:p>
+          <a:p>
+            <a:pPr algn="ctr"/>
+            <a:r>
+              <a:rPr lang="en-US" sz="2400" b="1" dirty="0"/>
+              <a:t>Moderately</a:t>
+            </a:r>
+          </a:p>
+        </p:txBody>
+      </p:sp>
+      <p:sp>
+        <p:nvSpPr>
+          <p:cNvPr id="13" name="TextBox 12">
+            <a:extLst>
+              <a:ext uri="{FF2B5EF4-FFF2-40B4-BE49-F238E27FC236}">
+                <a16:creationId xmlns:a16="http://schemas.microsoft.com/office/drawing/2014/main" id="{03AAD5E5-2DD8-258D-326F-F62498CDB911}"/>
+              </a:ext>
+            </a:extLst>
+          </p:cNvPr>
+          <p:cNvSpPr txBox="1"/>
+          <p:nvPr/>
+        </p:nvSpPr>
+        <p:spPr>
+          <a:xfrm>
+            <a:off x="8829106" y="3980472"/>
+            <a:ext cx="814647" cy="830997"/>
+          </a:xfrm>
+          <a:prstGeom prst="rect">
+            <a:avLst/>
+          </a:prstGeom>
+          <a:noFill/>
+        </p:spPr>
+        <p:txBody>
+          <a:bodyPr wrap="none" rtlCol="0">
+            <a:spAutoFit/>
+          </a:bodyPr>
+          <a:lstStyle/>
+          <a:p>
+            <a:pPr algn="ctr"/>
+            <a:r>
+              <a:rPr lang="en-US" sz="2400" b="1" dirty="0"/>
+              <a:t>3</a:t>
+            </a:r>
+          </a:p>
+          <a:p>
+            <a:pPr algn="ctr"/>
+            <a:r>
+              <a:rPr lang="en-US" sz="2400" b="1" dirty="0"/>
+              <a:t>A lot</a:t>
+            </a:r>
+          </a:p>
+        </p:txBody>
+      </p:sp>
+      <p:sp>
+        <p:nvSpPr>
+          <p:cNvPr id="14" name="TextBox 13">
+            <a:extLst>
+              <a:ext uri="{FF2B5EF4-FFF2-40B4-BE49-F238E27FC236}">
+                <a16:creationId xmlns:a16="http://schemas.microsoft.com/office/drawing/2014/main" id="{18ABDD83-6B42-FAB5-FE1A-1CCE9D3590B5}"/>
+              </a:ext>
+            </a:extLst>
+          </p:cNvPr>
+          <p:cNvSpPr txBox="1"/>
+          <p:nvPr/>
+        </p:nvSpPr>
+        <p:spPr>
+          <a:xfrm>
+            <a:off x="2663274" y="1584330"/>
+            <a:ext cx="6865452" cy="1200329"/>
+          </a:xfrm>
+          <a:prstGeom prst="rect">
+            <a:avLst/>
+          </a:prstGeom>
+          <a:noFill/>
+        </p:spPr>
+        <p:txBody>
           <a:bodyPr wrap="square" rtlCol="0">
             <a:spAutoFit/>
           </a:bodyPr>
@@ -5860,77 +5550,68 @@
           <a:p>
             <a:pPr algn="ctr"/>
             <a:r>
-              <a:rPr lang="en-US" sz="2400" dirty="0"/>
-              <a:t>Finally, in the first half of the task, every time you get a rotten fruit, we will ask you to rate how much you regret your tree choice. Use your mouse to record your answer</a:t>
-            </a:r>
-            <a:r>
               <a:rPr lang="en-US" sz="2400" b="1" dirty="0"/>
-              <a:t> </a:t>
-            </a:r>
-            <a:r>
-              <a:rPr lang="en-US" sz="2400" dirty="0"/>
-              <a:t>and press “Continue” to proceed to the next trial.</a:t>
-            </a:r>
-          </a:p>
-          <a:p>
-            <a:pPr algn="ctr"/>
-            <a:endParaRPr lang="en-US" sz="2400" dirty="0"/>
-          </a:p>
-          <a:p>
-            <a:pPr algn="ctr"/>
-            <a:r>
-              <a:rPr lang="en-US" sz="2400" b="1" dirty="0"/>
-              <a:t>Please report your feelings openly and honestly</a:t>
-            </a:r>
-            <a:r>
-              <a:rPr lang="en-US" sz="2400" dirty="0"/>
-              <a:t> regardless of how strong or weak they are!</a:t>
-            </a:r>
-            <a:endParaRPr lang="en-US" sz="2400" b="1" dirty="0"/>
-          </a:p>
-          <a:p>
-            <a:pPr algn="ctr"/>
-            <a:r>
-              <a:rPr lang="en-US" sz="2400" b="1" dirty="0"/>
-              <a:t> </a:t>
-            </a:r>
-          </a:p>
-        </p:txBody>
-      </p:sp>
-      <p:pic>
-        <p:nvPicPr>
-          <p:cNvPr id="3" name="Picture 2">
-            <a:extLst>
-              <a:ext uri="{FF2B5EF4-FFF2-40B4-BE49-F238E27FC236}">
-                <a16:creationId xmlns:a16="http://schemas.microsoft.com/office/drawing/2014/main" id="{67607619-F353-2DEB-E8E0-804B787D7FC5}"/>
-              </a:ext>
-            </a:extLst>
-          </p:cNvPr>
-          <p:cNvPicPr>
-            <a:picLocks noChangeAspect="1"/>
-          </p:cNvPicPr>
+              <a:t>How much do you regret this choice? Please enter a number between 1 and 3 to rate the intensity of your regret on the scale below</a:t>
+            </a:r>
+          </a:p>
+        </p:txBody>
+      </p:sp>
+      <p:sp>
+        <p:nvSpPr>
+          <p:cNvPr id="2" name="TextBox 1">
+            <a:extLst>
+              <a:ext uri="{FF2B5EF4-FFF2-40B4-BE49-F238E27FC236}">
+                <a16:creationId xmlns:a16="http://schemas.microsoft.com/office/drawing/2014/main" id="{9B99417C-6BDC-F22A-C797-40CBBEF6544C}"/>
+              </a:ext>
+            </a:extLst>
+          </p:cNvPr>
+          <p:cNvSpPr txBox="1"/>
           <p:nvPr/>
-        </p:nvPicPr>
-        <p:blipFill>
-          <a:blip r:embed="rId2"/>
-          <a:stretch>
-            <a:fillRect/>
-          </a:stretch>
-        </p:blipFill>
+        </p:nvSpPr>
         <p:spPr>
           <a:xfrm>
-            <a:off x="4640670" y="113936"/>
-            <a:ext cx="2910659" cy="4409046"/>
+            <a:off x="1301639" y="5287987"/>
+            <a:ext cx="10064209" cy="1200329"/>
           </a:xfrm>
           <a:prstGeom prst="rect">
             <a:avLst/>
           </a:prstGeom>
+          <a:noFill/>
         </p:spPr>
-      </p:pic>
+        <p:txBody>
+          <a:bodyPr wrap="square" rtlCol="0">
+            <a:spAutoFit/>
+          </a:bodyPr>
+          <a:lstStyle/>
+          <a:p>
+            <a:pPr algn="ctr"/>
+            <a:r>
+              <a:rPr lang="en-US" sz="2400" dirty="0"/>
+              <a:t>Finally, </a:t>
+            </a:r>
+            <a:r>
+              <a:rPr lang="en-US" sz="2400" b="1" dirty="0"/>
+              <a:t>on some trials</a:t>
+            </a:r>
+            <a:r>
+              <a:rPr lang="en-US" sz="2400" dirty="0"/>
+              <a:t>, you </a:t>
+            </a:r>
+            <a:r>
+              <a:rPr lang="en-US" sz="2400" i="1" dirty="0"/>
+              <a:t>may</a:t>
+            </a:r>
+            <a:r>
+              <a:rPr lang="en-US" sz="2400" dirty="0"/>
+              <a:t> be asked to rate how much you regret your choice of tree using a 3-point scale. These questions appear at pre-determined times and are not tied to your performance in the task.</a:t>
+            </a:r>
+          </a:p>
+        </p:txBody>
+      </p:sp>
     </p:spTree>
     <p:extLst>
       <p:ext uri="{BB962C8B-B14F-4D97-AF65-F5344CB8AC3E}">
-        <p14:creationId xmlns:p14="http://schemas.microsoft.com/office/powerpoint/2010/main" val="3195152792"/>
+        <p14:creationId xmlns:p14="http://schemas.microsoft.com/office/powerpoint/2010/main" val="1809336859"/>
       </p:ext>
     </p:extLst>
   </p:cSld>
@@ -5951,39 +5632,39 @@
         <a:sysClr val="window" lastClr="FFFFFF"/>
       </a:lt1>
       <a:dk2>
-        <a:srgbClr val="44546A"/>
+        <a:srgbClr val="0E2841"/>
       </a:dk2>
       <a:lt2>
-        <a:srgbClr val="E7E6E6"/>
+        <a:srgbClr val="E8E8E8"/>
       </a:lt2>
       <a:accent1>
-        <a:srgbClr val="4472C4"/>
+        <a:srgbClr val="156082"/>
       </a:accent1>
       <a:accent2>
-        <a:srgbClr val="ED7D31"/>
+        <a:srgbClr val="E97132"/>
       </a:accent2>
       <a:accent3>
-        <a:srgbClr val="A5A5A5"/>
+        <a:srgbClr val="196B24"/>
       </a:accent3>
       <a:accent4>
-        <a:srgbClr val="FFC000"/>
+        <a:srgbClr val="0F9ED5"/>
       </a:accent4>
       <a:accent5>
-        <a:srgbClr val="5B9BD5"/>
+        <a:srgbClr val="A02B93"/>
       </a:accent5>
       <a:accent6>
-        <a:srgbClr val="70AD47"/>
+        <a:srgbClr val="4EA72E"/>
       </a:accent6>
       <a:hlink>
-        <a:srgbClr val="0563C1"/>
+        <a:srgbClr val="467886"/>
       </a:hlink>
       <a:folHlink>
-        <a:srgbClr val="954F72"/>
+        <a:srgbClr val="96607D"/>
       </a:folHlink>
     </a:clrScheme>
     <a:fontScheme name="Office">
       <a:majorFont>
-        <a:latin typeface="Calibri Light" panose="020F0302020204030204"/>
+        <a:latin typeface="Aptos Display" panose="02110004020202020204"/>
         <a:ea typeface=""/>
         <a:cs typeface=""/>
         <a:font script="Jpan" typeface="游ゴシック Light"/>
@@ -6035,7 +5716,7 @@
         <a:font script="Tfng" typeface="Ebrima"/>
       </a:majorFont>
       <a:minorFont>
-        <a:latin typeface="Calibri" panose="020F0502020204030204"/>
+        <a:latin typeface="Aptos" panose="02110004020202020204"/>
         <a:ea typeface=""/>
         <a:cs typeface=""/>
         <a:font script="Jpan" typeface="游ゴシック"/>
@@ -6146,13 +5827,6 @@
         </a:gradFill>
       </a:fillStyleLst>
       <a:lnStyleLst>
-        <a:ln w="6350" cap="flat" cmpd="sng" algn="ctr">
-          <a:solidFill>
-            <a:schemeClr val="phClr"/>
-          </a:solidFill>
-          <a:prstDash val="solid"/>
-          <a:miter lim="800000"/>
-        </a:ln>
         <a:ln w="12700" cap="flat" cmpd="sng" algn="ctr">
           <a:solidFill>
             <a:schemeClr val="phClr"/>
@@ -6161,6 +5835,13 @@
           <a:miter lim="800000"/>
         </a:ln>
         <a:ln w="19050" cap="flat" cmpd="sng" algn="ctr">
+          <a:solidFill>
+            <a:schemeClr val="phClr"/>
+          </a:solidFill>
+          <a:prstDash val="solid"/>
+          <a:miter lim="800000"/>
+        </a:ln>
+        <a:ln w="25400" cap="flat" cmpd="sng" algn="ctr">
           <a:solidFill>
             <a:schemeClr val="phClr"/>
           </a:solidFill>
@@ -6225,11 +5906,31 @@
       </a:bgFillStyleLst>
     </a:fmtScheme>
   </a:themeElements>
-  <a:objectDefaults/>
+  <a:objectDefaults>
+    <a:lnDef>
+      <a:spPr/>
+      <a:bodyPr/>
+      <a:lstStyle/>
+      <a:style>
+        <a:lnRef idx="2">
+          <a:schemeClr val="accent1"/>
+        </a:lnRef>
+        <a:fillRef idx="0">
+          <a:schemeClr val="accent1"/>
+        </a:fillRef>
+        <a:effectRef idx="1">
+          <a:schemeClr val="accent1"/>
+        </a:effectRef>
+        <a:fontRef idx="minor">
+          <a:schemeClr val="tx1"/>
+        </a:fontRef>
+      </a:style>
+    </a:lnDef>
+  </a:objectDefaults>
   <a:extraClrSchemeLst/>
   <a:extLst>
     <a:ext uri="{05A4C25C-085E-4340-85A3-A5531E510DB2}">
-      <thm15:themeFamily xmlns:thm15="http://schemas.microsoft.com/office/thememl/2012/main" name="Office Theme" id="{62F939B6-93AF-4DB8-9C6B-D6C7DFDC589F}" vid="{4A3C46E8-61CC-4603-A589-7422A47A8E4A}"/>
+      <thm15:themeFamily xmlns:thm15="http://schemas.microsoft.com/office/thememl/2012/main" name="Office Theme" id="{2E142A2C-CD16-42D6-873A-C26D2A0506FA}" vid="{1BDDFF52-6CD6-40A5-AB3C-68EB2F1E4D0A}"/>
     </a:ext>
   </a:extLst>
 </a:theme>

</xml_diff>